<commit_message>
improved meteor service improved slides
</commit_message>
<xml_diff>
--- a/presentation/slides.pptx
+++ b/presentation/slides.pptx
@@ -1565,22 +1565,22 @@
     </dgm:pt>
   </dgm:ptLst>
   <dgm:cxnLst>
-    <dgm:cxn modelId="{32378F54-1C7E-2D40-AA2A-BFA28E1A1175}" type="presOf" srcId="{C159646B-012A-4212-A7AD-6654D7CF499B}" destId="{7E4B80E4-9D97-4F8A-ABF5-4CECC4686258}" srcOrd="0" destOrd="0" presId="urn:microsoft.com/office/officeart/2005/8/layout/cycle6"/>
+    <dgm:cxn modelId="{9D79A768-2C70-6E4A-86EB-A533198E3854}" type="presOf" srcId="{79588392-39B9-4A6E-8618-992429D0EC73}" destId="{6D563E2F-5C7F-4774-ABE3-729046460C24}" srcOrd="0" destOrd="0" presId="urn:microsoft.com/office/officeart/2005/8/layout/cycle6"/>
+    <dgm:cxn modelId="{72566B6A-355B-BA41-9E9C-FA0D6078DDD1}" type="presOf" srcId="{7A2D9AB9-275B-4A46-A748-9F7B232E1D0F}" destId="{DF3645CE-46DB-4F90-9DAB-C2774C13F04F}" srcOrd="0" destOrd="0" presId="urn:microsoft.com/office/officeart/2005/8/layout/cycle6"/>
     <dgm:cxn modelId="{15D14727-05E4-4C96-9C03-E85EE9D295B2}" srcId="{79588392-39B9-4A6E-8618-992429D0EC73}" destId="{5428AD4D-7D4E-4E44-BFE5-92FC9A2B0EEF}" srcOrd="3" destOrd="0" parTransId="{EC4F5020-CCA4-409E-8E69-DFBF730337FD}" sibTransId="{7A2D9AB9-275B-4A46-A748-9F7B232E1D0F}"/>
-    <dgm:cxn modelId="{807DE98E-2FE4-9F46-B9DD-216E28E07AE7}" type="presOf" srcId="{44BBA0F8-D041-47AE-8943-545F55B2C89E}" destId="{749D468D-54CC-41A3-B2EA-89E619386BCE}" srcOrd="0" destOrd="0" presId="urn:microsoft.com/office/officeart/2005/8/layout/cycle6"/>
-    <dgm:cxn modelId="{72566B6A-355B-BA41-9E9C-FA0D6078DDD1}" type="presOf" srcId="{7A2D9AB9-275B-4A46-A748-9F7B232E1D0F}" destId="{DF3645CE-46DB-4F90-9DAB-C2774C13F04F}" srcOrd="0" destOrd="0" presId="urn:microsoft.com/office/officeart/2005/8/layout/cycle6"/>
-    <dgm:cxn modelId="{D71E3A35-37BD-4867-957F-098CFDC849C2}" srcId="{79588392-39B9-4A6E-8618-992429D0EC73}" destId="{C159646B-012A-4212-A7AD-6654D7CF499B}" srcOrd="4" destOrd="0" parTransId="{E4E9B317-C79A-4DF6-965A-E121299606F5}" sibTransId="{44BBA0F8-D041-47AE-8943-545F55B2C89E}"/>
-    <dgm:cxn modelId="{BAE4E163-1650-F248-B306-6C0F9A59E8A4}" type="presOf" srcId="{7DEB2853-C119-4899-B3FC-72C55873FA6E}" destId="{C3032F7F-C8D4-47FE-AA00-8867D71E8DE2}" srcOrd="0" destOrd="0" presId="urn:microsoft.com/office/officeart/2005/8/layout/cycle6"/>
-    <dgm:cxn modelId="{2D19F2F7-ED06-004C-B302-A627A2159E7E}" type="presOf" srcId="{89A0E891-8B9E-41D8-9601-162AA0B40C0C}" destId="{5F281920-551E-4D0D-8CEF-E7C7BC4F1DCA}" srcOrd="0" destOrd="0" presId="urn:microsoft.com/office/officeart/2005/8/layout/cycle6"/>
-    <dgm:cxn modelId="{33545504-A5CD-7C41-BD7A-54E3BC87A0FC}" type="presOf" srcId="{5428AD4D-7D4E-4E44-BFE5-92FC9A2B0EEF}" destId="{346ABEDD-A3D1-4ACA-9D13-2BCC76FFF25E}" srcOrd="0" destOrd="0" presId="urn:microsoft.com/office/officeart/2005/8/layout/cycle6"/>
-    <dgm:cxn modelId="{C00E3E51-FE4A-FA49-88D0-C004D983E42B}" type="presOf" srcId="{D1FD90FB-6ACC-4337-ABDE-047986D23A5C}" destId="{E05153C1-91D3-4E68-8392-C01435994C3E}" srcOrd="0" destOrd="0" presId="urn:microsoft.com/office/officeart/2005/8/layout/cycle6"/>
-    <dgm:cxn modelId="{625913C1-44C4-1B42-B766-1368C2870657}" type="presOf" srcId="{F63A48CD-A5ED-4128-AE46-7337842E0071}" destId="{C547E508-1A19-49A1-81AB-02193B54CB91}" srcOrd="0" destOrd="0" presId="urn:microsoft.com/office/officeart/2005/8/layout/cycle6"/>
     <dgm:cxn modelId="{2405A3C1-4A2D-4944-AC62-10BC9A6A1185}" srcId="{79588392-39B9-4A6E-8618-992429D0EC73}" destId="{2349488A-425F-4656-B941-19606BC6EE61}" srcOrd="1" destOrd="0" parTransId="{0571949E-BBD7-461C-8547-C966BD05F12F}" sibTransId="{F63A48CD-A5ED-4128-AE46-7337842E0071}"/>
     <dgm:cxn modelId="{00B59CB1-CD26-4519-963A-C058F5FE4F79}" srcId="{79588392-39B9-4A6E-8618-992429D0EC73}" destId="{7DEB2853-C119-4899-B3FC-72C55873FA6E}" srcOrd="2" destOrd="0" parTransId="{161ADB85-6C78-4D47-A7AF-488BF365FAF9}" sibTransId="{89A0E891-8B9E-41D8-9601-162AA0B40C0C}"/>
-    <dgm:cxn modelId="{9D79A768-2C70-6E4A-86EB-A533198E3854}" type="presOf" srcId="{79588392-39B9-4A6E-8618-992429D0EC73}" destId="{6D563E2F-5C7F-4774-ABE3-729046460C24}" srcOrd="0" destOrd="0" presId="urn:microsoft.com/office/officeart/2005/8/layout/cycle6"/>
+    <dgm:cxn modelId="{625913C1-44C4-1B42-B766-1368C2870657}" type="presOf" srcId="{F63A48CD-A5ED-4128-AE46-7337842E0071}" destId="{C547E508-1A19-49A1-81AB-02193B54CB91}" srcOrd="0" destOrd="0" presId="urn:microsoft.com/office/officeart/2005/8/layout/cycle6"/>
+    <dgm:cxn modelId="{C00E3E51-FE4A-FA49-88D0-C004D983E42B}" type="presOf" srcId="{D1FD90FB-6ACC-4337-ABDE-047986D23A5C}" destId="{E05153C1-91D3-4E68-8392-C01435994C3E}" srcOrd="0" destOrd="0" presId="urn:microsoft.com/office/officeart/2005/8/layout/cycle6"/>
+    <dgm:cxn modelId="{33545504-A5CD-7C41-BD7A-54E3BC87A0FC}" type="presOf" srcId="{5428AD4D-7D4E-4E44-BFE5-92FC9A2B0EEF}" destId="{346ABEDD-A3D1-4ACA-9D13-2BCC76FFF25E}" srcOrd="0" destOrd="0" presId="urn:microsoft.com/office/officeart/2005/8/layout/cycle6"/>
     <dgm:cxn modelId="{C8D55DC6-6B17-B54B-8585-3D70492EB6C4}" type="presOf" srcId="{2349488A-425F-4656-B941-19606BC6EE61}" destId="{C785F3C5-6CB1-4E0C-8080-250BAC63EF0E}" srcOrd="0" destOrd="0" presId="urn:microsoft.com/office/officeart/2005/8/layout/cycle6"/>
+    <dgm:cxn modelId="{807DE98E-2FE4-9F46-B9DD-216E28E07AE7}" type="presOf" srcId="{44BBA0F8-D041-47AE-8943-545F55B2C89E}" destId="{749D468D-54CC-41A3-B2EA-89E619386BCE}" srcOrd="0" destOrd="0" presId="urn:microsoft.com/office/officeart/2005/8/layout/cycle6"/>
+    <dgm:cxn modelId="{32378F54-1C7E-2D40-AA2A-BFA28E1A1175}" type="presOf" srcId="{C159646B-012A-4212-A7AD-6654D7CF499B}" destId="{7E4B80E4-9D97-4F8A-ABF5-4CECC4686258}" srcOrd="0" destOrd="0" presId="urn:microsoft.com/office/officeart/2005/8/layout/cycle6"/>
+    <dgm:cxn modelId="{5990C50C-B0F3-0847-99D4-82B910465AD3}" type="presOf" srcId="{8A9F2C8D-B5DF-46F4-8FD7-A10CD99EA81A}" destId="{F6182B7F-9740-4FEA-A674-E8D1BD9AF57A}" srcOrd="0" destOrd="0" presId="urn:microsoft.com/office/officeart/2005/8/layout/cycle6"/>
+    <dgm:cxn modelId="{BAE4E163-1650-F248-B306-6C0F9A59E8A4}" type="presOf" srcId="{7DEB2853-C119-4899-B3FC-72C55873FA6E}" destId="{C3032F7F-C8D4-47FE-AA00-8867D71E8DE2}" srcOrd="0" destOrd="0" presId="urn:microsoft.com/office/officeart/2005/8/layout/cycle6"/>
+    <dgm:cxn modelId="{D71E3A35-37BD-4867-957F-098CFDC849C2}" srcId="{79588392-39B9-4A6E-8618-992429D0EC73}" destId="{C159646B-012A-4212-A7AD-6654D7CF499B}" srcOrd="4" destOrd="0" parTransId="{E4E9B317-C79A-4DF6-965A-E121299606F5}" sibTransId="{44BBA0F8-D041-47AE-8943-545F55B2C89E}"/>
+    <dgm:cxn modelId="{2D19F2F7-ED06-004C-B302-A627A2159E7E}" type="presOf" srcId="{89A0E891-8B9E-41D8-9601-162AA0B40C0C}" destId="{5F281920-551E-4D0D-8CEF-E7C7BC4F1DCA}" srcOrd="0" destOrd="0" presId="urn:microsoft.com/office/officeart/2005/8/layout/cycle6"/>
     <dgm:cxn modelId="{52500655-CA4C-4A60-902C-D4AAF66352D0}" srcId="{79588392-39B9-4A6E-8618-992429D0EC73}" destId="{D1FD90FB-6ACC-4337-ABDE-047986D23A5C}" srcOrd="0" destOrd="0" parTransId="{6519A1D2-A3A8-490C-9484-F6AA17D5D21F}" sibTransId="{8A9F2C8D-B5DF-46F4-8FD7-A10CD99EA81A}"/>
-    <dgm:cxn modelId="{5990C50C-B0F3-0847-99D4-82B910465AD3}" type="presOf" srcId="{8A9F2C8D-B5DF-46F4-8FD7-A10CD99EA81A}" destId="{F6182B7F-9740-4FEA-A674-E8D1BD9AF57A}" srcOrd="0" destOrd="0" presId="urn:microsoft.com/office/officeart/2005/8/layout/cycle6"/>
     <dgm:cxn modelId="{BA082D85-EDCF-1645-9C0A-AED0976E8E52}" type="presParOf" srcId="{6D563E2F-5C7F-4774-ABE3-729046460C24}" destId="{E05153C1-91D3-4E68-8392-C01435994C3E}" srcOrd="0" destOrd="0" presId="urn:microsoft.com/office/officeart/2005/8/layout/cycle6"/>
     <dgm:cxn modelId="{F71C2DAB-AF18-8045-8FBA-940A848EDE55}" type="presParOf" srcId="{6D563E2F-5C7F-4774-ABE3-729046460C24}" destId="{D47191B8-8DB2-4345-9C05-C5C64A481D0E}" srcOrd="1" destOrd="0" presId="urn:microsoft.com/office/officeart/2005/8/layout/cycle6"/>
     <dgm:cxn modelId="{58E4ECEE-61B7-A34C-8C1F-7CC3C7E42E12}" type="presParOf" srcId="{6D563E2F-5C7F-4774-ABE3-729046460C24}" destId="{F6182B7F-9740-4FEA-A674-E8D1BD9AF57A}" srcOrd="2" destOrd="0" presId="urn:microsoft.com/office/officeart/2005/8/layout/cycle6"/>
@@ -12885,7 +12885,15 @@
             <a:pPr lvl="2"/>
             <a:r>
               <a:rPr lang="en-US" dirty="0" smtClean="0"/>
-              <a:t>Owns concepts to structure definition files:</a:t>
+              <a:t>Owns concepts to </a:t>
+            </a:r>
+            <a:r>
+              <a:rPr lang="en-US" dirty="0" smtClean="0"/>
+              <a:t>structure and reuse </a:t>
+            </a:r>
+            <a:r>
+              <a:rPr lang="en-US" dirty="0" smtClean="0"/>
+              <a:t>definition files:</a:t>
             </a:r>
           </a:p>
           <a:p>
@@ -12928,22 +12936,30 @@
             <a:pPr lvl="3"/>
             <a:r>
               <a:rPr lang="en-US" dirty="0" smtClean="0"/>
-              <a:t>Templates (jinja2)</a:t>
-            </a:r>
+              <a:t>Templates (jinja2</a:t>
+            </a:r>
+            <a:r>
+              <a:rPr lang="en-US" dirty="0" smtClean="0"/>
+              <a:t>)</a:t>
+            </a:r>
+            <a:br>
+              <a:rPr lang="en-US" dirty="0" smtClean="0"/>
+            </a:br>
+            <a:endParaRPr lang="en-US" dirty="0"/>
           </a:p>
           <a:p>
             <a:pPr lvl="2"/>
-            <a:endParaRPr lang="en-US" dirty="0"/>
-          </a:p>
-          <a:p>
-            <a:pPr lvl="2"/>
-            <a:r>
-              <a:rPr lang="en-US" dirty="0" smtClean="0"/>
-              <a:t>Provides reusable modules to run tasks</a:t>
-            </a:r>
-          </a:p>
-          <a:p>
-            <a:pPr lvl="2"/>
+            <a:r>
+              <a:rPr lang="en-US" dirty="0" smtClean="0"/>
+              <a:t>Provides reusable modules to run </a:t>
+            </a:r>
+            <a:r>
+              <a:rPr lang="en-US" dirty="0" smtClean="0"/>
+              <a:t>tasks</a:t>
+            </a:r>
+            <a:br>
+              <a:rPr lang="en-US" dirty="0" smtClean="0"/>
+            </a:br>
             <a:endParaRPr lang="en-US" dirty="0"/>
           </a:p>
           <a:p>
@@ -13982,7 +13998,6 @@
               <a:rPr lang="en-US" dirty="0" smtClean="0"/>
               <a:t> Approach, Share our Experiences</a:t>
             </a:r>
-            <a:endParaRPr lang="en-US" dirty="0" smtClean="0"/>
           </a:p>
           <a:p>
             <a:r>
@@ -14009,7 +14024,6 @@
               <a:rPr lang="en-US" dirty="0" smtClean="0"/>
               <a:t> and use Auto-Scaling</a:t>
             </a:r>
-            <a:endParaRPr lang="en-US" dirty="0" smtClean="0"/>
           </a:p>
           <a:p>
             <a:r>
@@ -16186,7 +16200,7 @@
           <a:graphicData uri="http://schemas.openxmlformats.org/presentationml/2006/ole">
             <mc:AlternateContent xmlns:mc="http://schemas.openxmlformats.org/markup-compatibility/2006">
               <mc:Choice xmlns:v="urn:schemas-microsoft-com:vml" Requires="v">
-                <p:oleObj spid="_x0000_s1048" name="Dokument" r:id="rId4" imgW="24330159" imgH="16558730" progId="Word.Document.12">
+                <p:oleObj spid="_x0000_s1050" name="Dokument" r:id="rId4" imgW="24330159" imgH="16558730" progId="Word.Document.12">
                   <p:link updateAutomatic="1"/>
                 </p:oleObj>
               </mc:Choice>

</xml_diff>

<commit_message>
removed the template and included Infra Automation
</commit_message>
<xml_diff>
--- a/presentation/slides.pptx
+++ b/presentation/slides.pptx
@@ -5,10 +5,10 @@
     <p:sldMasterId id="2147483660" r:id="rId1"/>
   </p:sldMasterIdLst>
   <p:notesMasterIdLst>
-    <p:notesMasterId r:id="rId27"/>
+    <p:notesMasterId r:id="rId31"/>
   </p:notesMasterIdLst>
   <p:handoutMasterIdLst>
-    <p:handoutMasterId r:id="rId28"/>
+    <p:handoutMasterId r:id="rId32"/>
   </p:handoutMasterIdLst>
   <p:sldIdLst>
     <p:sldId id="351" r:id="rId2"/>
@@ -20,22 +20,26 @@
     <p:sldId id="356" r:id="rId8"/>
     <p:sldId id="357" r:id="rId9"/>
     <p:sldId id="358" r:id="rId10"/>
-    <p:sldId id="359" r:id="rId11"/>
+    <p:sldId id="366" r:id="rId11"/>
     <p:sldId id="360" r:id="rId12"/>
     <p:sldId id="361" r:id="rId13"/>
     <p:sldId id="362" r:id="rId14"/>
     <p:sldId id="363" r:id="rId15"/>
     <p:sldId id="364" r:id="rId16"/>
     <p:sldId id="365" r:id="rId17"/>
-    <p:sldId id="325" r:id="rId18"/>
-    <p:sldId id="286" r:id="rId19"/>
-    <p:sldId id="285" r:id="rId20"/>
-    <p:sldId id="291" r:id="rId21"/>
-    <p:sldId id="287" r:id="rId22"/>
-    <p:sldId id="310" r:id="rId23"/>
-    <p:sldId id="265" r:id="rId24"/>
-    <p:sldId id="339" r:id="rId25"/>
-    <p:sldId id="346" r:id="rId26"/>
+    <p:sldId id="367" r:id="rId18"/>
+    <p:sldId id="369" r:id="rId19"/>
+    <p:sldId id="370" r:id="rId20"/>
+    <p:sldId id="368" r:id="rId21"/>
+    <p:sldId id="325" r:id="rId22"/>
+    <p:sldId id="286" r:id="rId23"/>
+    <p:sldId id="285" r:id="rId24"/>
+    <p:sldId id="291" r:id="rId25"/>
+    <p:sldId id="287" r:id="rId26"/>
+    <p:sldId id="310" r:id="rId27"/>
+    <p:sldId id="265" r:id="rId28"/>
+    <p:sldId id="339" r:id="rId29"/>
+    <p:sldId id="346" r:id="rId30"/>
   </p:sldIdLst>
   <p:sldSz cx="12195175" cy="6859588"/>
   <p:notesSz cx="6797675" cy="9874250"/>
@@ -1565,22 +1569,22 @@
     </dgm:pt>
   </dgm:ptLst>
   <dgm:cxnLst>
-    <dgm:cxn modelId="{9D79A768-2C70-6E4A-86EB-A533198E3854}" type="presOf" srcId="{79588392-39B9-4A6E-8618-992429D0EC73}" destId="{6D563E2F-5C7F-4774-ABE3-729046460C24}" srcOrd="0" destOrd="0" presId="urn:microsoft.com/office/officeart/2005/8/layout/cycle6"/>
+    <dgm:cxn modelId="{32378F54-1C7E-2D40-AA2A-BFA28E1A1175}" type="presOf" srcId="{C159646B-012A-4212-A7AD-6654D7CF499B}" destId="{7E4B80E4-9D97-4F8A-ABF5-4CECC4686258}" srcOrd="0" destOrd="0" presId="urn:microsoft.com/office/officeart/2005/8/layout/cycle6"/>
+    <dgm:cxn modelId="{15D14727-05E4-4C96-9C03-E85EE9D295B2}" srcId="{79588392-39B9-4A6E-8618-992429D0EC73}" destId="{5428AD4D-7D4E-4E44-BFE5-92FC9A2B0EEF}" srcOrd="3" destOrd="0" parTransId="{EC4F5020-CCA4-409E-8E69-DFBF730337FD}" sibTransId="{7A2D9AB9-275B-4A46-A748-9F7B232E1D0F}"/>
+    <dgm:cxn modelId="{807DE98E-2FE4-9F46-B9DD-216E28E07AE7}" type="presOf" srcId="{44BBA0F8-D041-47AE-8943-545F55B2C89E}" destId="{749D468D-54CC-41A3-B2EA-89E619386BCE}" srcOrd="0" destOrd="0" presId="urn:microsoft.com/office/officeart/2005/8/layout/cycle6"/>
     <dgm:cxn modelId="{72566B6A-355B-BA41-9E9C-FA0D6078DDD1}" type="presOf" srcId="{7A2D9AB9-275B-4A46-A748-9F7B232E1D0F}" destId="{DF3645CE-46DB-4F90-9DAB-C2774C13F04F}" srcOrd="0" destOrd="0" presId="urn:microsoft.com/office/officeart/2005/8/layout/cycle6"/>
-    <dgm:cxn modelId="{15D14727-05E4-4C96-9C03-E85EE9D295B2}" srcId="{79588392-39B9-4A6E-8618-992429D0EC73}" destId="{5428AD4D-7D4E-4E44-BFE5-92FC9A2B0EEF}" srcOrd="3" destOrd="0" parTransId="{EC4F5020-CCA4-409E-8E69-DFBF730337FD}" sibTransId="{7A2D9AB9-275B-4A46-A748-9F7B232E1D0F}"/>
+    <dgm:cxn modelId="{D71E3A35-37BD-4867-957F-098CFDC849C2}" srcId="{79588392-39B9-4A6E-8618-992429D0EC73}" destId="{C159646B-012A-4212-A7AD-6654D7CF499B}" srcOrd="4" destOrd="0" parTransId="{E4E9B317-C79A-4DF6-965A-E121299606F5}" sibTransId="{44BBA0F8-D041-47AE-8943-545F55B2C89E}"/>
+    <dgm:cxn modelId="{BAE4E163-1650-F248-B306-6C0F9A59E8A4}" type="presOf" srcId="{7DEB2853-C119-4899-B3FC-72C55873FA6E}" destId="{C3032F7F-C8D4-47FE-AA00-8867D71E8DE2}" srcOrd="0" destOrd="0" presId="urn:microsoft.com/office/officeart/2005/8/layout/cycle6"/>
+    <dgm:cxn modelId="{2D19F2F7-ED06-004C-B302-A627A2159E7E}" type="presOf" srcId="{89A0E891-8B9E-41D8-9601-162AA0B40C0C}" destId="{5F281920-551E-4D0D-8CEF-E7C7BC4F1DCA}" srcOrd="0" destOrd="0" presId="urn:microsoft.com/office/officeart/2005/8/layout/cycle6"/>
+    <dgm:cxn modelId="{33545504-A5CD-7C41-BD7A-54E3BC87A0FC}" type="presOf" srcId="{5428AD4D-7D4E-4E44-BFE5-92FC9A2B0EEF}" destId="{346ABEDD-A3D1-4ACA-9D13-2BCC76FFF25E}" srcOrd="0" destOrd="0" presId="urn:microsoft.com/office/officeart/2005/8/layout/cycle6"/>
+    <dgm:cxn modelId="{C00E3E51-FE4A-FA49-88D0-C004D983E42B}" type="presOf" srcId="{D1FD90FB-6ACC-4337-ABDE-047986D23A5C}" destId="{E05153C1-91D3-4E68-8392-C01435994C3E}" srcOrd="0" destOrd="0" presId="urn:microsoft.com/office/officeart/2005/8/layout/cycle6"/>
+    <dgm:cxn modelId="{625913C1-44C4-1B42-B766-1368C2870657}" type="presOf" srcId="{F63A48CD-A5ED-4128-AE46-7337842E0071}" destId="{C547E508-1A19-49A1-81AB-02193B54CB91}" srcOrd="0" destOrd="0" presId="urn:microsoft.com/office/officeart/2005/8/layout/cycle6"/>
     <dgm:cxn modelId="{2405A3C1-4A2D-4944-AC62-10BC9A6A1185}" srcId="{79588392-39B9-4A6E-8618-992429D0EC73}" destId="{2349488A-425F-4656-B941-19606BC6EE61}" srcOrd="1" destOrd="0" parTransId="{0571949E-BBD7-461C-8547-C966BD05F12F}" sibTransId="{F63A48CD-A5ED-4128-AE46-7337842E0071}"/>
     <dgm:cxn modelId="{00B59CB1-CD26-4519-963A-C058F5FE4F79}" srcId="{79588392-39B9-4A6E-8618-992429D0EC73}" destId="{7DEB2853-C119-4899-B3FC-72C55873FA6E}" srcOrd="2" destOrd="0" parTransId="{161ADB85-6C78-4D47-A7AF-488BF365FAF9}" sibTransId="{89A0E891-8B9E-41D8-9601-162AA0B40C0C}"/>
-    <dgm:cxn modelId="{625913C1-44C4-1B42-B766-1368C2870657}" type="presOf" srcId="{F63A48CD-A5ED-4128-AE46-7337842E0071}" destId="{C547E508-1A19-49A1-81AB-02193B54CB91}" srcOrd="0" destOrd="0" presId="urn:microsoft.com/office/officeart/2005/8/layout/cycle6"/>
-    <dgm:cxn modelId="{C00E3E51-FE4A-FA49-88D0-C004D983E42B}" type="presOf" srcId="{D1FD90FB-6ACC-4337-ABDE-047986D23A5C}" destId="{E05153C1-91D3-4E68-8392-C01435994C3E}" srcOrd="0" destOrd="0" presId="urn:microsoft.com/office/officeart/2005/8/layout/cycle6"/>
-    <dgm:cxn modelId="{33545504-A5CD-7C41-BD7A-54E3BC87A0FC}" type="presOf" srcId="{5428AD4D-7D4E-4E44-BFE5-92FC9A2B0EEF}" destId="{346ABEDD-A3D1-4ACA-9D13-2BCC76FFF25E}" srcOrd="0" destOrd="0" presId="urn:microsoft.com/office/officeart/2005/8/layout/cycle6"/>
+    <dgm:cxn modelId="{9D79A768-2C70-6E4A-86EB-A533198E3854}" type="presOf" srcId="{79588392-39B9-4A6E-8618-992429D0EC73}" destId="{6D563E2F-5C7F-4774-ABE3-729046460C24}" srcOrd="0" destOrd="0" presId="urn:microsoft.com/office/officeart/2005/8/layout/cycle6"/>
     <dgm:cxn modelId="{C8D55DC6-6B17-B54B-8585-3D70492EB6C4}" type="presOf" srcId="{2349488A-425F-4656-B941-19606BC6EE61}" destId="{C785F3C5-6CB1-4E0C-8080-250BAC63EF0E}" srcOrd="0" destOrd="0" presId="urn:microsoft.com/office/officeart/2005/8/layout/cycle6"/>
-    <dgm:cxn modelId="{807DE98E-2FE4-9F46-B9DD-216E28E07AE7}" type="presOf" srcId="{44BBA0F8-D041-47AE-8943-545F55B2C89E}" destId="{749D468D-54CC-41A3-B2EA-89E619386BCE}" srcOrd="0" destOrd="0" presId="urn:microsoft.com/office/officeart/2005/8/layout/cycle6"/>
-    <dgm:cxn modelId="{32378F54-1C7E-2D40-AA2A-BFA28E1A1175}" type="presOf" srcId="{C159646B-012A-4212-A7AD-6654D7CF499B}" destId="{7E4B80E4-9D97-4F8A-ABF5-4CECC4686258}" srcOrd="0" destOrd="0" presId="urn:microsoft.com/office/officeart/2005/8/layout/cycle6"/>
+    <dgm:cxn modelId="{52500655-CA4C-4A60-902C-D4AAF66352D0}" srcId="{79588392-39B9-4A6E-8618-992429D0EC73}" destId="{D1FD90FB-6ACC-4337-ABDE-047986D23A5C}" srcOrd="0" destOrd="0" parTransId="{6519A1D2-A3A8-490C-9484-F6AA17D5D21F}" sibTransId="{8A9F2C8D-B5DF-46F4-8FD7-A10CD99EA81A}"/>
     <dgm:cxn modelId="{5990C50C-B0F3-0847-99D4-82B910465AD3}" type="presOf" srcId="{8A9F2C8D-B5DF-46F4-8FD7-A10CD99EA81A}" destId="{F6182B7F-9740-4FEA-A674-E8D1BD9AF57A}" srcOrd="0" destOrd="0" presId="urn:microsoft.com/office/officeart/2005/8/layout/cycle6"/>
-    <dgm:cxn modelId="{BAE4E163-1650-F248-B306-6C0F9A59E8A4}" type="presOf" srcId="{7DEB2853-C119-4899-B3FC-72C55873FA6E}" destId="{C3032F7F-C8D4-47FE-AA00-8867D71E8DE2}" srcOrd="0" destOrd="0" presId="urn:microsoft.com/office/officeart/2005/8/layout/cycle6"/>
-    <dgm:cxn modelId="{D71E3A35-37BD-4867-957F-098CFDC849C2}" srcId="{79588392-39B9-4A6E-8618-992429D0EC73}" destId="{C159646B-012A-4212-A7AD-6654D7CF499B}" srcOrd="4" destOrd="0" parTransId="{E4E9B317-C79A-4DF6-965A-E121299606F5}" sibTransId="{44BBA0F8-D041-47AE-8943-545F55B2C89E}"/>
-    <dgm:cxn modelId="{2D19F2F7-ED06-004C-B302-A627A2159E7E}" type="presOf" srcId="{89A0E891-8B9E-41D8-9601-162AA0B40C0C}" destId="{5F281920-551E-4D0D-8CEF-E7C7BC4F1DCA}" srcOrd="0" destOrd="0" presId="urn:microsoft.com/office/officeart/2005/8/layout/cycle6"/>
-    <dgm:cxn modelId="{52500655-CA4C-4A60-902C-D4AAF66352D0}" srcId="{79588392-39B9-4A6E-8618-992429D0EC73}" destId="{D1FD90FB-6ACC-4337-ABDE-047986D23A5C}" srcOrd="0" destOrd="0" parTransId="{6519A1D2-A3A8-490C-9484-F6AA17D5D21F}" sibTransId="{8A9F2C8D-B5DF-46F4-8FD7-A10CD99EA81A}"/>
     <dgm:cxn modelId="{BA082D85-EDCF-1645-9C0A-AED0976E8E52}" type="presParOf" srcId="{6D563E2F-5C7F-4774-ABE3-729046460C24}" destId="{E05153C1-91D3-4E68-8392-C01435994C3E}" srcOrd="0" destOrd="0" presId="urn:microsoft.com/office/officeart/2005/8/layout/cycle6"/>
     <dgm:cxn modelId="{F71C2DAB-AF18-8045-8FBA-940A848EDE55}" type="presParOf" srcId="{6D563E2F-5C7F-4774-ABE3-729046460C24}" destId="{D47191B8-8DB2-4345-9C05-C5C64A481D0E}" srcOrd="1" destOrd="0" presId="urn:microsoft.com/office/officeart/2005/8/layout/cycle6"/>
     <dgm:cxn modelId="{58E4ECEE-61B7-A34C-8C1F-7CC3C7E42E12}" type="presParOf" srcId="{6D563E2F-5C7F-4774-ABE3-729046460C24}" destId="{F6182B7F-9740-4FEA-A674-E8D1BD9AF57A}" srcOrd="2" destOrd="0" presId="urn:microsoft.com/office/officeart/2005/8/layout/cycle6"/>
@@ -4529,11 +4533,11 @@
           <a:lstStyle/>
           <a:p>
             <a:fld id="{7D8C2C35-2B8A-446E-BEC0-FD36716C29AC}" type="slidenum">
-              <a:rPr lang="en-US" smtClean="0"/>
+              <a:rPr lang="de-DE" smtClean="0"/>
               <a:pPr/>
               <a:t>17</a:t>
             </a:fld>
-            <a:endParaRPr lang="en-US" dirty="0"/>
+            <a:endParaRPr lang="de-DE" dirty="0"/>
           </a:p>
         </p:txBody>
       </p:sp>
@@ -4849,11 +4853,11 @@
           <a:lstStyle/>
           <a:p>
             <a:fld id="{7D8C2C35-2B8A-446E-BEC0-FD36716C29AC}" type="slidenum">
-              <a:rPr lang="en-US" smtClean="0"/>
+              <a:rPr lang="de-DE" smtClean="0"/>
               <a:pPr/>
               <a:t>20</a:t>
             </a:fld>
-            <a:endParaRPr lang="en-US" dirty="0"/>
+            <a:endParaRPr lang="de-DE" dirty="0"/>
           </a:p>
         </p:txBody>
       </p:sp>
@@ -5252,6 +5256,326 @@
               <a:rPr lang="en-US" smtClean="0"/>
               <a:pPr/>
               <a:t>25</a:t>
+            </a:fld>
+            <a:endParaRPr lang="en-US" dirty="0"/>
+          </a:p>
+        </p:txBody>
+      </p:sp>
+      <p:sp>
+        <p:nvSpPr>
+          <p:cNvPr id="3" name="Slide Image Placeholder 2"/>
+          <p:cNvSpPr>
+            <a:spLocks noGrp="1" noRot="1" noChangeAspect="1"/>
+          </p:cNvSpPr>
+          <p:nvPr>
+            <p:ph type="sldImg"/>
+          </p:nvPr>
+        </p:nvSpPr>
+        <p:spPr/>
+      </p:sp>
+      <p:sp>
+        <p:nvSpPr>
+          <p:cNvPr id="5" name="Notes Placeholder 4"/>
+          <p:cNvSpPr>
+            <a:spLocks noGrp="1"/>
+          </p:cNvSpPr>
+          <p:nvPr>
+            <p:ph type="body" idx="1"/>
+          </p:nvPr>
+        </p:nvSpPr>
+        <p:spPr/>
+        <p:txBody>
+          <a:bodyPr/>
+          <a:lstStyle/>
+          <a:p>
+            <a:endParaRPr lang="en-US"/>
+          </a:p>
+        </p:txBody>
+      </p:sp>
+    </p:spTree>
+  </p:cSld>
+  <p:clrMapOvr>
+    <a:masterClrMapping/>
+  </p:clrMapOvr>
+</p:notes>
+</file>
+
+<file path=ppt/notesSlides/notesSlide26.xml><?xml version="1.0" encoding="utf-8"?>
+<p:notes xmlns:a="http://schemas.openxmlformats.org/drawingml/2006/main" xmlns:r="http://schemas.openxmlformats.org/officeDocument/2006/relationships" xmlns:p="http://schemas.openxmlformats.org/presentationml/2006/main">
+  <p:cSld>
+    <p:spTree>
+      <p:nvGrpSpPr>
+        <p:cNvPr id="1" name=""/>
+        <p:cNvGrpSpPr/>
+        <p:nvPr/>
+      </p:nvGrpSpPr>
+      <p:grpSpPr>
+        <a:xfrm>
+          <a:off x="0" y="0"/>
+          <a:ext cx="0" cy="0"/>
+          <a:chOff x="0" y="0"/>
+          <a:chExt cx="0" cy="0"/>
+        </a:xfrm>
+      </p:grpSpPr>
+      <p:sp>
+        <p:nvSpPr>
+          <p:cNvPr id="4" name="Slide Number Placeholder 3"/>
+          <p:cNvSpPr>
+            <a:spLocks noGrp="1"/>
+          </p:cNvSpPr>
+          <p:nvPr>
+            <p:ph type="sldNum" sz="quarter" idx="10"/>
+          </p:nvPr>
+        </p:nvSpPr>
+        <p:spPr/>
+        <p:txBody>
+          <a:bodyPr/>
+          <a:lstStyle/>
+          <a:p>
+            <a:fld id="{7D8C2C35-2B8A-446E-BEC0-FD36716C29AC}" type="slidenum">
+              <a:rPr lang="en-US" smtClean="0"/>
+              <a:pPr/>
+              <a:t>26</a:t>
+            </a:fld>
+            <a:endParaRPr lang="en-US" dirty="0"/>
+          </a:p>
+        </p:txBody>
+      </p:sp>
+      <p:sp>
+        <p:nvSpPr>
+          <p:cNvPr id="3" name="Slide Image Placeholder 2"/>
+          <p:cNvSpPr>
+            <a:spLocks noGrp="1" noRot="1" noChangeAspect="1"/>
+          </p:cNvSpPr>
+          <p:nvPr>
+            <p:ph type="sldImg"/>
+          </p:nvPr>
+        </p:nvSpPr>
+        <p:spPr/>
+      </p:sp>
+      <p:sp>
+        <p:nvSpPr>
+          <p:cNvPr id="5" name="Notes Placeholder 4"/>
+          <p:cNvSpPr>
+            <a:spLocks noGrp="1"/>
+          </p:cNvSpPr>
+          <p:nvPr>
+            <p:ph type="body" idx="1"/>
+          </p:nvPr>
+        </p:nvSpPr>
+        <p:spPr/>
+        <p:txBody>
+          <a:bodyPr/>
+          <a:lstStyle/>
+          <a:p>
+            <a:endParaRPr lang="en-US"/>
+          </a:p>
+        </p:txBody>
+      </p:sp>
+    </p:spTree>
+  </p:cSld>
+  <p:clrMapOvr>
+    <a:masterClrMapping/>
+  </p:clrMapOvr>
+</p:notes>
+</file>
+
+<file path=ppt/notesSlides/notesSlide27.xml><?xml version="1.0" encoding="utf-8"?>
+<p:notes xmlns:a="http://schemas.openxmlformats.org/drawingml/2006/main" xmlns:r="http://schemas.openxmlformats.org/officeDocument/2006/relationships" xmlns:p="http://schemas.openxmlformats.org/presentationml/2006/main">
+  <p:cSld>
+    <p:spTree>
+      <p:nvGrpSpPr>
+        <p:cNvPr id="1" name=""/>
+        <p:cNvGrpSpPr/>
+        <p:nvPr/>
+      </p:nvGrpSpPr>
+      <p:grpSpPr>
+        <a:xfrm>
+          <a:off x="0" y="0"/>
+          <a:ext cx="0" cy="0"/>
+          <a:chOff x="0" y="0"/>
+          <a:chExt cx="0" cy="0"/>
+        </a:xfrm>
+      </p:grpSpPr>
+      <p:sp>
+        <p:nvSpPr>
+          <p:cNvPr id="4" name="Slide Number Placeholder 3"/>
+          <p:cNvSpPr>
+            <a:spLocks noGrp="1"/>
+          </p:cNvSpPr>
+          <p:nvPr>
+            <p:ph type="sldNum" sz="quarter" idx="10"/>
+          </p:nvPr>
+        </p:nvSpPr>
+        <p:spPr/>
+        <p:txBody>
+          <a:bodyPr/>
+          <a:lstStyle/>
+          <a:p>
+            <a:fld id="{7D8C2C35-2B8A-446E-BEC0-FD36716C29AC}" type="slidenum">
+              <a:rPr lang="en-US" smtClean="0"/>
+              <a:pPr/>
+              <a:t>27</a:t>
+            </a:fld>
+            <a:endParaRPr lang="en-US" dirty="0"/>
+          </a:p>
+        </p:txBody>
+      </p:sp>
+      <p:sp>
+        <p:nvSpPr>
+          <p:cNvPr id="3" name="Slide Image Placeholder 2"/>
+          <p:cNvSpPr>
+            <a:spLocks noGrp="1" noRot="1" noChangeAspect="1"/>
+          </p:cNvSpPr>
+          <p:nvPr>
+            <p:ph type="sldImg"/>
+          </p:nvPr>
+        </p:nvSpPr>
+        <p:spPr/>
+      </p:sp>
+      <p:sp>
+        <p:nvSpPr>
+          <p:cNvPr id="5" name="Notes Placeholder 4"/>
+          <p:cNvSpPr>
+            <a:spLocks noGrp="1"/>
+          </p:cNvSpPr>
+          <p:nvPr>
+            <p:ph type="body" idx="1"/>
+          </p:nvPr>
+        </p:nvSpPr>
+        <p:spPr/>
+        <p:txBody>
+          <a:bodyPr/>
+          <a:lstStyle/>
+          <a:p>
+            <a:endParaRPr lang="en-US"/>
+          </a:p>
+        </p:txBody>
+      </p:sp>
+    </p:spTree>
+  </p:cSld>
+  <p:clrMapOvr>
+    <a:masterClrMapping/>
+  </p:clrMapOvr>
+</p:notes>
+</file>
+
+<file path=ppt/notesSlides/notesSlide28.xml><?xml version="1.0" encoding="utf-8"?>
+<p:notes xmlns:a="http://schemas.openxmlformats.org/drawingml/2006/main" xmlns:r="http://schemas.openxmlformats.org/officeDocument/2006/relationships" xmlns:p="http://schemas.openxmlformats.org/presentationml/2006/main">
+  <p:cSld>
+    <p:spTree>
+      <p:nvGrpSpPr>
+        <p:cNvPr id="1" name=""/>
+        <p:cNvGrpSpPr/>
+        <p:nvPr/>
+      </p:nvGrpSpPr>
+      <p:grpSpPr>
+        <a:xfrm>
+          <a:off x="0" y="0"/>
+          <a:ext cx="0" cy="0"/>
+          <a:chOff x="0" y="0"/>
+          <a:chExt cx="0" cy="0"/>
+        </a:xfrm>
+      </p:grpSpPr>
+      <p:sp>
+        <p:nvSpPr>
+          <p:cNvPr id="4" name="Slide Number Placeholder 3"/>
+          <p:cNvSpPr>
+            <a:spLocks noGrp="1"/>
+          </p:cNvSpPr>
+          <p:nvPr>
+            <p:ph type="sldNum" sz="quarter" idx="10"/>
+          </p:nvPr>
+        </p:nvSpPr>
+        <p:spPr/>
+        <p:txBody>
+          <a:bodyPr/>
+          <a:lstStyle/>
+          <a:p>
+            <a:fld id="{7D8C2C35-2B8A-446E-BEC0-FD36716C29AC}" type="slidenum">
+              <a:rPr lang="en-US" smtClean="0"/>
+              <a:pPr/>
+              <a:t>28</a:t>
+            </a:fld>
+            <a:endParaRPr lang="en-US" dirty="0"/>
+          </a:p>
+        </p:txBody>
+      </p:sp>
+      <p:sp>
+        <p:nvSpPr>
+          <p:cNvPr id="3" name="Slide Image Placeholder 2"/>
+          <p:cNvSpPr>
+            <a:spLocks noGrp="1" noRot="1" noChangeAspect="1"/>
+          </p:cNvSpPr>
+          <p:nvPr>
+            <p:ph type="sldImg"/>
+          </p:nvPr>
+        </p:nvSpPr>
+        <p:spPr/>
+      </p:sp>
+      <p:sp>
+        <p:nvSpPr>
+          <p:cNvPr id="5" name="Notes Placeholder 4"/>
+          <p:cNvSpPr>
+            <a:spLocks noGrp="1"/>
+          </p:cNvSpPr>
+          <p:nvPr>
+            <p:ph type="body" idx="1"/>
+          </p:nvPr>
+        </p:nvSpPr>
+        <p:spPr/>
+        <p:txBody>
+          <a:bodyPr/>
+          <a:lstStyle/>
+          <a:p>
+            <a:endParaRPr lang="en-US"/>
+          </a:p>
+        </p:txBody>
+      </p:sp>
+    </p:spTree>
+  </p:cSld>
+  <p:clrMapOvr>
+    <a:masterClrMapping/>
+  </p:clrMapOvr>
+</p:notes>
+</file>
+
+<file path=ppt/notesSlides/notesSlide29.xml><?xml version="1.0" encoding="utf-8"?>
+<p:notes xmlns:a="http://schemas.openxmlformats.org/drawingml/2006/main" xmlns:r="http://schemas.openxmlformats.org/officeDocument/2006/relationships" xmlns:p="http://schemas.openxmlformats.org/presentationml/2006/main">
+  <p:cSld>
+    <p:spTree>
+      <p:nvGrpSpPr>
+        <p:cNvPr id="1" name=""/>
+        <p:cNvGrpSpPr/>
+        <p:nvPr/>
+      </p:nvGrpSpPr>
+      <p:grpSpPr>
+        <a:xfrm>
+          <a:off x="0" y="0"/>
+          <a:ext cx="0" cy="0"/>
+          <a:chOff x="0" y="0"/>
+          <a:chExt cx="0" cy="0"/>
+        </a:xfrm>
+      </p:grpSpPr>
+      <p:sp>
+        <p:nvSpPr>
+          <p:cNvPr id="4" name="Slide Number Placeholder 3"/>
+          <p:cNvSpPr>
+            <a:spLocks noGrp="1"/>
+          </p:cNvSpPr>
+          <p:nvPr>
+            <p:ph type="sldNum" sz="quarter" idx="10"/>
+          </p:nvPr>
+        </p:nvSpPr>
+        <p:spPr/>
+        <p:txBody>
+          <a:bodyPr/>
+          <a:lstStyle/>
+          <a:p>
+            <a:fld id="{7D8C2C35-2B8A-446E-BEC0-FD36716C29AC}" type="slidenum">
+              <a:rPr lang="en-US" smtClean="0"/>
+              <a:pPr/>
+              <a:t>29</a:t>
             </a:fld>
             <a:endParaRPr lang="en-US" dirty="0"/>
           </a:p>
@@ -12359,30 +12683,134 @@
             <a:pPr lvl="0"/>
             <a:r>
               <a:rPr lang="en-US" dirty="0" smtClean="0"/>
-              <a:t>Amazon Machine Image (AMI)</a:t>
+              <a:t>Scripting Environments</a:t>
             </a:r>
           </a:p>
           <a:p>
             <a:pPr lvl="1"/>
             <a:r>
               <a:rPr lang="en-US" dirty="0" smtClean="0"/>
-              <a:t>An encrypted file stored in Amazon storage, containing all the information necessary to boot instances of a customer’s software</a:t>
+              <a:t>Applying configuration to nodes (single or hundreds)</a:t>
             </a:r>
           </a:p>
           <a:p>
             <a:pPr lvl="2"/>
             <a:r>
               <a:rPr lang="en-US" dirty="0" smtClean="0"/>
-              <a:t>An AMI is like a bootable root disk, which can be pre-defined or u</a:t>
-            </a:r>
+              <a:t>Includes automating everything</a:t>
+            </a:r>
+          </a:p>
+          <a:p>
+            <a:pPr lvl="3"/>
+            <a:r>
+              <a:rPr lang="en-US" dirty="0" smtClean="0"/>
+              <a:t>Installing OS</a:t>
+            </a:r>
+          </a:p>
+          <a:p>
+            <a:pPr lvl="3"/>
+            <a:r>
+              <a:rPr lang="en-US" dirty="0" smtClean="0"/>
+              <a:t>Configuring servers on instances</a:t>
+            </a:r>
+          </a:p>
+          <a:p>
+            <a:pPr lvl="3"/>
+            <a:r>
+              <a:rPr lang="en-US" dirty="0" smtClean="0"/>
+              <a:t>Configuring how different </a:t>
+            </a:r>
+            <a:r>
+              <a:rPr lang="en-US" dirty="0" err="1" smtClean="0"/>
+              <a:t>softwares</a:t>
+            </a:r>
+            <a:r>
+              <a:rPr lang="en-US" dirty="0" smtClean="0"/>
+              <a:t> communicate with each other</a:t>
+            </a:r>
+          </a:p>
+          <a:p>
+            <a:pPr lvl="2"/>
+            <a:r>
+              <a:rPr lang="en-US" dirty="0" smtClean="0"/>
+              <a:t>Setting up and replicating environments in less error-prone manner</a:t>
+            </a:r>
+          </a:p>
+          <a:p>
+            <a:pPr lvl="3"/>
+            <a:r>
+              <a:rPr lang="en-US" dirty="0" smtClean="0"/>
+              <a:t>Automated </a:t>
+            </a:r>
+            <a:r>
+              <a:rPr lang="en-US" dirty="0" smtClean="0"/>
+              <a:t>testing</a:t>
+            </a:r>
+          </a:p>
+          <a:p>
+            <a:pPr lvl="3"/>
+            <a:r>
+              <a:rPr lang="en-US" dirty="0" smtClean="0"/>
+              <a:t>D</a:t>
+            </a:r>
+            <a:r>
+              <a:rPr lang="en-US" dirty="0" smtClean="0"/>
+              <a:t>ocumentation</a:t>
+            </a:r>
+          </a:p>
+          <a:p>
+            <a:pPr lvl="3"/>
+            <a:r>
+              <a:rPr lang="en-US" dirty="0"/>
+              <a:t>V</a:t>
+            </a:r>
+            <a:r>
+              <a:rPr lang="en-US" dirty="0" smtClean="0"/>
+              <a:t>ersioning </a:t>
+            </a:r>
+            <a:r>
+              <a:rPr lang="en-US" dirty="0" smtClean="0"/>
+              <a:t>of infrastructure setup</a:t>
+            </a:r>
+          </a:p>
+          <a:p>
+            <a:pPr lvl="2"/>
             <a:endParaRPr lang="en-US" dirty="0"/>
           </a:p>
-        </p:txBody>
-      </p:sp>
+          <a:p>
+            <a:pPr lvl="2"/>
+            <a:endParaRPr lang="en-US" dirty="0" smtClean="0"/>
+          </a:p>
+        </p:txBody>
+      </p:sp>
+      <p:pic>
+        <p:nvPicPr>
+          <p:cNvPr id="3" name="Picture 2"/>
+          <p:cNvPicPr>
+            <a:picLocks noChangeAspect="1"/>
+          </p:cNvPicPr>
+          <p:nvPr/>
+        </p:nvPicPr>
+        <p:blipFill>
+          <a:blip r:embed="rId3"/>
+          <a:stretch>
+            <a:fillRect/>
+          </a:stretch>
+        </p:blipFill>
+        <p:spPr>
+          <a:xfrm>
+            <a:off x="7510754" y="2492972"/>
+            <a:ext cx="4359058" cy="3959774"/>
+          </a:xfrm>
+          <a:prstGeom prst="rect">
+            <a:avLst/>
+          </a:prstGeom>
+        </p:spPr>
+      </p:pic>
     </p:spTree>
     <p:extLst>
       <p:ext uri="{BB962C8B-B14F-4D97-AF65-F5344CB8AC3E}">
-        <p14:creationId xmlns:p14="http://schemas.microsoft.com/office/powerpoint/2010/main" val="105913964"/>
+        <p14:creationId xmlns:p14="http://schemas.microsoft.com/office/powerpoint/2010/main" val="2096837272"/>
       </p:ext>
     </p:extLst>
   </p:cSld>
@@ -12467,8 +12895,9 @@
             <a:pPr lvl="0"/>
             <a:r>
               <a:rPr lang="en-US" dirty="0" smtClean="0"/>
-              <a:t>Amazon Machine Image (AMI)</a:t>
-            </a:r>
+              <a:t>Configuration Management Tool</a:t>
+            </a:r>
+            <a:endParaRPr lang="en-US" dirty="0" smtClean="0"/>
           </a:p>
           <a:p>
             <a:pPr lvl="1"/>
@@ -12885,15 +13314,7 @@
             <a:pPr lvl="2"/>
             <a:r>
               <a:rPr lang="en-US" dirty="0" smtClean="0"/>
-              <a:t>Owns concepts to </a:t>
-            </a:r>
-            <a:r>
-              <a:rPr lang="en-US" dirty="0" smtClean="0"/>
-              <a:t>structure and reuse </a:t>
-            </a:r>
-            <a:r>
-              <a:rPr lang="en-US" dirty="0" smtClean="0"/>
-              <a:t>definition files:</a:t>
+              <a:t>Owns concepts to structure and reuse definition files:</a:t>
             </a:r>
           </a:p>
           <a:p>
@@ -12936,11 +13357,7 @@
             <a:pPr lvl="3"/>
             <a:r>
               <a:rPr lang="en-US" dirty="0" smtClean="0"/>
-              <a:t>Templates (jinja2</a:t>
-            </a:r>
-            <a:r>
-              <a:rPr lang="en-US" dirty="0" smtClean="0"/>
-              <a:t>)</a:t>
+              <a:t>Templates (jinja2)</a:t>
             </a:r>
             <a:br>
               <a:rPr lang="en-US" dirty="0" smtClean="0"/>
@@ -12951,11 +13368,7 @@
             <a:pPr lvl="2"/>
             <a:r>
               <a:rPr lang="en-US" dirty="0" smtClean="0"/>
-              <a:t>Provides reusable modules to run </a:t>
-            </a:r>
-            <a:r>
-              <a:rPr lang="en-US" dirty="0" smtClean="0"/>
-              <a:t>tasks</a:t>
+              <a:t>Provides reusable modules to run tasks</a:t>
             </a:r>
             <a:br>
               <a:rPr lang="en-US" dirty="0" smtClean="0"/>
@@ -13592,14 +14005,46 @@
           <a:chExt cx="0" cy="0"/>
         </a:xfrm>
       </p:grpSpPr>
-      <p:sp>
-        <p:nvSpPr>
-          <p:cNvPr id="2" name="Title 1"/>
+      <p:pic>
+        <p:nvPicPr>
+          <p:cNvPr id="8" name="Picture Placeholder 4" descr="275257_l_srgb_s_gl copy.jpg"/>
+          <p:cNvPicPr>
+            <a:picLocks noGrp="1" noChangeAspect="1"/>
+          </p:cNvPicPr>
+          <p:nvPr>
+            <p:ph type="pic" sz="quarter" idx="11"/>
+          </p:nvPr>
+        </p:nvPicPr>
+        <p:blipFill rotWithShape="1">
+          <a:blip r:embed="rId3" cstate="screen">
+            <a:extLst>
+              <a:ext uri="{28A0092B-C50C-407E-A947-70E740481C1C}">
+                <a14:useLocalDpi xmlns:a14="http://schemas.microsoft.com/office/drawing/2010/main"/>
+              </a:ext>
+            </a:extLst>
+          </a:blip>
+          <a:srcRect/>
+          <a:stretch/>
+        </p:blipFill>
+        <p:spPr bwMode="gray">
+          <a:prstGeom prst="rect">
+            <a:avLst/>
+          </a:prstGeom>
+          <a:solidFill>
+            <a:schemeClr val="bg1">
+              <a:lumMod val="95000"/>
+            </a:schemeClr>
+          </a:solidFill>
+        </p:spPr>
+      </p:pic>
+      <p:sp>
+        <p:nvSpPr>
+          <p:cNvPr id="3" name="Title 2"/>
           <p:cNvSpPr>
             <a:spLocks noGrp="1"/>
           </p:cNvSpPr>
           <p:nvPr>
-            <p:ph type="title"/>
+            <p:ph type="ctrTitle"/>
           </p:nvPr>
         </p:nvSpPr>
         <p:spPr/>
@@ -13609,62 +14054,56 @@
           <a:p>
             <a:r>
               <a:rPr lang="en-US" dirty="0" smtClean="0"/>
-              <a:t>Insert page title</a:t>
-            </a:r>
-            <a:br>
-              <a:rPr lang="en-US" dirty="0" smtClean="0"/>
-            </a:br>
-            <a:r>
-              <a:rPr lang="en-US" sz="2400" b="0" dirty="0" smtClean="0"/>
-              <a:t>Subtitle </a:t>
-            </a:r>
-            <a:endParaRPr lang="en-US" sz="2400" b="0" dirty="0"/>
-          </a:p>
-        </p:txBody>
-      </p:sp>
-      <p:sp>
-        <p:nvSpPr>
-          <p:cNvPr id="3" name="Text Placeholder 2"/>
-          <p:cNvSpPr>
-            <a:spLocks noGrp="1"/>
-          </p:cNvSpPr>
-          <p:nvPr>
-            <p:ph type="body" sz="quarter" idx="10"/>
-          </p:nvPr>
-        </p:nvSpPr>
-        <p:spPr/>
-        <p:txBody>
-          <a:bodyPr/>
-          <a:lstStyle/>
-          <a:p>
-            <a:pPr lvl="0"/>
-            <a:r>
-              <a:rPr lang="en-US" dirty="0" smtClean="0"/>
-              <a:t>First level</a:t>
-            </a:r>
-          </a:p>
-          <a:p>
-            <a:pPr lvl="1"/>
-            <a:r>
-              <a:rPr lang="en-US" dirty="0" smtClean="0"/>
-              <a:t>Second level</a:t>
-            </a:r>
-          </a:p>
-          <a:p>
-            <a:pPr lvl="2"/>
-            <a:r>
-              <a:rPr lang="en-US" dirty="0" smtClean="0"/>
-              <a:t>Third level</a:t>
-            </a:r>
-          </a:p>
-        </p:txBody>
-      </p:sp>
+              <a:t>Examples with </a:t>
+            </a:r>
+            <a:r>
+              <a:rPr lang="en-US" dirty="0" err="1" smtClean="0"/>
+              <a:t>Ansible</a:t>
+            </a:r>
+            <a:endParaRPr lang="en-US" dirty="0"/>
+          </a:p>
+        </p:txBody>
+      </p:sp>
+      <p:pic>
+        <p:nvPicPr>
+          <p:cNvPr id="6" name="Picture 5" descr="cloud-supergraphic.png"/>
+          <p:cNvPicPr>
+            <a:picLocks noChangeAspect="1"/>
+          </p:cNvPicPr>
+          <p:nvPr/>
+        </p:nvPicPr>
+        <p:blipFill rotWithShape="1">
+          <a:blip r:embed="rId4" cstate="screen">
+            <a:alphaModFix amt="60000"/>
+            <a:extLst>
+              <a:ext uri="{28A0092B-C50C-407E-A947-70E740481C1C}">
+                <a14:useLocalDpi xmlns:a14="http://schemas.microsoft.com/office/drawing/2010/main"/>
+              </a:ext>
+            </a:extLst>
+          </a:blip>
+          <a:srcRect l="10988" t="23849" b="18011"/>
+          <a:stretch/>
+        </p:blipFill>
+        <p:spPr>
+          <a:xfrm>
+            <a:off x="325640" y="160854"/>
+            <a:ext cx="4934251" cy="2148591"/>
+          </a:xfrm>
+          <a:prstGeom prst="rect">
+            <a:avLst/>
+          </a:prstGeom>
+        </p:spPr>
+      </p:pic>
     </p:spTree>
+    <p:extLst>
+      <p:ext uri="{BB962C8B-B14F-4D97-AF65-F5344CB8AC3E}">
+        <p14:creationId xmlns:p14="http://schemas.microsoft.com/office/powerpoint/2010/main" val="3082143749"/>
+      </p:ext>
+    </p:extLst>
   </p:cSld>
   <p:clrMapOvr>
     <a:masterClrMapping/>
   </p:clrMapOvr>
-  <p:transition xmlns:p14="http://schemas.microsoft.com/office/powerpoint/2010/main" spd="med"/>
   <p:timing>
     <p:tnLst>
       <p:par>
@@ -13709,20 +14148,27 @@
           <a:p>
             <a:r>
               <a:rPr lang="en-US" dirty="0" smtClean="0"/>
-              <a:t>Insert page title </a:t>
-            </a:r>
-            <a:endParaRPr lang="en-US" dirty="0"/>
-          </a:p>
-        </p:txBody>
-      </p:sp>
-      <p:sp>
-        <p:nvSpPr>
-          <p:cNvPr id="4" name="Text Placeholder 3"/>
+              <a:t>Insert page title</a:t>
+            </a:r>
+            <a:br>
+              <a:rPr lang="en-US" dirty="0" smtClean="0"/>
+            </a:br>
+            <a:r>
+              <a:rPr lang="en-US" sz="2400" b="0" dirty="0" smtClean="0"/>
+              <a:t>Subtitle </a:t>
+            </a:r>
+            <a:endParaRPr lang="en-US" sz="2400" b="0" dirty="0"/>
+          </a:p>
+        </p:txBody>
+      </p:sp>
+      <p:sp>
+        <p:nvSpPr>
+          <p:cNvPr id="3" name="Text Placeholder 2"/>
           <p:cNvSpPr>
             <a:spLocks noGrp="1"/>
           </p:cNvSpPr>
           <p:nvPr>
-            <p:ph type="body" sz="quarter" idx="11"/>
+            <p:ph type="body" sz="quarter" idx="10"/>
           </p:nvPr>
         </p:nvSpPr>
         <p:spPr/>
@@ -13749,23 +14195,15 @@
               <a:rPr lang="en-US" dirty="0" smtClean="0"/>
               <a:t>Third level</a:t>
             </a:r>
-            <a:endParaRPr lang="en-US" dirty="0"/>
-          </a:p>
-        </p:txBody>
-      </p:sp>
-      <p:sp>
-        <p:nvSpPr>
-          <p:cNvPr id="5" name="Picture Placeholder 4"/>
-          <p:cNvSpPr>
-            <a:spLocks noGrp="1"/>
-          </p:cNvSpPr>
-          <p:nvPr>
-            <p:ph type="pic" sz="quarter" idx="10"/>
-          </p:nvPr>
-        </p:nvSpPr>
-        <p:spPr/>
+          </a:p>
+        </p:txBody>
       </p:sp>
     </p:spTree>
+    <p:extLst>
+      <p:ext uri="{BB962C8B-B14F-4D97-AF65-F5344CB8AC3E}">
+        <p14:creationId xmlns:p14="http://schemas.microsoft.com/office/powerpoint/2010/main" val="1204106119"/>
+      </p:ext>
+    </p:extLst>
   </p:cSld>
   <p:clrMapOvr>
     <a:masterClrMapping/>
@@ -13815,20 +14253,27 @@
           <a:p>
             <a:r>
               <a:rPr lang="en-US" dirty="0" smtClean="0"/>
-              <a:t>Insert page title </a:t>
-            </a:r>
-            <a:endParaRPr lang="en-US" dirty="0"/>
-          </a:p>
-        </p:txBody>
-      </p:sp>
-      <p:sp>
-        <p:nvSpPr>
-          <p:cNvPr id="4" name="Text Placeholder 3"/>
+              <a:t>Insert page title</a:t>
+            </a:r>
+            <a:br>
+              <a:rPr lang="en-US" dirty="0" smtClean="0"/>
+            </a:br>
+            <a:r>
+              <a:rPr lang="en-US" sz="2400" b="0" dirty="0" smtClean="0"/>
+              <a:t>Subtitle </a:t>
+            </a:r>
+            <a:endParaRPr lang="en-US" sz="2400" b="0" dirty="0"/>
+          </a:p>
+        </p:txBody>
+      </p:sp>
+      <p:sp>
+        <p:nvSpPr>
+          <p:cNvPr id="3" name="Text Placeholder 2"/>
           <p:cNvSpPr>
             <a:spLocks noGrp="1"/>
           </p:cNvSpPr>
           <p:nvPr>
-            <p:ph type="body" sz="quarter" idx="11"/>
+            <p:ph type="body" sz="quarter" idx="10"/>
           </p:nvPr>
         </p:nvSpPr>
         <p:spPr/>
@@ -13856,24 +14301,14 @@
               <a:t>Third level</a:t>
             </a:r>
           </a:p>
-          <a:p>
-            <a:endParaRPr lang="en-US" dirty="0"/>
-          </a:p>
-        </p:txBody>
-      </p:sp>
-      <p:sp>
-        <p:nvSpPr>
-          <p:cNvPr id="5" name="Picture Placeholder 4"/>
-          <p:cNvSpPr>
-            <a:spLocks noGrp="1"/>
-          </p:cNvSpPr>
-          <p:nvPr>
-            <p:ph type="pic" sz="quarter" idx="10"/>
-          </p:nvPr>
-        </p:nvSpPr>
-        <p:spPr/>
+        </p:txBody>
       </p:sp>
     </p:spTree>
+    <p:extLst>
+      <p:ext uri="{BB962C8B-B14F-4D97-AF65-F5344CB8AC3E}">
+        <p14:creationId xmlns:p14="http://schemas.microsoft.com/office/powerpoint/2010/main" val="1204106119"/>
+      </p:ext>
+    </p:extLst>
   </p:cSld>
   <p:clrMapOvr>
     <a:masterClrMapping/>
@@ -13939,7 +14374,12 @@
             <p:ph type="body" sz="quarter" idx="10"/>
           </p:nvPr>
         </p:nvSpPr>
-        <p:spPr/>
+        <p:spPr>
+          <a:xfrm>
+            <a:off x="324000" y="1692392"/>
+            <a:ext cx="11545200" cy="4375620"/>
+          </a:xfrm>
+        </p:spPr>
         <p:txBody>
           <a:bodyPr/>
           <a:lstStyle/>
@@ -14034,9 +14474,18 @@
           <a:p>
             <a:pPr lvl="1"/>
             <a:r>
-              <a:rPr lang="en-US" dirty="0" smtClean="0"/>
-              <a:t>Details</a:t>
-            </a:r>
+              <a:rPr lang="en-US" dirty="0" err="1" smtClean="0"/>
+              <a:t>Ansible</a:t>
+            </a:r>
+            <a:r>
+              <a:rPr lang="en-US" dirty="0"/>
+              <a:t> Tower, Discussion on how to </a:t>
+            </a:r>
+            <a:r>
+              <a:rPr lang="en-US" dirty="0" smtClean="0"/>
+              <a:t>leverage</a:t>
+            </a:r>
+            <a:endParaRPr lang="en-US" dirty="0" smtClean="0"/>
           </a:p>
           <a:p>
             <a:endParaRPr lang="en-US" dirty="0"/>
@@ -14068,14 +14517,46 @@
           <a:chExt cx="0" cy="0"/>
         </a:xfrm>
       </p:grpSpPr>
-      <p:sp>
-        <p:nvSpPr>
-          <p:cNvPr id="2" name="Title 1"/>
+      <p:pic>
+        <p:nvPicPr>
+          <p:cNvPr id="8" name="Picture Placeholder 4" descr="275257_l_srgb_s_gl copy.jpg"/>
+          <p:cNvPicPr>
+            <a:picLocks noGrp="1" noChangeAspect="1"/>
+          </p:cNvPicPr>
+          <p:nvPr>
+            <p:ph type="pic" sz="quarter" idx="11"/>
+          </p:nvPr>
+        </p:nvPicPr>
+        <p:blipFill rotWithShape="1">
+          <a:blip r:embed="rId3" cstate="screen">
+            <a:extLst>
+              <a:ext uri="{28A0092B-C50C-407E-A947-70E740481C1C}">
+                <a14:useLocalDpi xmlns:a14="http://schemas.microsoft.com/office/drawing/2010/main"/>
+              </a:ext>
+            </a:extLst>
+          </a:blip>
+          <a:srcRect/>
+          <a:stretch/>
+        </p:blipFill>
+        <p:spPr bwMode="gray">
+          <a:prstGeom prst="rect">
+            <a:avLst/>
+          </a:prstGeom>
+          <a:solidFill>
+            <a:schemeClr val="bg1">
+              <a:lumMod val="95000"/>
+            </a:schemeClr>
+          </a:solidFill>
+        </p:spPr>
+      </p:pic>
+      <p:sp>
+        <p:nvSpPr>
+          <p:cNvPr id="3" name="Title 2"/>
           <p:cNvSpPr>
             <a:spLocks noGrp="1"/>
           </p:cNvSpPr>
           <p:nvPr>
-            <p:ph type="title"/>
+            <p:ph type="ctrTitle"/>
           </p:nvPr>
         </p:nvSpPr>
         <p:spPr/>
@@ -14085,70 +14566,52 @@
           <a:p>
             <a:r>
               <a:rPr lang="en-US" dirty="0" smtClean="0"/>
-              <a:t>Insert page title </a:t>
+              <a:t>Outlook</a:t>
             </a:r>
             <a:endParaRPr lang="en-US" dirty="0"/>
           </a:p>
         </p:txBody>
       </p:sp>
-      <p:sp>
-        <p:nvSpPr>
-          <p:cNvPr id="4" name="Text Placeholder 3"/>
-          <p:cNvSpPr>
-            <a:spLocks noGrp="1"/>
-          </p:cNvSpPr>
-          <p:nvPr>
-            <p:ph type="body" sz="quarter" idx="11"/>
-          </p:nvPr>
-        </p:nvSpPr>
-        <p:spPr/>
-        <p:txBody>
-          <a:bodyPr/>
-          <a:lstStyle/>
-          <a:p>
-            <a:pPr lvl="0"/>
-            <a:r>
-              <a:rPr lang="en-US" dirty="0" smtClean="0"/>
-              <a:t>First level</a:t>
-            </a:r>
-          </a:p>
-          <a:p>
-            <a:pPr lvl="1"/>
-            <a:r>
-              <a:rPr lang="en-US" dirty="0" smtClean="0"/>
-              <a:t>Second level</a:t>
-            </a:r>
-          </a:p>
-          <a:p>
-            <a:pPr lvl="2"/>
-            <a:r>
-              <a:rPr lang="en-US" dirty="0" smtClean="0"/>
-              <a:t>Third level</a:t>
-            </a:r>
-          </a:p>
-          <a:p>
-            <a:endParaRPr lang="en-US" dirty="0"/>
-          </a:p>
-        </p:txBody>
-      </p:sp>
-      <p:sp>
-        <p:nvSpPr>
-          <p:cNvPr id="5" name="Picture Placeholder 4"/>
-          <p:cNvSpPr>
-            <a:spLocks noGrp="1"/>
-          </p:cNvSpPr>
-          <p:nvPr>
-            <p:ph type="pic" sz="quarter" idx="10"/>
-          </p:nvPr>
-        </p:nvSpPr>
-        <p:spPr/>
-      </p:sp>
+      <p:pic>
+        <p:nvPicPr>
+          <p:cNvPr id="6" name="Picture 5" descr="cloud-supergraphic.png"/>
+          <p:cNvPicPr>
+            <a:picLocks noChangeAspect="1"/>
+          </p:cNvPicPr>
+          <p:nvPr/>
+        </p:nvPicPr>
+        <p:blipFill rotWithShape="1">
+          <a:blip r:embed="rId4" cstate="screen">
+            <a:alphaModFix amt="60000"/>
+            <a:extLst>
+              <a:ext uri="{28A0092B-C50C-407E-A947-70E740481C1C}">
+                <a14:useLocalDpi xmlns:a14="http://schemas.microsoft.com/office/drawing/2010/main"/>
+              </a:ext>
+            </a:extLst>
+          </a:blip>
+          <a:srcRect l="10988" t="23849" b="18011"/>
+          <a:stretch/>
+        </p:blipFill>
+        <p:spPr>
+          <a:xfrm>
+            <a:off x="325640" y="160854"/>
+            <a:ext cx="4934251" cy="2148591"/>
+          </a:xfrm>
+          <a:prstGeom prst="rect">
+            <a:avLst/>
+          </a:prstGeom>
+        </p:spPr>
+      </p:pic>
     </p:spTree>
+    <p:extLst>
+      <p:ext uri="{BB962C8B-B14F-4D97-AF65-F5344CB8AC3E}">
+        <p14:creationId xmlns:p14="http://schemas.microsoft.com/office/powerpoint/2010/main" val="3082143749"/>
+      </p:ext>
+    </p:extLst>
   </p:cSld>
   <p:clrMapOvr>
     <a:masterClrMapping/>
   </p:clrMapOvr>
-  <p:transition xmlns:p14="http://schemas.microsoft.com/office/powerpoint/2010/main" spd="med"/>
   <p:timing>
     <p:tnLst>
       <p:par>
@@ -14178,7 +14641,7 @@
       </p:grpSpPr>
       <p:sp>
         <p:nvSpPr>
-          <p:cNvPr id="24" name="Title 23"/>
+          <p:cNvPr id="2" name="Title 1"/>
           <p:cNvSpPr>
             <a:spLocks noGrp="1"/>
           </p:cNvSpPr>
@@ -14193,9 +14656,16 @@
           <a:p>
             <a:r>
               <a:rPr lang="en-US" dirty="0" smtClean="0"/>
-              <a:t>Insert page title </a:t>
-            </a:r>
-            <a:endParaRPr lang="en-US" b="0" dirty="0"/>
+              <a:t>Insert page title</a:t>
+            </a:r>
+            <a:br>
+              <a:rPr lang="en-US" dirty="0" smtClean="0"/>
+            </a:br>
+            <a:r>
+              <a:rPr lang="en-US" sz="2400" b="0" dirty="0" smtClean="0"/>
+              <a:t>Subtitle </a:t>
+            </a:r>
+            <a:endParaRPr lang="en-US" sz="2400" b="0" dirty="0"/>
           </a:p>
         </p:txBody>
       </p:sp>
@@ -14214,256 +14684,27 @@
           <a:bodyPr/>
           <a:lstStyle/>
           <a:p>
-            <a:r>
-              <a:rPr lang="en-US" dirty="0" smtClean="0"/>
-              <a:t>Headline here</a:t>
+            <a:pPr lvl="0"/>
+            <a:r>
+              <a:rPr lang="en-US" dirty="0" smtClean="0"/>
+              <a:t>First level</a:t>
             </a:r>
           </a:p>
           <a:p>
             <a:pPr lvl="1"/>
             <a:r>
-              <a:rPr lang="en-US" dirty="0" err="1" smtClean="0"/>
-              <a:t>Lorem</a:t>
-            </a:r>
-            <a:r>
-              <a:rPr lang="en-US" dirty="0" smtClean="0"/>
-              <a:t> </a:t>
-            </a:r>
-            <a:r>
-              <a:rPr lang="en-US" dirty="0" err="1" smtClean="0"/>
-              <a:t>ipsum</a:t>
-            </a:r>
-            <a:r>
-              <a:rPr lang="en-US" dirty="0" smtClean="0"/>
-              <a:t> dolor sit </a:t>
-            </a:r>
-            <a:r>
-              <a:rPr lang="en-US" dirty="0" err="1" smtClean="0"/>
-              <a:t>amet</a:t>
-            </a:r>
-            <a:r>
-              <a:rPr lang="en-US" dirty="0" smtClean="0"/>
-              <a:t>, </a:t>
-            </a:r>
-            <a:r>
-              <a:rPr lang="en-US" dirty="0" err="1" smtClean="0"/>
-              <a:t>consectetur</a:t>
-            </a:r>
-            <a:r>
-              <a:rPr lang="en-US" dirty="0" smtClean="0"/>
-              <a:t> </a:t>
-            </a:r>
-            <a:r>
-              <a:rPr lang="en-US" dirty="0" err="1" smtClean="0"/>
-              <a:t>adipiscing</a:t>
-            </a:r>
-            <a:r>
-              <a:rPr lang="en-US" dirty="0" smtClean="0"/>
-              <a:t> </a:t>
-            </a:r>
-            <a:r>
-              <a:rPr lang="en-US" dirty="0" err="1" smtClean="0"/>
-              <a:t>elit</a:t>
-            </a:r>
-            <a:r>
-              <a:rPr lang="en-US" dirty="0" smtClean="0"/>
-              <a:t>. Maecenas </a:t>
-            </a:r>
-            <a:r>
-              <a:rPr lang="en-US" dirty="0" err="1" smtClean="0"/>
-              <a:t>pellentesque</a:t>
-            </a:r>
-            <a:r>
-              <a:rPr lang="en-US" dirty="0" smtClean="0"/>
-              <a:t> </a:t>
-            </a:r>
-            <a:r>
-              <a:rPr lang="en-US" dirty="0" err="1" smtClean="0"/>
-              <a:t>laoreet</a:t>
-            </a:r>
-            <a:r>
-              <a:rPr lang="en-US" dirty="0" smtClean="0"/>
-              <a:t> </a:t>
-            </a:r>
-            <a:r>
-              <a:rPr lang="en-US" dirty="0" err="1" smtClean="0"/>
-              <a:t>urna</a:t>
-            </a:r>
-            <a:r>
-              <a:rPr lang="en-US" dirty="0" smtClean="0"/>
-              <a:t> </a:t>
-            </a:r>
-            <a:r>
-              <a:rPr lang="en-US" dirty="0" err="1" smtClean="0"/>
-              <a:t>molestie</a:t>
-            </a:r>
-            <a:r>
-              <a:rPr lang="en-US" dirty="0" smtClean="0"/>
-              <a:t> </a:t>
-            </a:r>
-            <a:r>
-              <a:rPr lang="en-US" dirty="0" err="1" smtClean="0"/>
-              <a:t>placerat</a:t>
-            </a:r>
-            <a:r>
-              <a:rPr lang="en-US" dirty="0" smtClean="0"/>
-              <a:t> </a:t>
-            </a:r>
-            <a:r>
-              <a:rPr lang="en-US" dirty="0" err="1" smtClean="0"/>
-              <a:t>ipsum</a:t>
-            </a:r>
-            <a:r>
-              <a:rPr lang="en-US" dirty="0" smtClean="0"/>
-              <a:t>.</a:t>
-            </a:r>
-          </a:p>
-        </p:txBody>
-      </p:sp>
-      <p:sp>
-        <p:nvSpPr>
-          <p:cNvPr id="4" name="Text Placeholder 3"/>
-          <p:cNvSpPr>
-            <a:spLocks noGrp="1"/>
-          </p:cNvSpPr>
-          <p:nvPr>
-            <p:ph type="body" sz="quarter" idx="14"/>
-          </p:nvPr>
-        </p:nvSpPr>
-        <p:spPr/>
-        <p:txBody>
-          <a:bodyPr/>
-          <a:lstStyle/>
-          <a:p>
-            <a:r>
-              <a:rPr lang="en-US" dirty="0" smtClean="0"/>
-              <a:t>Headline here</a:t>
-            </a:r>
-          </a:p>
-          <a:p>
-            <a:pPr lvl="1"/>
-            <a:r>
-              <a:rPr lang="en-US" dirty="0" err="1" smtClean="0"/>
-              <a:t>Lorem</a:t>
-            </a:r>
-            <a:r>
-              <a:rPr lang="en-US" dirty="0" smtClean="0"/>
-              <a:t> </a:t>
-            </a:r>
-            <a:r>
-              <a:rPr lang="en-US" dirty="0" err="1" smtClean="0"/>
-              <a:t>ipsum</a:t>
-            </a:r>
-            <a:r>
-              <a:rPr lang="en-US" dirty="0" smtClean="0"/>
-              <a:t> dolor sit </a:t>
-            </a:r>
-            <a:r>
-              <a:rPr lang="en-US" dirty="0" err="1" smtClean="0"/>
-              <a:t>amet</a:t>
-            </a:r>
-            <a:r>
-              <a:rPr lang="en-US" dirty="0" smtClean="0"/>
-              <a:t>, </a:t>
-            </a:r>
-            <a:r>
-              <a:rPr lang="en-US" dirty="0" err="1" smtClean="0"/>
-              <a:t>consectetur</a:t>
-            </a:r>
-            <a:r>
-              <a:rPr lang="en-US" dirty="0" smtClean="0"/>
-              <a:t> </a:t>
-            </a:r>
-            <a:r>
-              <a:rPr lang="en-US" dirty="0" err="1" smtClean="0"/>
-              <a:t>adipiscing</a:t>
-            </a:r>
-            <a:r>
-              <a:rPr lang="en-US" dirty="0" smtClean="0"/>
-              <a:t> </a:t>
-            </a:r>
-            <a:r>
-              <a:rPr lang="en-US" dirty="0" err="1" smtClean="0"/>
-              <a:t>elit</a:t>
-            </a:r>
-            <a:r>
-              <a:rPr lang="en-US" dirty="0" smtClean="0"/>
-              <a:t>. Maecenas </a:t>
-            </a:r>
-            <a:r>
-              <a:rPr lang="en-US" dirty="0" err="1" smtClean="0"/>
-              <a:t>pellentesque</a:t>
-            </a:r>
-            <a:r>
-              <a:rPr lang="en-US" dirty="0" smtClean="0"/>
-              <a:t> </a:t>
-            </a:r>
-            <a:r>
-              <a:rPr lang="en-US" dirty="0" err="1" smtClean="0"/>
-              <a:t>laoreet</a:t>
-            </a:r>
-            <a:r>
-              <a:rPr lang="en-US" dirty="0" smtClean="0"/>
-              <a:t> </a:t>
-            </a:r>
-            <a:r>
-              <a:rPr lang="en-US" dirty="0" err="1" smtClean="0"/>
-              <a:t>urna</a:t>
-            </a:r>
-            <a:r>
-              <a:rPr lang="en-US" dirty="0" smtClean="0"/>
-              <a:t> </a:t>
-            </a:r>
-            <a:r>
-              <a:rPr lang="en-US" dirty="0" err="1" smtClean="0"/>
-              <a:t>molestie</a:t>
-            </a:r>
-            <a:r>
-              <a:rPr lang="en-US" dirty="0" smtClean="0"/>
-              <a:t> </a:t>
-            </a:r>
-            <a:r>
-              <a:rPr lang="en-US" dirty="0" err="1" smtClean="0"/>
-              <a:t>placerat</a:t>
-            </a:r>
-            <a:r>
-              <a:rPr lang="en-US" dirty="0" smtClean="0"/>
-              <a:t> </a:t>
-            </a:r>
-            <a:r>
-              <a:rPr lang="en-US" dirty="0" err="1" smtClean="0"/>
-              <a:t>ipsum</a:t>
-            </a:r>
-            <a:r>
-              <a:rPr lang="en-US" dirty="0" smtClean="0"/>
-              <a:t>.</a:t>
-            </a:r>
-          </a:p>
-        </p:txBody>
-      </p:sp>
-      <p:sp>
-        <p:nvSpPr>
-          <p:cNvPr id="7" name="Picture Placeholder 6"/>
-          <p:cNvSpPr>
-            <a:spLocks noGrp="1"/>
-          </p:cNvSpPr>
-          <p:nvPr>
-            <p:ph type="pic" sz="quarter" idx="15"/>
-          </p:nvPr>
-        </p:nvSpPr>
-        <p:spPr/>
-      </p:sp>
-      <p:sp>
-        <p:nvSpPr>
-          <p:cNvPr id="9" name="Picture Placeholder 8"/>
-          <p:cNvSpPr>
-            <a:spLocks noGrp="1"/>
-          </p:cNvSpPr>
-          <p:nvPr>
-            <p:ph type="pic" sz="quarter" idx="16"/>
-          </p:nvPr>
-        </p:nvSpPr>
-        <p:spPr/>
+              <a:rPr lang="en-US" dirty="0" smtClean="0"/>
+              <a:t>Second level</a:t>
+            </a:r>
+          </a:p>
+          <a:p>
+            <a:pPr lvl="2"/>
+            <a:r>
+              <a:rPr lang="en-US" dirty="0" smtClean="0"/>
+              <a:t>Third level</a:t>
+            </a:r>
+          </a:p>
+        </p:txBody>
       </p:sp>
     </p:spTree>
   </p:cSld>
@@ -14500,6 +14741,650 @@
       </p:grpSpPr>
       <p:sp>
         <p:nvSpPr>
+          <p:cNvPr id="2" name="Title 1"/>
+          <p:cNvSpPr>
+            <a:spLocks noGrp="1"/>
+          </p:cNvSpPr>
+          <p:nvPr>
+            <p:ph type="title"/>
+          </p:nvPr>
+        </p:nvSpPr>
+        <p:spPr/>
+        <p:txBody>
+          <a:bodyPr/>
+          <a:lstStyle/>
+          <a:p>
+            <a:r>
+              <a:rPr lang="en-US" dirty="0" smtClean="0"/>
+              <a:t>Insert page title </a:t>
+            </a:r>
+            <a:endParaRPr lang="en-US" dirty="0"/>
+          </a:p>
+        </p:txBody>
+      </p:sp>
+      <p:sp>
+        <p:nvSpPr>
+          <p:cNvPr id="4" name="Text Placeholder 3"/>
+          <p:cNvSpPr>
+            <a:spLocks noGrp="1"/>
+          </p:cNvSpPr>
+          <p:nvPr>
+            <p:ph type="body" sz="quarter" idx="11"/>
+          </p:nvPr>
+        </p:nvSpPr>
+        <p:spPr/>
+        <p:txBody>
+          <a:bodyPr/>
+          <a:lstStyle/>
+          <a:p>
+            <a:pPr lvl="0"/>
+            <a:r>
+              <a:rPr lang="en-US" dirty="0" smtClean="0"/>
+              <a:t>First level</a:t>
+            </a:r>
+          </a:p>
+          <a:p>
+            <a:pPr lvl="1"/>
+            <a:r>
+              <a:rPr lang="en-US" dirty="0" smtClean="0"/>
+              <a:t>Second level</a:t>
+            </a:r>
+          </a:p>
+          <a:p>
+            <a:pPr lvl="2"/>
+            <a:r>
+              <a:rPr lang="en-US" dirty="0" smtClean="0"/>
+              <a:t>Third level</a:t>
+            </a:r>
+            <a:endParaRPr lang="en-US" dirty="0"/>
+          </a:p>
+        </p:txBody>
+      </p:sp>
+      <p:sp>
+        <p:nvSpPr>
+          <p:cNvPr id="5" name="Picture Placeholder 4"/>
+          <p:cNvSpPr>
+            <a:spLocks noGrp="1"/>
+          </p:cNvSpPr>
+          <p:nvPr>
+            <p:ph type="pic" sz="quarter" idx="10"/>
+          </p:nvPr>
+        </p:nvSpPr>
+        <p:spPr/>
+      </p:sp>
+    </p:spTree>
+  </p:cSld>
+  <p:clrMapOvr>
+    <a:masterClrMapping/>
+  </p:clrMapOvr>
+  <p:transition xmlns:p14="http://schemas.microsoft.com/office/powerpoint/2010/main" spd="med"/>
+  <p:timing>
+    <p:tnLst>
+      <p:par>
+        <p:cTn xmlns:p14="http://schemas.microsoft.com/office/powerpoint/2010/main" id="1" dur="indefinite" restart="never" nodeType="tmRoot"/>
+      </p:par>
+    </p:tnLst>
+  </p:timing>
+</p:sld>
+</file>
+
+<file path=ppt/slides/slide23.xml><?xml version="1.0" encoding="utf-8"?>
+<p:sld xmlns:a="http://schemas.openxmlformats.org/drawingml/2006/main" xmlns:r="http://schemas.openxmlformats.org/officeDocument/2006/relationships" xmlns:p="http://schemas.openxmlformats.org/presentationml/2006/main">
+  <p:cSld>
+    <p:spTree>
+      <p:nvGrpSpPr>
+        <p:cNvPr id="1" name=""/>
+        <p:cNvGrpSpPr/>
+        <p:nvPr/>
+      </p:nvGrpSpPr>
+      <p:grpSpPr>
+        <a:xfrm>
+          <a:off x="0" y="0"/>
+          <a:ext cx="0" cy="0"/>
+          <a:chOff x="0" y="0"/>
+          <a:chExt cx="0" cy="0"/>
+        </a:xfrm>
+      </p:grpSpPr>
+      <p:sp>
+        <p:nvSpPr>
+          <p:cNvPr id="2" name="Title 1"/>
+          <p:cNvSpPr>
+            <a:spLocks noGrp="1"/>
+          </p:cNvSpPr>
+          <p:nvPr>
+            <p:ph type="title"/>
+          </p:nvPr>
+        </p:nvSpPr>
+        <p:spPr/>
+        <p:txBody>
+          <a:bodyPr/>
+          <a:lstStyle/>
+          <a:p>
+            <a:r>
+              <a:rPr lang="en-US" dirty="0" smtClean="0"/>
+              <a:t>Insert page title </a:t>
+            </a:r>
+            <a:endParaRPr lang="en-US" dirty="0"/>
+          </a:p>
+        </p:txBody>
+      </p:sp>
+      <p:sp>
+        <p:nvSpPr>
+          <p:cNvPr id="4" name="Text Placeholder 3"/>
+          <p:cNvSpPr>
+            <a:spLocks noGrp="1"/>
+          </p:cNvSpPr>
+          <p:nvPr>
+            <p:ph type="body" sz="quarter" idx="11"/>
+          </p:nvPr>
+        </p:nvSpPr>
+        <p:spPr/>
+        <p:txBody>
+          <a:bodyPr/>
+          <a:lstStyle/>
+          <a:p>
+            <a:pPr lvl="0"/>
+            <a:r>
+              <a:rPr lang="en-US" dirty="0" smtClean="0"/>
+              <a:t>First level</a:t>
+            </a:r>
+          </a:p>
+          <a:p>
+            <a:pPr lvl="1"/>
+            <a:r>
+              <a:rPr lang="en-US" dirty="0" smtClean="0"/>
+              <a:t>Second level</a:t>
+            </a:r>
+          </a:p>
+          <a:p>
+            <a:pPr lvl="2"/>
+            <a:r>
+              <a:rPr lang="en-US" dirty="0" smtClean="0"/>
+              <a:t>Third level</a:t>
+            </a:r>
+          </a:p>
+          <a:p>
+            <a:endParaRPr lang="en-US" dirty="0"/>
+          </a:p>
+        </p:txBody>
+      </p:sp>
+      <p:sp>
+        <p:nvSpPr>
+          <p:cNvPr id="5" name="Picture Placeholder 4"/>
+          <p:cNvSpPr>
+            <a:spLocks noGrp="1"/>
+          </p:cNvSpPr>
+          <p:nvPr>
+            <p:ph type="pic" sz="quarter" idx="10"/>
+          </p:nvPr>
+        </p:nvSpPr>
+        <p:spPr/>
+      </p:sp>
+    </p:spTree>
+  </p:cSld>
+  <p:clrMapOvr>
+    <a:masterClrMapping/>
+  </p:clrMapOvr>
+  <p:transition xmlns:p14="http://schemas.microsoft.com/office/powerpoint/2010/main" spd="med"/>
+  <p:timing>
+    <p:tnLst>
+      <p:par>
+        <p:cTn xmlns:p14="http://schemas.microsoft.com/office/powerpoint/2010/main" id="1" dur="indefinite" restart="never" nodeType="tmRoot"/>
+      </p:par>
+    </p:tnLst>
+  </p:timing>
+</p:sld>
+</file>
+
+<file path=ppt/slides/slide24.xml><?xml version="1.0" encoding="utf-8"?>
+<p:sld xmlns:a="http://schemas.openxmlformats.org/drawingml/2006/main" xmlns:r="http://schemas.openxmlformats.org/officeDocument/2006/relationships" xmlns:p="http://schemas.openxmlformats.org/presentationml/2006/main">
+  <p:cSld>
+    <p:spTree>
+      <p:nvGrpSpPr>
+        <p:cNvPr id="1" name=""/>
+        <p:cNvGrpSpPr/>
+        <p:nvPr/>
+      </p:nvGrpSpPr>
+      <p:grpSpPr>
+        <a:xfrm>
+          <a:off x="0" y="0"/>
+          <a:ext cx="0" cy="0"/>
+          <a:chOff x="0" y="0"/>
+          <a:chExt cx="0" cy="0"/>
+        </a:xfrm>
+      </p:grpSpPr>
+      <p:sp>
+        <p:nvSpPr>
+          <p:cNvPr id="2" name="Title 1"/>
+          <p:cNvSpPr>
+            <a:spLocks noGrp="1"/>
+          </p:cNvSpPr>
+          <p:nvPr>
+            <p:ph type="title"/>
+          </p:nvPr>
+        </p:nvSpPr>
+        <p:spPr/>
+        <p:txBody>
+          <a:bodyPr/>
+          <a:lstStyle/>
+          <a:p>
+            <a:r>
+              <a:rPr lang="en-US" dirty="0" smtClean="0"/>
+              <a:t>Insert page title </a:t>
+            </a:r>
+            <a:endParaRPr lang="en-US" dirty="0"/>
+          </a:p>
+        </p:txBody>
+      </p:sp>
+      <p:sp>
+        <p:nvSpPr>
+          <p:cNvPr id="4" name="Text Placeholder 3"/>
+          <p:cNvSpPr>
+            <a:spLocks noGrp="1"/>
+          </p:cNvSpPr>
+          <p:nvPr>
+            <p:ph type="body" sz="quarter" idx="11"/>
+          </p:nvPr>
+        </p:nvSpPr>
+        <p:spPr/>
+        <p:txBody>
+          <a:bodyPr/>
+          <a:lstStyle/>
+          <a:p>
+            <a:pPr lvl="0"/>
+            <a:r>
+              <a:rPr lang="en-US" dirty="0" smtClean="0"/>
+              <a:t>First level</a:t>
+            </a:r>
+          </a:p>
+          <a:p>
+            <a:pPr lvl="1"/>
+            <a:r>
+              <a:rPr lang="en-US" dirty="0" smtClean="0"/>
+              <a:t>Second level</a:t>
+            </a:r>
+          </a:p>
+          <a:p>
+            <a:pPr lvl="2"/>
+            <a:r>
+              <a:rPr lang="en-US" dirty="0" smtClean="0"/>
+              <a:t>Third level</a:t>
+            </a:r>
+          </a:p>
+          <a:p>
+            <a:endParaRPr lang="en-US" dirty="0"/>
+          </a:p>
+        </p:txBody>
+      </p:sp>
+      <p:sp>
+        <p:nvSpPr>
+          <p:cNvPr id="5" name="Picture Placeholder 4"/>
+          <p:cNvSpPr>
+            <a:spLocks noGrp="1"/>
+          </p:cNvSpPr>
+          <p:nvPr>
+            <p:ph type="pic" sz="quarter" idx="10"/>
+          </p:nvPr>
+        </p:nvSpPr>
+        <p:spPr/>
+      </p:sp>
+    </p:spTree>
+  </p:cSld>
+  <p:clrMapOvr>
+    <a:masterClrMapping/>
+  </p:clrMapOvr>
+  <p:transition xmlns:p14="http://schemas.microsoft.com/office/powerpoint/2010/main" spd="med"/>
+  <p:timing>
+    <p:tnLst>
+      <p:par>
+        <p:cTn xmlns:p14="http://schemas.microsoft.com/office/powerpoint/2010/main" id="1" dur="indefinite" restart="never" nodeType="tmRoot"/>
+      </p:par>
+    </p:tnLst>
+  </p:timing>
+</p:sld>
+</file>
+
+<file path=ppt/slides/slide25.xml><?xml version="1.0" encoding="utf-8"?>
+<p:sld xmlns:a="http://schemas.openxmlformats.org/drawingml/2006/main" xmlns:r="http://schemas.openxmlformats.org/officeDocument/2006/relationships" xmlns:p="http://schemas.openxmlformats.org/presentationml/2006/main">
+  <p:cSld>
+    <p:spTree>
+      <p:nvGrpSpPr>
+        <p:cNvPr id="1" name=""/>
+        <p:cNvGrpSpPr/>
+        <p:nvPr/>
+      </p:nvGrpSpPr>
+      <p:grpSpPr>
+        <a:xfrm>
+          <a:off x="0" y="0"/>
+          <a:ext cx="0" cy="0"/>
+          <a:chOff x="0" y="0"/>
+          <a:chExt cx="0" cy="0"/>
+        </a:xfrm>
+      </p:grpSpPr>
+      <p:sp>
+        <p:nvSpPr>
+          <p:cNvPr id="24" name="Title 23"/>
+          <p:cNvSpPr>
+            <a:spLocks noGrp="1"/>
+          </p:cNvSpPr>
+          <p:nvPr>
+            <p:ph type="title"/>
+          </p:nvPr>
+        </p:nvSpPr>
+        <p:spPr/>
+        <p:txBody>
+          <a:bodyPr/>
+          <a:lstStyle/>
+          <a:p>
+            <a:r>
+              <a:rPr lang="en-US" dirty="0" smtClean="0"/>
+              <a:t>Insert page title </a:t>
+            </a:r>
+            <a:endParaRPr lang="en-US" b="0" dirty="0"/>
+          </a:p>
+        </p:txBody>
+      </p:sp>
+      <p:sp>
+        <p:nvSpPr>
+          <p:cNvPr id="3" name="Text Placeholder 2"/>
+          <p:cNvSpPr>
+            <a:spLocks noGrp="1"/>
+          </p:cNvSpPr>
+          <p:nvPr>
+            <p:ph type="body" sz="quarter" idx="10"/>
+          </p:nvPr>
+        </p:nvSpPr>
+        <p:spPr/>
+        <p:txBody>
+          <a:bodyPr/>
+          <a:lstStyle/>
+          <a:p>
+            <a:r>
+              <a:rPr lang="en-US" dirty="0" smtClean="0"/>
+              <a:t>Headline here</a:t>
+            </a:r>
+          </a:p>
+          <a:p>
+            <a:pPr lvl="1"/>
+            <a:r>
+              <a:rPr lang="en-US" dirty="0" err="1" smtClean="0"/>
+              <a:t>Lorem</a:t>
+            </a:r>
+            <a:r>
+              <a:rPr lang="en-US" dirty="0" smtClean="0"/>
+              <a:t> </a:t>
+            </a:r>
+            <a:r>
+              <a:rPr lang="en-US" dirty="0" err="1" smtClean="0"/>
+              <a:t>ipsum</a:t>
+            </a:r>
+            <a:r>
+              <a:rPr lang="en-US" dirty="0" smtClean="0"/>
+              <a:t> dolor sit </a:t>
+            </a:r>
+            <a:r>
+              <a:rPr lang="en-US" dirty="0" err="1" smtClean="0"/>
+              <a:t>amet</a:t>
+            </a:r>
+            <a:r>
+              <a:rPr lang="en-US" dirty="0" smtClean="0"/>
+              <a:t>, </a:t>
+            </a:r>
+            <a:r>
+              <a:rPr lang="en-US" dirty="0" err="1" smtClean="0"/>
+              <a:t>consectetur</a:t>
+            </a:r>
+            <a:r>
+              <a:rPr lang="en-US" dirty="0" smtClean="0"/>
+              <a:t> </a:t>
+            </a:r>
+            <a:r>
+              <a:rPr lang="en-US" dirty="0" err="1" smtClean="0"/>
+              <a:t>adipiscing</a:t>
+            </a:r>
+            <a:r>
+              <a:rPr lang="en-US" dirty="0" smtClean="0"/>
+              <a:t> </a:t>
+            </a:r>
+            <a:r>
+              <a:rPr lang="en-US" dirty="0" err="1" smtClean="0"/>
+              <a:t>elit</a:t>
+            </a:r>
+            <a:r>
+              <a:rPr lang="en-US" dirty="0" smtClean="0"/>
+              <a:t>. Maecenas </a:t>
+            </a:r>
+            <a:r>
+              <a:rPr lang="en-US" dirty="0" err="1" smtClean="0"/>
+              <a:t>pellentesque</a:t>
+            </a:r>
+            <a:r>
+              <a:rPr lang="en-US" dirty="0" smtClean="0"/>
+              <a:t> </a:t>
+            </a:r>
+            <a:r>
+              <a:rPr lang="en-US" dirty="0" err="1" smtClean="0"/>
+              <a:t>laoreet</a:t>
+            </a:r>
+            <a:r>
+              <a:rPr lang="en-US" dirty="0" smtClean="0"/>
+              <a:t> </a:t>
+            </a:r>
+            <a:r>
+              <a:rPr lang="en-US" dirty="0" err="1" smtClean="0"/>
+              <a:t>urna</a:t>
+            </a:r>
+            <a:r>
+              <a:rPr lang="en-US" dirty="0" smtClean="0"/>
+              <a:t> </a:t>
+            </a:r>
+            <a:r>
+              <a:rPr lang="en-US" dirty="0" err="1" smtClean="0"/>
+              <a:t>molestie</a:t>
+            </a:r>
+            <a:r>
+              <a:rPr lang="en-US" dirty="0" smtClean="0"/>
+              <a:t> </a:t>
+            </a:r>
+            <a:r>
+              <a:rPr lang="en-US" dirty="0" err="1" smtClean="0"/>
+              <a:t>placerat</a:t>
+            </a:r>
+            <a:r>
+              <a:rPr lang="en-US" dirty="0" smtClean="0"/>
+              <a:t> </a:t>
+            </a:r>
+            <a:r>
+              <a:rPr lang="en-US" dirty="0" err="1" smtClean="0"/>
+              <a:t>ipsum</a:t>
+            </a:r>
+            <a:r>
+              <a:rPr lang="en-US" dirty="0" smtClean="0"/>
+              <a:t>.</a:t>
+            </a:r>
+          </a:p>
+        </p:txBody>
+      </p:sp>
+      <p:sp>
+        <p:nvSpPr>
+          <p:cNvPr id="4" name="Text Placeholder 3"/>
+          <p:cNvSpPr>
+            <a:spLocks noGrp="1"/>
+          </p:cNvSpPr>
+          <p:nvPr>
+            <p:ph type="body" sz="quarter" idx="14"/>
+          </p:nvPr>
+        </p:nvSpPr>
+        <p:spPr/>
+        <p:txBody>
+          <a:bodyPr/>
+          <a:lstStyle/>
+          <a:p>
+            <a:r>
+              <a:rPr lang="en-US" dirty="0" smtClean="0"/>
+              <a:t>Headline here</a:t>
+            </a:r>
+          </a:p>
+          <a:p>
+            <a:pPr lvl="1"/>
+            <a:r>
+              <a:rPr lang="en-US" dirty="0" err="1" smtClean="0"/>
+              <a:t>Lorem</a:t>
+            </a:r>
+            <a:r>
+              <a:rPr lang="en-US" dirty="0" smtClean="0"/>
+              <a:t> </a:t>
+            </a:r>
+            <a:r>
+              <a:rPr lang="en-US" dirty="0" err="1" smtClean="0"/>
+              <a:t>ipsum</a:t>
+            </a:r>
+            <a:r>
+              <a:rPr lang="en-US" dirty="0" smtClean="0"/>
+              <a:t> dolor sit </a:t>
+            </a:r>
+            <a:r>
+              <a:rPr lang="en-US" dirty="0" err="1" smtClean="0"/>
+              <a:t>amet</a:t>
+            </a:r>
+            <a:r>
+              <a:rPr lang="en-US" dirty="0" smtClean="0"/>
+              <a:t>, </a:t>
+            </a:r>
+            <a:r>
+              <a:rPr lang="en-US" dirty="0" err="1" smtClean="0"/>
+              <a:t>consectetur</a:t>
+            </a:r>
+            <a:r>
+              <a:rPr lang="en-US" dirty="0" smtClean="0"/>
+              <a:t> </a:t>
+            </a:r>
+            <a:r>
+              <a:rPr lang="en-US" dirty="0" err="1" smtClean="0"/>
+              <a:t>adipiscing</a:t>
+            </a:r>
+            <a:r>
+              <a:rPr lang="en-US" dirty="0" smtClean="0"/>
+              <a:t> </a:t>
+            </a:r>
+            <a:r>
+              <a:rPr lang="en-US" dirty="0" err="1" smtClean="0"/>
+              <a:t>elit</a:t>
+            </a:r>
+            <a:r>
+              <a:rPr lang="en-US" dirty="0" smtClean="0"/>
+              <a:t>. Maecenas </a:t>
+            </a:r>
+            <a:r>
+              <a:rPr lang="en-US" dirty="0" err="1" smtClean="0"/>
+              <a:t>pellentesque</a:t>
+            </a:r>
+            <a:r>
+              <a:rPr lang="en-US" dirty="0" smtClean="0"/>
+              <a:t> </a:t>
+            </a:r>
+            <a:r>
+              <a:rPr lang="en-US" dirty="0" err="1" smtClean="0"/>
+              <a:t>laoreet</a:t>
+            </a:r>
+            <a:r>
+              <a:rPr lang="en-US" dirty="0" smtClean="0"/>
+              <a:t> </a:t>
+            </a:r>
+            <a:r>
+              <a:rPr lang="en-US" dirty="0" err="1" smtClean="0"/>
+              <a:t>urna</a:t>
+            </a:r>
+            <a:r>
+              <a:rPr lang="en-US" dirty="0" smtClean="0"/>
+              <a:t> </a:t>
+            </a:r>
+            <a:r>
+              <a:rPr lang="en-US" dirty="0" err="1" smtClean="0"/>
+              <a:t>molestie</a:t>
+            </a:r>
+            <a:r>
+              <a:rPr lang="en-US" dirty="0" smtClean="0"/>
+              <a:t> </a:t>
+            </a:r>
+            <a:r>
+              <a:rPr lang="en-US" dirty="0" err="1" smtClean="0"/>
+              <a:t>placerat</a:t>
+            </a:r>
+            <a:r>
+              <a:rPr lang="en-US" dirty="0" smtClean="0"/>
+              <a:t> </a:t>
+            </a:r>
+            <a:r>
+              <a:rPr lang="en-US" dirty="0" err="1" smtClean="0"/>
+              <a:t>ipsum</a:t>
+            </a:r>
+            <a:r>
+              <a:rPr lang="en-US" dirty="0" smtClean="0"/>
+              <a:t>.</a:t>
+            </a:r>
+          </a:p>
+        </p:txBody>
+      </p:sp>
+      <p:sp>
+        <p:nvSpPr>
+          <p:cNvPr id="7" name="Picture Placeholder 6"/>
+          <p:cNvSpPr>
+            <a:spLocks noGrp="1"/>
+          </p:cNvSpPr>
+          <p:nvPr>
+            <p:ph type="pic" sz="quarter" idx="15"/>
+          </p:nvPr>
+        </p:nvSpPr>
+        <p:spPr/>
+      </p:sp>
+      <p:sp>
+        <p:nvSpPr>
+          <p:cNvPr id="9" name="Picture Placeholder 8"/>
+          <p:cNvSpPr>
+            <a:spLocks noGrp="1"/>
+          </p:cNvSpPr>
+          <p:nvPr>
+            <p:ph type="pic" sz="quarter" idx="16"/>
+          </p:nvPr>
+        </p:nvSpPr>
+        <p:spPr/>
+      </p:sp>
+    </p:spTree>
+  </p:cSld>
+  <p:clrMapOvr>
+    <a:masterClrMapping/>
+  </p:clrMapOvr>
+  <p:transition xmlns:p14="http://schemas.microsoft.com/office/powerpoint/2010/main" spd="med"/>
+  <p:timing>
+    <p:tnLst>
+      <p:par>
+        <p:cTn xmlns:p14="http://schemas.microsoft.com/office/powerpoint/2010/main" id="1" dur="indefinite" restart="never" nodeType="tmRoot"/>
+      </p:par>
+    </p:tnLst>
+  </p:timing>
+</p:sld>
+</file>
+
+<file path=ppt/slides/slide26.xml><?xml version="1.0" encoding="utf-8"?>
+<p:sld xmlns:a="http://schemas.openxmlformats.org/drawingml/2006/main" xmlns:r="http://schemas.openxmlformats.org/officeDocument/2006/relationships" xmlns:p="http://schemas.openxmlformats.org/presentationml/2006/main">
+  <p:cSld>
+    <p:spTree>
+      <p:nvGrpSpPr>
+        <p:cNvPr id="1" name=""/>
+        <p:cNvGrpSpPr/>
+        <p:nvPr/>
+      </p:nvGrpSpPr>
+      <p:grpSpPr>
+        <a:xfrm>
+          <a:off x="0" y="0"/>
+          <a:ext cx="0" cy="0"/>
+          <a:chOff x="0" y="0"/>
+          <a:chExt cx="0" cy="0"/>
+        </a:xfrm>
+      </p:grpSpPr>
+      <p:sp>
+        <p:nvSpPr>
           <p:cNvPr id="5" name="Title 4"/>
           <p:cNvSpPr>
             <a:spLocks noGrp="1"/>
@@ -14585,7 +15470,7 @@
 </p:sld>
 </file>
 
-<file path=ppt/slides/slide23.xml><?xml version="1.0" encoding="utf-8"?>
+<file path=ppt/slides/slide27.xml><?xml version="1.0" encoding="utf-8"?>
 <p:sld xmlns:a="http://schemas.openxmlformats.org/drawingml/2006/main" xmlns:r="http://schemas.openxmlformats.org/officeDocument/2006/relationships" xmlns:p="http://schemas.openxmlformats.org/presentationml/2006/main" show="0">
   <p:cSld>
     <p:spTree>
@@ -14618,7 +15503,7 @@
 </p:sld>
 </file>
 
-<file path=ppt/slides/slide24.xml><?xml version="1.0" encoding="utf-8"?>
+<file path=ppt/slides/slide28.xml><?xml version="1.0" encoding="utf-8"?>
 <p:sld xmlns:a="http://schemas.openxmlformats.org/drawingml/2006/main" xmlns:r="http://schemas.openxmlformats.org/officeDocument/2006/relationships" xmlns:p="http://schemas.openxmlformats.org/presentationml/2006/main" show="0">
   <p:cSld>
     <p:spTree>
@@ -14644,7 +15529,7 @@
 </p:sld>
 </file>
 
-<file path=ppt/slides/slide25.xml><?xml version="1.0" encoding="utf-8"?>
+<file path=ppt/slides/slide29.xml><?xml version="1.0" encoding="utf-8"?>
 <p:sld xmlns:a="http://schemas.openxmlformats.org/drawingml/2006/main" xmlns:r="http://schemas.openxmlformats.org/officeDocument/2006/relationships" xmlns:p="http://schemas.openxmlformats.org/presentationml/2006/main" show="0">
   <p:cSld>
     <p:spTree>
@@ -16200,7 +17085,7 @@
           <a:graphicData uri="http://schemas.openxmlformats.org/presentationml/2006/ole">
             <mc:AlternateContent xmlns:mc="http://schemas.openxmlformats.org/markup-compatibility/2006">
               <mc:Choice xmlns:v="urn:schemas-microsoft-com:vml" Requires="v">
-                <p:oleObj spid="_x0000_s1050" name="Dokument" r:id="rId4" imgW="24330159" imgH="16558730" progId="Word.Document.12">
+                <p:oleObj spid="_x0000_s1056" name="Dokument" r:id="rId4" imgW="24330159" imgH="16558730" progId="Word.Document.12">
                   <p:link updateAutomatic="1"/>
                 </p:oleObj>
               </mc:Choice>
@@ -16834,8 +17719,8 @@
         </p:nvSpPr>
         <p:spPr>
           <a:xfrm>
-            <a:off x="2818395" y="3143419"/>
-            <a:ext cx="1988810" cy="230832"/>
+            <a:off x="3312288" y="1481722"/>
+            <a:ext cx="1362052" cy="230832"/>
           </a:xfrm>
           <a:prstGeom prst="rect">
             <a:avLst/>

</xml_diff>

<commit_message>
Initial Draft of the slides
</commit_message>
<xml_diff>
--- a/presentation/slides.pptx
+++ b/presentation/slides.pptx
@@ -5,10 +5,10 @@
     <p:sldMasterId id="2147483660" r:id="rId1"/>
   </p:sldMasterIdLst>
   <p:notesMasterIdLst>
-    <p:notesMasterId r:id="rId33"/>
+    <p:notesMasterId r:id="rId29"/>
   </p:notesMasterIdLst>
   <p:handoutMasterIdLst>
-    <p:handoutMasterId r:id="rId34"/>
+    <p:handoutMasterId r:id="rId30"/>
   </p:handoutMasterIdLst>
   <p:sldIdLst>
     <p:sldId id="351" r:id="rId2"/>
@@ -21,8 +21,8 @@
     <p:sldId id="357" r:id="rId9"/>
     <p:sldId id="358" r:id="rId10"/>
     <p:sldId id="366" r:id="rId11"/>
-    <p:sldId id="360" r:id="rId12"/>
-    <p:sldId id="361" r:id="rId13"/>
+    <p:sldId id="376" r:id="rId12"/>
+    <p:sldId id="375" r:id="rId13"/>
     <p:sldId id="362" r:id="rId14"/>
     <p:sldId id="363" r:id="rId15"/>
     <p:sldId id="364" r:id="rId16"/>
@@ -33,15 +33,11 @@
     <p:sldId id="368" r:id="rId21"/>
     <p:sldId id="373" r:id="rId22"/>
     <p:sldId id="374" r:id="rId23"/>
-    <p:sldId id="325" r:id="rId24"/>
-    <p:sldId id="286" r:id="rId25"/>
-    <p:sldId id="285" r:id="rId26"/>
-    <p:sldId id="291" r:id="rId27"/>
-    <p:sldId id="287" r:id="rId28"/>
-    <p:sldId id="310" r:id="rId29"/>
-    <p:sldId id="265" r:id="rId30"/>
-    <p:sldId id="339" r:id="rId31"/>
-    <p:sldId id="346" r:id="rId32"/>
+    <p:sldId id="377" r:id="rId24"/>
+    <p:sldId id="310" r:id="rId25"/>
+    <p:sldId id="265" r:id="rId26"/>
+    <p:sldId id="339" r:id="rId27"/>
+    <p:sldId id="346" r:id="rId28"/>
   </p:sldIdLst>
   <p:sldSz cx="12195175" cy="6859588"/>
   <p:notesSz cx="6797675" cy="9874250"/>
@@ -1571,22 +1567,22 @@
     </dgm:pt>
   </dgm:ptLst>
   <dgm:cxnLst>
-    <dgm:cxn modelId="{32378F54-1C7E-2D40-AA2A-BFA28E1A1175}" type="presOf" srcId="{C159646B-012A-4212-A7AD-6654D7CF499B}" destId="{7E4B80E4-9D97-4F8A-ABF5-4CECC4686258}" srcOrd="0" destOrd="0" presId="urn:microsoft.com/office/officeart/2005/8/layout/cycle6"/>
+    <dgm:cxn modelId="{9D79A768-2C70-6E4A-86EB-A533198E3854}" type="presOf" srcId="{79588392-39B9-4A6E-8618-992429D0EC73}" destId="{6D563E2F-5C7F-4774-ABE3-729046460C24}" srcOrd="0" destOrd="0" presId="urn:microsoft.com/office/officeart/2005/8/layout/cycle6"/>
+    <dgm:cxn modelId="{72566B6A-355B-BA41-9E9C-FA0D6078DDD1}" type="presOf" srcId="{7A2D9AB9-275B-4A46-A748-9F7B232E1D0F}" destId="{DF3645CE-46DB-4F90-9DAB-C2774C13F04F}" srcOrd="0" destOrd="0" presId="urn:microsoft.com/office/officeart/2005/8/layout/cycle6"/>
     <dgm:cxn modelId="{15D14727-05E4-4C96-9C03-E85EE9D295B2}" srcId="{79588392-39B9-4A6E-8618-992429D0EC73}" destId="{5428AD4D-7D4E-4E44-BFE5-92FC9A2B0EEF}" srcOrd="3" destOrd="0" parTransId="{EC4F5020-CCA4-409E-8E69-DFBF730337FD}" sibTransId="{7A2D9AB9-275B-4A46-A748-9F7B232E1D0F}"/>
-    <dgm:cxn modelId="{807DE98E-2FE4-9F46-B9DD-216E28E07AE7}" type="presOf" srcId="{44BBA0F8-D041-47AE-8943-545F55B2C89E}" destId="{749D468D-54CC-41A3-B2EA-89E619386BCE}" srcOrd="0" destOrd="0" presId="urn:microsoft.com/office/officeart/2005/8/layout/cycle6"/>
-    <dgm:cxn modelId="{72566B6A-355B-BA41-9E9C-FA0D6078DDD1}" type="presOf" srcId="{7A2D9AB9-275B-4A46-A748-9F7B232E1D0F}" destId="{DF3645CE-46DB-4F90-9DAB-C2774C13F04F}" srcOrd="0" destOrd="0" presId="urn:microsoft.com/office/officeart/2005/8/layout/cycle6"/>
-    <dgm:cxn modelId="{D71E3A35-37BD-4867-957F-098CFDC849C2}" srcId="{79588392-39B9-4A6E-8618-992429D0EC73}" destId="{C159646B-012A-4212-A7AD-6654D7CF499B}" srcOrd="4" destOrd="0" parTransId="{E4E9B317-C79A-4DF6-965A-E121299606F5}" sibTransId="{44BBA0F8-D041-47AE-8943-545F55B2C89E}"/>
-    <dgm:cxn modelId="{BAE4E163-1650-F248-B306-6C0F9A59E8A4}" type="presOf" srcId="{7DEB2853-C119-4899-B3FC-72C55873FA6E}" destId="{C3032F7F-C8D4-47FE-AA00-8867D71E8DE2}" srcOrd="0" destOrd="0" presId="urn:microsoft.com/office/officeart/2005/8/layout/cycle6"/>
-    <dgm:cxn modelId="{2D19F2F7-ED06-004C-B302-A627A2159E7E}" type="presOf" srcId="{89A0E891-8B9E-41D8-9601-162AA0B40C0C}" destId="{5F281920-551E-4D0D-8CEF-E7C7BC4F1DCA}" srcOrd="0" destOrd="0" presId="urn:microsoft.com/office/officeart/2005/8/layout/cycle6"/>
-    <dgm:cxn modelId="{33545504-A5CD-7C41-BD7A-54E3BC87A0FC}" type="presOf" srcId="{5428AD4D-7D4E-4E44-BFE5-92FC9A2B0EEF}" destId="{346ABEDD-A3D1-4ACA-9D13-2BCC76FFF25E}" srcOrd="0" destOrd="0" presId="urn:microsoft.com/office/officeart/2005/8/layout/cycle6"/>
-    <dgm:cxn modelId="{C00E3E51-FE4A-FA49-88D0-C004D983E42B}" type="presOf" srcId="{D1FD90FB-6ACC-4337-ABDE-047986D23A5C}" destId="{E05153C1-91D3-4E68-8392-C01435994C3E}" srcOrd="0" destOrd="0" presId="urn:microsoft.com/office/officeart/2005/8/layout/cycle6"/>
-    <dgm:cxn modelId="{625913C1-44C4-1B42-B766-1368C2870657}" type="presOf" srcId="{F63A48CD-A5ED-4128-AE46-7337842E0071}" destId="{C547E508-1A19-49A1-81AB-02193B54CB91}" srcOrd="0" destOrd="0" presId="urn:microsoft.com/office/officeart/2005/8/layout/cycle6"/>
     <dgm:cxn modelId="{2405A3C1-4A2D-4944-AC62-10BC9A6A1185}" srcId="{79588392-39B9-4A6E-8618-992429D0EC73}" destId="{2349488A-425F-4656-B941-19606BC6EE61}" srcOrd="1" destOrd="0" parTransId="{0571949E-BBD7-461C-8547-C966BD05F12F}" sibTransId="{F63A48CD-A5ED-4128-AE46-7337842E0071}"/>
     <dgm:cxn modelId="{00B59CB1-CD26-4519-963A-C058F5FE4F79}" srcId="{79588392-39B9-4A6E-8618-992429D0EC73}" destId="{7DEB2853-C119-4899-B3FC-72C55873FA6E}" srcOrd="2" destOrd="0" parTransId="{161ADB85-6C78-4D47-A7AF-488BF365FAF9}" sibTransId="{89A0E891-8B9E-41D8-9601-162AA0B40C0C}"/>
-    <dgm:cxn modelId="{9D79A768-2C70-6E4A-86EB-A533198E3854}" type="presOf" srcId="{79588392-39B9-4A6E-8618-992429D0EC73}" destId="{6D563E2F-5C7F-4774-ABE3-729046460C24}" srcOrd="0" destOrd="0" presId="urn:microsoft.com/office/officeart/2005/8/layout/cycle6"/>
+    <dgm:cxn modelId="{625913C1-44C4-1B42-B766-1368C2870657}" type="presOf" srcId="{F63A48CD-A5ED-4128-AE46-7337842E0071}" destId="{C547E508-1A19-49A1-81AB-02193B54CB91}" srcOrd="0" destOrd="0" presId="urn:microsoft.com/office/officeart/2005/8/layout/cycle6"/>
+    <dgm:cxn modelId="{C00E3E51-FE4A-FA49-88D0-C004D983E42B}" type="presOf" srcId="{D1FD90FB-6ACC-4337-ABDE-047986D23A5C}" destId="{E05153C1-91D3-4E68-8392-C01435994C3E}" srcOrd="0" destOrd="0" presId="urn:microsoft.com/office/officeart/2005/8/layout/cycle6"/>
+    <dgm:cxn modelId="{33545504-A5CD-7C41-BD7A-54E3BC87A0FC}" type="presOf" srcId="{5428AD4D-7D4E-4E44-BFE5-92FC9A2B0EEF}" destId="{346ABEDD-A3D1-4ACA-9D13-2BCC76FFF25E}" srcOrd="0" destOrd="0" presId="urn:microsoft.com/office/officeart/2005/8/layout/cycle6"/>
     <dgm:cxn modelId="{C8D55DC6-6B17-B54B-8585-3D70492EB6C4}" type="presOf" srcId="{2349488A-425F-4656-B941-19606BC6EE61}" destId="{C785F3C5-6CB1-4E0C-8080-250BAC63EF0E}" srcOrd="0" destOrd="0" presId="urn:microsoft.com/office/officeart/2005/8/layout/cycle6"/>
+    <dgm:cxn modelId="{807DE98E-2FE4-9F46-B9DD-216E28E07AE7}" type="presOf" srcId="{44BBA0F8-D041-47AE-8943-545F55B2C89E}" destId="{749D468D-54CC-41A3-B2EA-89E619386BCE}" srcOrd="0" destOrd="0" presId="urn:microsoft.com/office/officeart/2005/8/layout/cycle6"/>
+    <dgm:cxn modelId="{32378F54-1C7E-2D40-AA2A-BFA28E1A1175}" type="presOf" srcId="{C159646B-012A-4212-A7AD-6654D7CF499B}" destId="{7E4B80E4-9D97-4F8A-ABF5-4CECC4686258}" srcOrd="0" destOrd="0" presId="urn:microsoft.com/office/officeart/2005/8/layout/cycle6"/>
+    <dgm:cxn modelId="{5990C50C-B0F3-0847-99D4-82B910465AD3}" type="presOf" srcId="{8A9F2C8D-B5DF-46F4-8FD7-A10CD99EA81A}" destId="{F6182B7F-9740-4FEA-A674-E8D1BD9AF57A}" srcOrd="0" destOrd="0" presId="urn:microsoft.com/office/officeart/2005/8/layout/cycle6"/>
+    <dgm:cxn modelId="{BAE4E163-1650-F248-B306-6C0F9A59E8A4}" type="presOf" srcId="{7DEB2853-C119-4899-B3FC-72C55873FA6E}" destId="{C3032F7F-C8D4-47FE-AA00-8867D71E8DE2}" srcOrd="0" destOrd="0" presId="urn:microsoft.com/office/officeart/2005/8/layout/cycle6"/>
+    <dgm:cxn modelId="{D71E3A35-37BD-4867-957F-098CFDC849C2}" srcId="{79588392-39B9-4A6E-8618-992429D0EC73}" destId="{C159646B-012A-4212-A7AD-6654D7CF499B}" srcOrd="4" destOrd="0" parTransId="{E4E9B317-C79A-4DF6-965A-E121299606F5}" sibTransId="{44BBA0F8-D041-47AE-8943-545F55B2C89E}"/>
+    <dgm:cxn modelId="{2D19F2F7-ED06-004C-B302-A627A2159E7E}" type="presOf" srcId="{89A0E891-8B9E-41D8-9601-162AA0B40C0C}" destId="{5F281920-551E-4D0D-8CEF-E7C7BC4F1DCA}" srcOrd="0" destOrd="0" presId="urn:microsoft.com/office/officeart/2005/8/layout/cycle6"/>
     <dgm:cxn modelId="{52500655-CA4C-4A60-902C-D4AAF66352D0}" srcId="{79588392-39B9-4A6E-8618-992429D0EC73}" destId="{D1FD90FB-6ACC-4337-ABDE-047986D23A5C}" srcOrd="0" destOrd="0" parTransId="{6519A1D2-A3A8-490C-9484-F6AA17D5D21F}" sibTransId="{8A9F2C8D-B5DF-46F4-8FD7-A10CD99EA81A}"/>
-    <dgm:cxn modelId="{5990C50C-B0F3-0847-99D4-82B910465AD3}" type="presOf" srcId="{8A9F2C8D-B5DF-46F4-8FD7-A10CD99EA81A}" destId="{F6182B7F-9740-4FEA-A674-E8D1BD9AF57A}" srcOrd="0" destOrd="0" presId="urn:microsoft.com/office/officeart/2005/8/layout/cycle6"/>
     <dgm:cxn modelId="{BA082D85-EDCF-1645-9C0A-AED0976E8E52}" type="presParOf" srcId="{6D563E2F-5C7F-4774-ABE3-729046460C24}" destId="{E05153C1-91D3-4E68-8392-C01435994C3E}" srcOrd="0" destOrd="0" presId="urn:microsoft.com/office/officeart/2005/8/layout/cycle6"/>
     <dgm:cxn modelId="{F71C2DAB-AF18-8045-8FBA-940A848EDE55}" type="presParOf" srcId="{6D563E2F-5C7F-4774-ABE3-729046460C24}" destId="{D47191B8-8DB2-4345-9C05-C5C64A481D0E}" srcOrd="1" destOrd="0" presId="urn:microsoft.com/office/officeart/2005/8/layout/cycle6"/>
     <dgm:cxn modelId="{58E4ECEE-61B7-A34C-8C1F-7CC3C7E42E12}" type="presParOf" srcId="{6D563E2F-5C7F-4774-ABE3-729046460C24}" destId="{F6182B7F-9740-4FEA-A674-E8D1BD9AF57A}" srcOrd="2" destOrd="0" presId="urn:microsoft.com/office/officeart/2005/8/layout/cycle6"/>
@@ -1621,6 +1617,672 @@
       <dsp:cNvGrpSpPr/>
     </dsp:nvGrpSpPr>
     <dsp:grpSpPr/>
+    <dsp:sp modelId="{E05153C1-91D3-4E68-8392-C01435994C3E}">
+      <dsp:nvSpPr>
+        <dsp:cNvPr id="0" name=""/>
+        <dsp:cNvSpPr/>
+      </dsp:nvSpPr>
+      <dsp:spPr>
+        <a:xfrm>
+          <a:off x="4883829" y="3044"/>
+          <a:ext cx="1292003" cy="839802"/>
+        </a:xfrm>
+        <a:prstGeom prst="roundRect">
+          <a:avLst/>
+        </a:prstGeom>
+        <a:solidFill>
+          <a:schemeClr val="accent2">
+            <a:hueOff val="0"/>
+            <a:satOff val="0"/>
+            <a:lumOff val="0"/>
+            <a:alphaOff val="0"/>
+          </a:schemeClr>
+        </a:solidFill>
+        <a:ln w="38100" cmpd="sng">
+          <a:solidFill>
+            <a:schemeClr val="accent2">
+              <a:lumMod val="20000"/>
+              <a:lumOff val="80000"/>
+            </a:schemeClr>
+          </a:solidFill>
+        </a:ln>
+        <a:effectLst>
+          <a:outerShdw blurRad="38100" dist="30000" dir="5400000" rotWithShape="0">
+            <a:srgbClr val="000000">
+              <a:alpha val="45000"/>
+            </a:srgbClr>
+          </a:outerShdw>
+        </a:effectLst>
+      </dsp:spPr>
+      <dsp:style>
+        <a:lnRef idx="0">
+          <a:scrgbClr r="0" g="0" b="0"/>
+        </a:lnRef>
+        <a:fillRef idx="3">
+          <a:scrgbClr r="0" g="0" b="0"/>
+        </a:fillRef>
+        <a:effectRef idx="2">
+          <a:scrgbClr r="0" g="0" b="0"/>
+        </a:effectRef>
+        <a:fontRef idx="minor">
+          <a:schemeClr val="lt1"/>
+        </a:fontRef>
+      </dsp:style>
+      <dsp:txBody>
+        <a:bodyPr spcFirstLastPara="0" vert="horz" wrap="square" lIns="60960" tIns="60960" rIns="60960" bIns="60960" numCol="1" spcCol="1270" anchor="ctr" anchorCtr="0">
+          <a:noAutofit/>
+        </a:bodyPr>
+        <a:lstStyle/>
+        <a:p>
+          <a:pPr lvl="0" algn="ctr" defTabSz="711200">
+            <a:lnSpc>
+              <a:spcPct val="90000"/>
+            </a:lnSpc>
+            <a:spcBef>
+              <a:spcPct val="0"/>
+            </a:spcBef>
+            <a:spcAft>
+              <a:spcPct val="35000"/>
+            </a:spcAft>
+          </a:pPr>
+          <a:r>
+            <a:rPr lang="de-DE" sz="1600" b="0" i="0" kern="1200" dirty="0" smtClean="0"/>
+            <a:t>On-</a:t>
+          </a:r>
+          <a:r>
+            <a:rPr lang="de-DE" sz="1600" b="0" i="0" kern="1200" dirty="0" err="1" smtClean="0"/>
+            <a:t>demand</a:t>
+          </a:r>
+          <a:r>
+            <a:rPr lang="de-DE" sz="1600" b="0" i="0" kern="1200" dirty="0" smtClean="0"/>
+            <a:t> </a:t>
+          </a:r>
+          <a:r>
+            <a:rPr lang="de-DE" sz="1600" b="0" i="0" kern="1200" dirty="0" err="1" smtClean="0"/>
+            <a:t>Self</a:t>
+          </a:r>
+          <a:r>
+            <a:rPr lang="de-DE" sz="1600" b="0" i="0" kern="1200" dirty="0" smtClean="0"/>
+            <a:t>-service</a:t>
+          </a:r>
+          <a:endParaRPr lang="de-DE" sz="1600" b="0" i="0" kern="1200" dirty="0"/>
+        </a:p>
+      </dsp:txBody>
+      <dsp:txXfrm>
+        <a:off x="4924825" y="44040"/>
+        <a:ext cx="1210011" cy="757810"/>
+      </dsp:txXfrm>
+    </dsp:sp>
+    <dsp:sp modelId="{F6182B7F-9740-4FEA-A674-E8D1BD9AF57A}">
+      <dsp:nvSpPr>
+        <dsp:cNvPr id="0" name=""/>
+        <dsp:cNvSpPr/>
+      </dsp:nvSpPr>
+      <dsp:spPr>
+        <a:xfrm>
+          <a:off x="3852769" y="422946"/>
+          <a:ext cx="3354123" cy="3354123"/>
+        </a:xfrm>
+        <a:custGeom>
+          <a:avLst/>
+          <a:gdLst/>
+          <a:ahLst/>
+          <a:cxnLst/>
+          <a:rect l="0" t="0" r="0" b="0"/>
+          <a:pathLst>
+            <a:path>
+              <a:moveTo>
+                <a:pt x="2331929" y="133143"/>
+              </a:moveTo>
+              <a:arcTo wR="1677061" hR="1677061" stAng="17579082" swAng="1960358"/>
+            </a:path>
+          </a:pathLst>
+        </a:custGeom>
+        <a:noFill/>
+        <a:ln w="10000" cap="flat" cmpd="sng" algn="ctr">
+          <a:solidFill>
+            <a:schemeClr val="accent2">
+              <a:hueOff val="0"/>
+              <a:satOff val="0"/>
+              <a:lumOff val="0"/>
+              <a:alphaOff val="0"/>
+            </a:schemeClr>
+          </a:solidFill>
+          <a:prstDash val="solid"/>
+        </a:ln>
+        <a:effectLst/>
+      </dsp:spPr>
+      <dsp:style>
+        <a:lnRef idx="1">
+          <a:scrgbClr r="0" g="0" b="0"/>
+        </a:lnRef>
+        <a:fillRef idx="0">
+          <a:scrgbClr r="0" g="0" b="0"/>
+        </a:fillRef>
+        <a:effectRef idx="0">
+          <a:scrgbClr r="0" g="0" b="0"/>
+        </a:effectRef>
+        <a:fontRef idx="minor"/>
+      </dsp:style>
+    </dsp:sp>
+    <dsp:sp modelId="{C785F3C5-6CB1-4E0C-8080-250BAC63EF0E}">
+      <dsp:nvSpPr>
+        <dsp:cNvPr id="0" name=""/>
+        <dsp:cNvSpPr/>
+      </dsp:nvSpPr>
+      <dsp:spPr>
+        <a:xfrm>
+          <a:off x="6478809" y="1161866"/>
+          <a:ext cx="1292003" cy="839802"/>
+        </a:xfrm>
+        <a:prstGeom prst="roundRect">
+          <a:avLst/>
+        </a:prstGeom>
+        <a:solidFill>
+          <a:schemeClr val="accent3">
+            <a:hueOff val="0"/>
+            <a:satOff val="0"/>
+            <a:lumOff val="0"/>
+            <a:alphaOff val="0"/>
+          </a:schemeClr>
+        </a:solidFill>
+        <a:ln w="38100" cmpd="sng">
+          <a:solidFill>
+            <a:schemeClr val="accent2">
+              <a:lumMod val="20000"/>
+              <a:lumOff val="80000"/>
+            </a:schemeClr>
+          </a:solidFill>
+        </a:ln>
+        <a:effectLst>
+          <a:outerShdw blurRad="38100" dist="30000" dir="5400000" rotWithShape="0">
+            <a:srgbClr val="000000">
+              <a:alpha val="45000"/>
+            </a:srgbClr>
+          </a:outerShdw>
+        </a:effectLst>
+      </dsp:spPr>
+      <dsp:style>
+        <a:lnRef idx="0">
+          <a:scrgbClr r="0" g="0" b="0"/>
+        </a:lnRef>
+        <a:fillRef idx="3">
+          <a:scrgbClr r="0" g="0" b="0"/>
+        </a:fillRef>
+        <a:effectRef idx="2">
+          <a:scrgbClr r="0" g="0" b="0"/>
+        </a:effectRef>
+        <a:fontRef idx="minor">
+          <a:schemeClr val="lt1"/>
+        </a:fontRef>
+      </dsp:style>
+      <dsp:txBody>
+        <a:bodyPr spcFirstLastPara="0" vert="horz" wrap="square" lIns="60960" tIns="60960" rIns="60960" bIns="60960" numCol="1" spcCol="1270" anchor="ctr" anchorCtr="0">
+          <a:noAutofit/>
+        </a:bodyPr>
+        <a:lstStyle/>
+        <a:p>
+          <a:pPr lvl="0" algn="ctr" defTabSz="711200">
+            <a:lnSpc>
+              <a:spcPct val="90000"/>
+            </a:lnSpc>
+            <a:spcBef>
+              <a:spcPct val="0"/>
+            </a:spcBef>
+            <a:spcAft>
+              <a:spcPct val="35000"/>
+            </a:spcAft>
+          </a:pPr>
+          <a:r>
+            <a:rPr lang="de-DE" sz="1600" b="0" i="0" kern="1200" smtClean="0"/>
+            <a:t>Broad Network Access</a:t>
+          </a:r>
+          <a:endParaRPr lang="de-DE" sz="1600" b="0" i="0" kern="1200" dirty="0"/>
+        </a:p>
+      </dsp:txBody>
+      <dsp:txXfrm>
+        <a:off x="6519805" y="1202862"/>
+        <a:ext cx="1210011" cy="757810"/>
+      </dsp:txXfrm>
+    </dsp:sp>
+    <dsp:sp modelId="{C547E508-1A19-49A1-81AB-02193B54CB91}">
+      <dsp:nvSpPr>
+        <dsp:cNvPr id="0" name=""/>
+        <dsp:cNvSpPr/>
+      </dsp:nvSpPr>
+      <dsp:spPr>
+        <a:xfrm>
+          <a:off x="3852769" y="422946"/>
+          <a:ext cx="3354123" cy="3354123"/>
+        </a:xfrm>
+        <a:custGeom>
+          <a:avLst/>
+          <a:gdLst/>
+          <a:ahLst/>
+          <a:cxnLst/>
+          <a:rect l="0" t="0" r="0" b="0"/>
+          <a:pathLst>
+            <a:path>
+              <a:moveTo>
+                <a:pt x="3351832" y="1589438"/>
+              </a:moveTo>
+              <a:arcTo wR="1677061" hR="1677061" stAng="21420302" swAng="2195396"/>
+            </a:path>
+          </a:pathLst>
+        </a:custGeom>
+        <a:noFill/>
+        <a:ln w="10000" cap="flat" cmpd="sng" algn="ctr">
+          <a:solidFill>
+            <a:schemeClr val="accent3">
+              <a:hueOff val="0"/>
+              <a:satOff val="0"/>
+              <a:lumOff val="0"/>
+              <a:alphaOff val="0"/>
+            </a:schemeClr>
+          </a:solidFill>
+          <a:prstDash val="solid"/>
+        </a:ln>
+        <a:effectLst/>
+      </dsp:spPr>
+      <dsp:style>
+        <a:lnRef idx="1">
+          <a:scrgbClr r="0" g="0" b="0"/>
+        </a:lnRef>
+        <a:fillRef idx="0">
+          <a:scrgbClr r="0" g="0" b="0"/>
+        </a:fillRef>
+        <a:effectRef idx="0">
+          <a:scrgbClr r="0" g="0" b="0"/>
+        </a:effectRef>
+        <a:fontRef idx="minor"/>
+      </dsp:style>
+    </dsp:sp>
+    <dsp:sp modelId="{C3032F7F-C8D4-47FE-AA00-8867D71E8DE2}">
+      <dsp:nvSpPr>
+        <dsp:cNvPr id="0" name=""/>
+        <dsp:cNvSpPr/>
+      </dsp:nvSpPr>
+      <dsp:spPr>
+        <a:xfrm>
+          <a:off x="5869581" y="3036878"/>
+          <a:ext cx="1292003" cy="839802"/>
+        </a:xfrm>
+        <a:prstGeom prst="roundRect">
+          <a:avLst/>
+        </a:prstGeom>
+        <a:solidFill>
+          <a:schemeClr val="accent4">
+            <a:hueOff val="0"/>
+            <a:satOff val="0"/>
+            <a:lumOff val="0"/>
+            <a:alphaOff val="0"/>
+          </a:schemeClr>
+        </a:solidFill>
+        <a:ln>
+          <a:noFill/>
+        </a:ln>
+        <a:effectLst>
+          <a:outerShdw blurRad="38100" dist="30000" dir="5400000" rotWithShape="0">
+            <a:srgbClr val="000000">
+              <a:alpha val="45000"/>
+            </a:srgbClr>
+          </a:outerShdw>
+        </a:effectLst>
+      </dsp:spPr>
+      <dsp:style>
+        <a:lnRef idx="0">
+          <a:scrgbClr r="0" g="0" b="0"/>
+        </a:lnRef>
+        <a:fillRef idx="3">
+          <a:scrgbClr r="0" g="0" b="0"/>
+        </a:fillRef>
+        <a:effectRef idx="2">
+          <a:scrgbClr r="0" g="0" b="0"/>
+        </a:effectRef>
+        <a:fontRef idx="minor">
+          <a:schemeClr val="lt1"/>
+        </a:fontRef>
+      </dsp:style>
+      <dsp:txBody>
+        <a:bodyPr spcFirstLastPara="0" vert="horz" wrap="square" lIns="60960" tIns="60960" rIns="60960" bIns="60960" numCol="1" spcCol="1270" anchor="ctr" anchorCtr="0">
+          <a:noAutofit/>
+        </a:bodyPr>
+        <a:lstStyle/>
+        <a:p>
+          <a:pPr lvl="0" algn="ctr" defTabSz="711200">
+            <a:lnSpc>
+              <a:spcPct val="90000"/>
+            </a:lnSpc>
+            <a:spcBef>
+              <a:spcPct val="0"/>
+            </a:spcBef>
+            <a:spcAft>
+              <a:spcPct val="35000"/>
+            </a:spcAft>
+          </a:pPr>
+          <a:r>
+            <a:rPr lang="de-DE" sz="1600" b="0" i="0" kern="1200" smtClean="0"/>
+            <a:t>Measured Service</a:t>
+          </a:r>
+          <a:endParaRPr lang="de-DE" sz="1600" b="0" i="0" kern="1200" dirty="0"/>
+        </a:p>
+      </dsp:txBody>
+      <dsp:txXfrm>
+        <a:off x="5910577" y="3077874"/>
+        <a:ext cx="1210011" cy="757810"/>
+      </dsp:txXfrm>
+    </dsp:sp>
+    <dsp:sp modelId="{5F281920-551E-4D0D-8CEF-E7C7BC4F1DCA}">
+      <dsp:nvSpPr>
+        <dsp:cNvPr id="0" name=""/>
+        <dsp:cNvSpPr/>
+      </dsp:nvSpPr>
+      <dsp:spPr>
+        <a:xfrm>
+          <a:off x="3852769" y="422946"/>
+          <a:ext cx="3354123" cy="3354123"/>
+        </a:xfrm>
+        <a:custGeom>
+          <a:avLst/>
+          <a:gdLst/>
+          <a:ahLst/>
+          <a:cxnLst/>
+          <a:rect l="0" t="0" r="0" b="0"/>
+          <a:pathLst>
+            <a:path>
+              <a:moveTo>
+                <a:pt x="2010155" y="3320711"/>
+              </a:moveTo>
+              <a:arcTo wR="1677061" hR="1677061" stAng="4712633" swAng="1374733"/>
+            </a:path>
+          </a:pathLst>
+        </a:custGeom>
+        <a:noFill/>
+        <a:ln w="10000" cap="flat" cmpd="sng" algn="ctr">
+          <a:solidFill>
+            <a:schemeClr val="accent4">
+              <a:hueOff val="0"/>
+              <a:satOff val="0"/>
+              <a:lumOff val="0"/>
+              <a:alphaOff val="0"/>
+            </a:schemeClr>
+          </a:solidFill>
+          <a:prstDash val="solid"/>
+        </a:ln>
+        <a:effectLst/>
+      </dsp:spPr>
+      <dsp:style>
+        <a:lnRef idx="1">
+          <a:scrgbClr r="0" g="0" b="0"/>
+        </a:lnRef>
+        <a:fillRef idx="0">
+          <a:scrgbClr r="0" g="0" b="0"/>
+        </a:fillRef>
+        <a:effectRef idx="0">
+          <a:scrgbClr r="0" g="0" b="0"/>
+        </a:effectRef>
+        <a:fontRef idx="minor"/>
+      </dsp:style>
+    </dsp:sp>
+    <dsp:sp modelId="{346ABEDD-A3D1-4ACA-9D13-2BCC76FFF25E}">
+      <dsp:nvSpPr>
+        <dsp:cNvPr id="0" name=""/>
+        <dsp:cNvSpPr/>
+      </dsp:nvSpPr>
+      <dsp:spPr>
+        <a:xfrm>
+          <a:off x="3898076" y="3036878"/>
+          <a:ext cx="1292003" cy="839802"/>
+        </a:xfrm>
+        <a:prstGeom prst="roundRect">
+          <a:avLst/>
+        </a:prstGeom>
+        <a:solidFill>
+          <a:schemeClr val="accent5">
+            <a:hueOff val="0"/>
+            <a:satOff val="0"/>
+            <a:lumOff val="0"/>
+            <a:alphaOff val="0"/>
+          </a:schemeClr>
+        </a:solidFill>
+        <a:ln>
+          <a:noFill/>
+        </a:ln>
+        <a:effectLst>
+          <a:outerShdw blurRad="38100" dist="30000" dir="5400000" rotWithShape="0">
+            <a:srgbClr val="000000">
+              <a:alpha val="45000"/>
+            </a:srgbClr>
+          </a:outerShdw>
+        </a:effectLst>
+      </dsp:spPr>
+      <dsp:style>
+        <a:lnRef idx="0">
+          <a:scrgbClr r="0" g="0" b="0"/>
+        </a:lnRef>
+        <a:fillRef idx="3">
+          <a:scrgbClr r="0" g="0" b="0"/>
+        </a:fillRef>
+        <a:effectRef idx="2">
+          <a:scrgbClr r="0" g="0" b="0"/>
+        </a:effectRef>
+        <a:fontRef idx="minor">
+          <a:schemeClr val="lt1"/>
+        </a:fontRef>
+      </dsp:style>
+      <dsp:txBody>
+        <a:bodyPr spcFirstLastPara="0" vert="horz" wrap="square" lIns="60960" tIns="60960" rIns="60960" bIns="60960" numCol="1" spcCol="1270" anchor="ctr" anchorCtr="0">
+          <a:noAutofit/>
+        </a:bodyPr>
+        <a:lstStyle/>
+        <a:p>
+          <a:pPr lvl="0" algn="ctr" defTabSz="711200">
+            <a:lnSpc>
+              <a:spcPct val="90000"/>
+            </a:lnSpc>
+            <a:spcBef>
+              <a:spcPct val="0"/>
+            </a:spcBef>
+            <a:spcAft>
+              <a:spcPct val="35000"/>
+            </a:spcAft>
+          </a:pPr>
+          <a:r>
+            <a:rPr lang="de-DE" sz="1600" b="0" i="0" kern="1200" smtClean="0"/>
+            <a:t>Resource Pooling</a:t>
+          </a:r>
+          <a:endParaRPr lang="de-DE" sz="1600" b="0" i="0" kern="1200" dirty="0"/>
+        </a:p>
+      </dsp:txBody>
+      <dsp:txXfrm>
+        <a:off x="3939072" y="3077874"/>
+        <a:ext cx="1210011" cy="757810"/>
+      </dsp:txXfrm>
+    </dsp:sp>
+    <dsp:sp modelId="{DF3645CE-46DB-4F90-9DAB-C2774C13F04F}">
+      <dsp:nvSpPr>
+        <dsp:cNvPr id="0" name=""/>
+        <dsp:cNvSpPr/>
+      </dsp:nvSpPr>
+      <dsp:spPr>
+        <a:xfrm>
+          <a:off x="3852769" y="422946"/>
+          <a:ext cx="3354123" cy="3354123"/>
+        </a:xfrm>
+        <a:custGeom>
+          <a:avLst/>
+          <a:gdLst/>
+          <a:ahLst/>
+          <a:cxnLst/>
+          <a:rect l="0" t="0" r="0" b="0"/>
+          <a:pathLst>
+            <a:path>
+              <a:moveTo>
+                <a:pt x="280120" y="2605011"/>
+              </a:moveTo>
+              <a:arcTo wR="1677061" hR="1677061" stAng="8784301" swAng="2195396"/>
+            </a:path>
+          </a:pathLst>
+        </a:custGeom>
+        <a:noFill/>
+        <a:ln w="10000" cap="flat" cmpd="sng" algn="ctr">
+          <a:solidFill>
+            <a:schemeClr val="accent5">
+              <a:hueOff val="0"/>
+              <a:satOff val="0"/>
+              <a:lumOff val="0"/>
+              <a:alphaOff val="0"/>
+            </a:schemeClr>
+          </a:solidFill>
+          <a:prstDash val="solid"/>
+        </a:ln>
+        <a:effectLst/>
+      </dsp:spPr>
+      <dsp:style>
+        <a:lnRef idx="1">
+          <a:scrgbClr r="0" g="0" b="0"/>
+        </a:lnRef>
+        <a:fillRef idx="0">
+          <a:scrgbClr r="0" g="0" b="0"/>
+        </a:fillRef>
+        <a:effectRef idx="0">
+          <a:scrgbClr r="0" g="0" b="0"/>
+        </a:effectRef>
+        <a:fontRef idx="minor"/>
+      </dsp:style>
+    </dsp:sp>
+    <dsp:sp modelId="{7E4B80E4-9D97-4F8A-ABF5-4CECC4686258}">
+      <dsp:nvSpPr>
+        <dsp:cNvPr id="0" name=""/>
+        <dsp:cNvSpPr/>
+      </dsp:nvSpPr>
+      <dsp:spPr>
+        <a:xfrm>
+          <a:off x="3288848" y="1161866"/>
+          <a:ext cx="1292003" cy="839802"/>
+        </a:xfrm>
+        <a:prstGeom prst="roundRect">
+          <a:avLst/>
+        </a:prstGeom>
+        <a:solidFill>
+          <a:schemeClr val="accent6">
+            <a:hueOff val="0"/>
+            <a:satOff val="0"/>
+            <a:lumOff val="0"/>
+            <a:alphaOff val="0"/>
+          </a:schemeClr>
+        </a:solidFill>
+        <a:ln w="38100" cmpd="sng">
+          <a:solidFill>
+            <a:schemeClr val="accent2">
+              <a:lumMod val="20000"/>
+              <a:lumOff val="80000"/>
+            </a:schemeClr>
+          </a:solidFill>
+        </a:ln>
+        <a:effectLst>
+          <a:outerShdw blurRad="38100" dist="30000" dir="5400000" rotWithShape="0">
+            <a:srgbClr val="000000">
+              <a:alpha val="45000"/>
+            </a:srgbClr>
+          </a:outerShdw>
+        </a:effectLst>
+      </dsp:spPr>
+      <dsp:style>
+        <a:lnRef idx="0">
+          <a:scrgbClr r="0" g="0" b="0"/>
+        </a:lnRef>
+        <a:fillRef idx="3">
+          <a:scrgbClr r="0" g="0" b="0"/>
+        </a:fillRef>
+        <a:effectRef idx="2">
+          <a:scrgbClr r="0" g="0" b="0"/>
+        </a:effectRef>
+        <a:fontRef idx="minor">
+          <a:schemeClr val="lt1"/>
+        </a:fontRef>
+      </dsp:style>
+      <dsp:txBody>
+        <a:bodyPr spcFirstLastPara="0" vert="horz" wrap="square" lIns="60960" tIns="60960" rIns="60960" bIns="60960" numCol="1" spcCol="1270" anchor="ctr" anchorCtr="0">
+          <a:noAutofit/>
+        </a:bodyPr>
+        <a:lstStyle/>
+        <a:p>
+          <a:pPr lvl="0" algn="ctr" defTabSz="711200">
+            <a:lnSpc>
+              <a:spcPct val="90000"/>
+            </a:lnSpc>
+            <a:spcBef>
+              <a:spcPct val="0"/>
+            </a:spcBef>
+            <a:spcAft>
+              <a:spcPct val="35000"/>
+            </a:spcAft>
+          </a:pPr>
+          <a:r>
+            <a:rPr lang="de-DE" sz="1600" b="0" i="0" kern="1200" smtClean="0"/>
+            <a:t>Rapid Elasticity</a:t>
+          </a:r>
+          <a:endParaRPr lang="de-DE" sz="1600" b="0" i="0" kern="1200" dirty="0"/>
+        </a:p>
+      </dsp:txBody>
+      <dsp:txXfrm>
+        <a:off x="3329844" y="1202862"/>
+        <a:ext cx="1210011" cy="757810"/>
+      </dsp:txXfrm>
+    </dsp:sp>
+    <dsp:sp modelId="{749D468D-54CC-41A3-B2EA-89E619386BCE}">
+      <dsp:nvSpPr>
+        <dsp:cNvPr id="0" name=""/>
+        <dsp:cNvSpPr/>
+      </dsp:nvSpPr>
+      <dsp:spPr>
+        <a:xfrm>
+          <a:off x="3852769" y="422946"/>
+          <a:ext cx="3354123" cy="3354123"/>
+        </a:xfrm>
+        <a:custGeom>
+          <a:avLst/>
+          <a:gdLst/>
+          <a:ahLst/>
+          <a:cxnLst/>
+          <a:rect l="0" t="0" r="0" b="0"/>
+          <a:pathLst>
+            <a:path>
+              <a:moveTo>
+                <a:pt x="292348" y="730962"/>
+              </a:moveTo>
+              <a:arcTo wR="1677061" hR="1677061" stAng="12860560" swAng="1960358"/>
+            </a:path>
+          </a:pathLst>
+        </a:custGeom>
+        <a:noFill/>
+        <a:ln w="10000" cap="flat" cmpd="sng" algn="ctr">
+          <a:solidFill>
+            <a:schemeClr val="accent6">
+              <a:hueOff val="0"/>
+              <a:satOff val="0"/>
+              <a:lumOff val="0"/>
+              <a:alphaOff val="0"/>
+            </a:schemeClr>
+          </a:solidFill>
+          <a:prstDash val="solid"/>
+        </a:ln>
+        <a:effectLst/>
+      </dsp:spPr>
+      <dsp:style>
+        <a:lnRef idx="1">
+          <a:scrgbClr r="0" g="0" b="0"/>
+        </a:lnRef>
+        <a:fillRef idx="0">
+          <a:scrgbClr r="0" g="0" b="0"/>
+        </a:fillRef>
+        <a:effectRef idx="0">
+          <a:scrgbClr r="0" g="0" b="0"/>
+        </a:effectRef>
+        <a:fontRef idx="minor"/>
+      </dsp:style>
+    </dsp:sp>
   </dsp:spTree>
 </dsp:drawing>
 </file>
@@ -4636,326 +5298,6 @@
 </p:notes>
 </file>
 
-<file path=ppt/notesSlides/notesSlide26.xml><?xml version="1.0" encoding="utf-8"?>
-<p:notes xmlns:a="http://schemas.openxmlformats.org/drawingml/2006/main" xmlns:r="http://schemas.openxmlformats.org/officeDocument/2006/relationships" xmlns:p="http://schemas.openxmlformats.org/presentationml/2006/main">
-  <p:cSld>
-    <p:spTree>
-      <p:nvGrpSpPr>
-        <p:cNvPr id="1" name=""/>
-        <p:cNvGrpSpPr/>
-        <p:nvPr/>
-      </p:nvGrpSpPr>
-      <p:grpSpPr>
-        <a:xfrm>
-          <a:off x="0" y="0"/>
-          <a:ext cx="0" cy="0"/>
-          <a:chOff x="0" y="0"/>
-          <a:chExt cx="0" cy="0"/>
-        </a:xfrm>
-      </p:grpSpPr>
-      <p:sp>
-        <p:nvSpPr>
-          <p:cNvPr id="4" name="Slide Number Placeholder 3"/>
-          <p:cNvSpPr>
-            <a:spLocks noGrp="1"/>
-          </p:cNvSpPr>
-          <p:nvPr>
-            <p:ph type="sldNum" sz="quarter" idx="10"/>
-          </p:nvPr>
-        </p:nvSpPr>
-        <p:spPr/>
-        <p:txBody>
-          <a:bodyPr/>
-          <a:lstStyle/>
-          <a:p>
-            <a:fld id="{7D8C2C35-2B8A-446E-BEC0-FD36716C29AC}" type="slidenum">
-              <a:rPr lang="en-US" smtClean="0"/>
-              <a:pPr/>
-              <a:t>28</a:t>
-            </a:fld>
-            <a:endParaRPr lang="en-US" dirty="0"/>
-          </a:p>
-        </p:txBody>
-      </p:sp>
-      <p:sp>
-        <p:nvSpPr>
-          <p:cNvPr id="3" name="Slide Image Placeholder 2"/>
-          <p:cNvSpPr>
-            <a:spLocks noGrp="1" noRot="1" noChangeAspect="1"/>
-          </p:cNvSpPr>
-          <p:nvPr>
-            <p:ph type="sldImg"/>
-          </p:nvPr>
-        </p:nvSpPr>
-        <p:spPr/>
-      </p:sp>
-      <p:sp>
-        <p:nvSpPr>
-          <p:cNvPr id="5" name="Notes Placeholder 4"/>
-          <p:cNvSpPr>
-            <a:spLocks noGrp="1"/>
-          </p:cNvSpPr>
-          <p:nvPr>
-            <p:ph type="body" idx="1"/>
-          </p:nvPr>
-        </p:nvSpPr>
-        <p:spPr/>
-        <p:txBody>
-          <a:bodyPr/>
-          <a:lstStyle/>
-          <a:p>
-            <a:endParaRPr lang="en-US"/>
-          </a:p>
-        </p:txBody>
-      </p:sp>
-    </p:spTree>
-  </p:cSld>
-  <p:clrMapOvr>
-    <a:masterClrMapping/>
-  </p:clrMapOvr>
-</p:notes>
-</file>
-
-<file path=ppt/notesSlides/notesSlide27.xml><?xml version="1.0" encoding="utf-8"?>
-<p:notes xmlns:a="http://schemas.openxmlformats.org/drawingml/2006/main" xmlns:r="http://schemas.openxmlformats.org/officeDocument/2006/relationships" xmlns:p="http://schemas.openxmlformats.org/presentationml/2006/main">
-  <p:cSld>
-    <p:spTree>
-      <p:nvGrpSpPr>
-        <p:cNvPr id="1" name=""/>
-        <p:cNvGrpSpPr/>
-        <p:nvPr/>
-      </p:nvGrpSpPr>
-      <p:grpSpPr>
-        <a:xfrm>
-          <a:off x="0" y="0"/>
-          <a:ext cx="0" cy="0"/>
-          <a:chOff x="0" y="0"/>
-          <a:chExt cx="0" cy="0"/>
-        </a:xfrm>
-      </p:grpSpPr>
-      <p:sp>
-        <p:nvSpPr>
-          <p:cNvPr id="4" name="Slide Number Placeholder 3"/>
-          <p:cNvSpPr>
-            <a:spLocks noGrp="1"/>
-          </p:cNvSpPr>
-          <p:nvPr>
-            <p:ph type="sldNum" sz="quarter" idx="10"/>
-          </p:nvPr>
-        </p:nvSpPr>
-        <p:spPr/>
-        <p:txBody>
-          <a:bodyPr/>
-          <a:lstStyle/>
-          <a:p>
-            <a:fld id="{7D8C2C35-2B8A-446E-BEC0-FD36716C29AC}" type="slidenum">
-              <a:rPr lang="en-US" smtClean="0"/>
-              <a:pPr/>
-              <a:t>29</a:t>
-            </a:fld>
-            <a:endParaRPr lang="en-US" dirty="0"/>
-          </a:p>
-        </p:txBody>
-      </p:sp>
-      <p:sp>
-        <p:nvSpPr>
-          <p:cNvPr id="3" name="Slide Image Placeholder 2"/>
-          <p:cNvSpPr>
-            <a:spLocks noGrp="1" noRot="1" noChangeAspect="1"/>
-          </p:cNvSpPr>
-          <p:nvPr>
-            <p:ph type="sldImg"/>
-          </p:nvPr>
-        </p:nvSpPr>
-        <p:spPr/>
-      </p:sp>
-      <p:sp>
-        <p:nvSpPr>
-          <p:cNvPr id="5" name="Notes Placeholder 4"/>
-          <p:cNvSpPr>
-            <a:spLocks noGrp="1"/>
-          </p:cNvSpPr>
-          <p:nvPr>
-            <p:ph type="body" idx="1"/>
-          </p:nvPr>
-        </p:nvSpPr>
-        <p:spPr/>
-        <p:txBody>
-          <a:bodyPr/>
-          <a:lstStyle/>
-          <a:p>
-            <a:endParaRPr lang="en-US"/>
-          </a:p>
-        </p:txBody>
-      </p:sp>
-    </p:spTree>
-  </p:cSld>
-  <p:clrMapOvr>
-    <a:masterClrMapping/>
-  </p:clrMapOvr>
-</p:notes>
-</file>
-
-<file path=ppt/notesSlides/notesSlide28.xml><?xml version="1.0" encoding="utf-8"?>
-<p:notes xmlns:a="http://schemas.openxmlformats.org/drawingml/2006/main" xmlns:r="http://schemas.openxmlformats.org/officeDocument/2006/relationships" xmlns:p="http://schemas.openxmlformats.org/presentationml/2006/main">
-  <p:cSld>
-    <p:spTree>
-      <p:nvGrpSpPr>
-        <p:cNvPr id="1" name=""/>
-        <p:cNvGrpSpPr/>
-        <p:nvPr/>
-      </p:nvGrpSpPr>
-      <p:grpSpPr>
-        <a:xfrm>
-          <a:off x="0" y="0"/>
-          <a:ext cx="0" cy="0"/>
-          <a:chOff x="0" y="0"/>
-          <a:chExt cx="0" cy="0"/>
-        </a:xfrm>
-      </p:grpSpPr>
-      <p:sp>
-        <p:nvSpPr>
-          <p:cNvPr id="4" name="Slide Number Placeholder 3"/>
-          <p:cNvSpPr>
-            <a:spLocks noGrp="1"/>
-          </p:cNvSpPr>
-          <p:nvPr>
-            <p:ph type="sldNum" sz="quarter" idx="10"/>
-          </p:nvPr>
-        </p:nvSpPr>
-        <p:spPr/>
-        <p:txBody>
-          <a:bodyPr/>
-          <a:lstStyle/>
-          <a:p>
-            <a:fld id="{7D8C2C35-2B8A-446E-BEC0-FD36716C29AC}" type="slidenum">
-              <a:rPr lang="en-US" smtClean="0"/>
-              <a:pPr/>
-              <a:t>30</a:t>
-            </a:fld>
-            <a:endParaRPr lang="en-US" dirty="0"/>
-          </a:p>
-        </p:txBody>
-      </p:sp>
-      <p:sp>
-        <p:nvSpPr>
-          <p:cNvPr id="3" name="Slide Image Placeholder 2"/>
-          <p:cNvSpPr>
-            <a:spLocks noGrp="1" noRot="1" noChangeAspect="1"/>
-          </p:cNvSpPr>
-          <p:nvPr>
-            <p:ph type="sldImg"/>
-          </p:nvPr>
-        </p:nvSpPr>
-        <p:spPr/>
-      </p:sp>
-      <p:sp>
-        <p:nvSpPr>
-          <p:cNvPr id="5" name="Notes Placeholder 4"/>
-          <p:cNvSpPr>
-            <a:spLocks noGrp="1"/>
-          </p:cNvSpPr>
-          <p:nvPr>
-            <p:ph type="body" idx="1"/>
-          </p:nvPr>
-        </p:nvSpPr>
-        <p:spPr/>
-        <p:txBody>
-          <a:bodyPr/>
-          <a:lstStyle/>
-          <a:p>
-            <a:endParaRPr lang="en-US"/>
-          </a:p>
-        </p:txBody>
-      </p:sp>
-    </p:spTree>
-  </p:cSld>
-  <p:clrMapOvr>
-    <a:masterClrMapping/>
-  </p:clrMapOvr>
-</p:notes>
-</file>
-
-<file path=ppt/notesSlides/notesSlide29.xml><?xml version="1.0" encoding="utf-8"?>
-<p:notes xmlns:a="http://schemas.openxmlformats.org/drawingml/2006/main" xmlns:r="http://schemas.openxmlformats.org/officeDocument/2006/relationships" xmlns:p="http://schemas.openxmlformats.org/presentationml/2006/main">
-  <p:cSld>
-    <p:spTree>
-      <p:nvGrpSpPr>
-        <p:cNvPr id="1" name=""/>
-        <p:cNvGrpSpPr/>
-        <p:nvPr/>
-      </p:nvGrpSpPr>
-      <p:grpSpPr>
-        <a:xfrm>
-          <a:off x="0" y="0"/>
-          <a:ext cx="0" cy="0"/>
-          <a:chOff x="0" y="0"/>
-          <a:chExt cx="0" cy="0"/>
-        </a:xfrm>
-      </p:grpSpPr>
-      <p:sp>
-        <p:nvSpPr>
-          <p:cNvPr id="4" name="Slide Number Placeholder 3"/>
-          <p:cNvSpPr>
-            <a:spLocks noGrp="1"/>
-          </p:cNvSpPr>
-          <p:nvPr>
-            <p:ph type="sldNum" sz="quarter" idx="10"/>
-          </p:nvPr>
-        </p:nvSpPr>
-        <p:spPr/>
-        <p:txBody>
-          <a:bodyPr/>
-          <a:lstStyle/>
-          <a:p>
-            <a:fld id="{7D8C2C35-2B8A-446E-BEC0-FD36716C29AC}" type="slidenum">
-              <a:rPr lang="en-US" smtClean="0"/>
-              <a:pPr/>
-              <a:t>31</a:t>
-            </a:fld>
-            <a:endParaRPr lang="en-US" dirty="0"/>
-          </a:p>
-        </p:txBody>
-      </p:sp>
-      <p:sp>
-        <p:nvSpPr>
-          <p:cNvPr id="3" name="Slide Image Placeholder 2"/>
-          <p:cNvSpPr>
-            <a:spLocks noGrp="1" noRot="1" noChangeAspect="1"/>
-          </p:cNvSpPr>
-          <p:nvPr>
-            <p:ph type="sldImg"/>
-          </p:nvPr>
-        </p:nvSpPr>
-        <p:spPr/>
-      </p:sp>
-      <p:sp>
-        <p:nvSpPr>
-          <p:cNvPr id="5" name="Notes Placeholder 4"/>
-          <p:cNvSpPr>
-            <a:spLocks noGrp="1"/>
-          </p:cNvSpPr>
-          <p:nvPr>
-            <p:ph type="body" idx="1"/>
-          </p:nvPr>
-        </p:nvSpPr>
-        <p:spPr/>
-        <p:txBody>
-          <a:bodyPr/>
-          <a:lstStyle/>
-          <a:p>
-            <a:endParaRPr lang="en-US"/>
-          </a:p>
-        </p:txBody>
-      </p:sp>
-    </p:spTree>
-  </p:cSld>
-  <p:clrMapOvr>
-    <a:masterClrMapping/>
-  </p:clrMapOvr>
-</p:notes>
-</file>
-
 <file path=ppt/notesSlides/notesSlide3.xml><?xml version="1.0" encoding="utf-8"?>
 <p:notes xmlns:a="http://schemas.openxmlformats.org/drawingml/2006/main" xmlns:r="http://schemas.openxmlformats.org/officeDocument/2006/relationships" xmlns:p="http://schemas.openxmlformats.org/presentationml/2006/main">
   <p:cSld>
@@ -12221,28 +12563,105 @@
               <a:rPr lang="en-US" dirty="0" smtClean="0"/>
               <a:t>Configuration Management Tool</a:t>
             </a:r>
-          </a:p>
-          <a:p>
-            <a:pPr lvl="1"/>
-            <a:r>
-              <a:rPr lang="en-US" dirty="0" smtClean="0"/>
-              <a:t>An encrypted file stored in Amazon storage, containing all the information necessary to boot instances of a customer’s software</a:t>
-            </a:r>
+            <a:endParaRPr lang="en-US" dirty="0" smtClean="0"/>
           </a:p>
           <a:p>
             <a:pPr lvl="2"/>
-            <a:r>
-              <a:rPr lang="en-US" dirty="0" smtClean="0"/>
-              <a:t>An AMI is like a bootable root disk, which can be pre-defined or u</a:t>
+            <a:endParaRPr lang="en-US" dirty="0" smtClean="0"/>
+          </a:p>
+          <a:p>
+            <a:pPr lvl="2"/>
+            <a:r>
+              <a:rPr lang="en-US" dirty="0" smtClean="0"/>
+              <a:t>Uses Ruby based Domain Specific Language for writing recipes</a:t>
+            </a:r>
+          </a:p>
+          <a:p>
+            <a:pPr lvl="2"/>
+            <a:r>
+              <a:rPr lang="en-US" dirty="0" smtClean="0"/>
+              <a:t>Can integrate with cloud-based platform but not originally built for that</a:t>
             </a:r>
             <a:endParaRPr lang="en-US" dirty="0"/>
           </a:p>
-        </p:txBody>
-      </p:sp>
+          <a:p>
+            <a:pPr lvl="2"/>
+            <a:r>
+              <a:rPr lang="en-US" dirty="0" smtClean="0"/>
+              <a:t>The API is written both in Ruby and </a:t>
+            </a:r>
+            <a:r>
+              <a:rPr lang="en-US" dirty="0" err="1" smtClean="0"/>
+              <a:t>Erlang</a:t>
+            </a:r>
+            <a:endParaRPr lang="en-US" dirty="0" smtClean="0"/>
+          </a:p>
+          <a:p>
+            <a:pPr lvl="2"/>
+            <a:r>
+              <a:rPr lang="en-US" dirty="0" smtClean="0"/>
+              <a:t>Supports multiple platforms for clients Solaris, FreeBSD, OS X, Ubuntu, </a:t>
+            </a:r>
+            <a:r>
+              <a:rPr lang="en-US" dirty="0" err="1" smtClean="0"/>
+              <a:t>Debian</a:t>
+            </a:r>
+            <a:r>
+              <a:rPr lang="en-US" dirty="0" smtClean="0"/>
+              <a:t>, Fedora, Microsoft Windows</a:t>
+            </a:r>
+            <a:endParaRPr lang="en-US" dirty="0"/>
+          </a:p>
+          <a:p>
+            <a:pPr lvl="2"/>
+            <a:r>
+              <a:rPr lang="en-US" dirty="0" smtClean="0"/>
+              <a:t>Server is supported on Oracle Linux/</a:t>
+            </a:r>
+            <a:r>
+              <a:rPr lang="en-US" dirty="0" err="1" smtClean="0"/>
+              <a:t>CentOS</a:t>
+            </a:r>
+            <a:r>
+              <a:rPr lang="en-US" dirty="0"/>
+              <a:t> </a:t>
+            </a:r>
+            <a:r>
+              <a:rPr lang="en-US" dirty="0" smtClean="0"/>
+              <a:t>and Ubuntu</a:t>
+            </a:r>
+            <a:endParaRPr lang="en-US" dirty="0"/>
+          </a:p>
+        </p:txBody>
+      </p:sp>
+      <p:pic>
+        <p:nvPicPr>
+          <p:cNvPr id="3" name="Picture 2"/>
+          <p:cNvPicPr>
+            <a:picLocks noChangeAspect="1"/>
+          </p:cNvPicPr>
+          <p:nvPr/>
+        </p:nvPicPr>
+        <p:blipFill>
+          <a:blip r:embed="rId3"/>
+          <a:stretch>
+            <a:fillRect/>
+          </a:stretch>
+        </p:blipFill>
+        <p:spPr>
+          <a:xfrm>
+            <a:off x="9895488" y="4360524"/>
+            <a:ext cx="1975569" cy="2160825"/>
+          </a:xfrm>
+          <a:prstGeom prst="rect">
+            <a:avLst/>
+          </a:prstGeom>
+        </p:spPr>
+      </p:pic>
     </p:spTree>
     <p:extLst>
       <p:ext uri="{BB962C8B-B14F-4D97-AF65-F5344CB8AC3E}">
-        <p14:creationId xmlns:p14="http://schemas.microsoft.com/office/powerpoint/2010/main" val="558960121"/>
+        <p14:creationId xmlns:p14="http://schemas.microsoft.com/office/powerpoint/2010/main" val="92263987"/>
       </p:ext>
     </p:extLst>
   </p:cSld>
@@ -12277,6 +12696,66 @@
           <a:chExt cx="0" cy="0"/>
         </a:xfrm>
       </p:grpSpPr>
+      <p:pic>
+        <p:nvPicPr>
+          <p:cNvPr id="6" name="Picture 5" descr="Screen Shot 2015-09-02 at 2.31.56 PM.png"/>
+          <p:cNvPicPr>
+            <a:picLocks noChangeAspect="1"/>
+          </p:cNvPicPr>
+          <p:nvPr/>
+        </p:nvPicPr>
+        <p:blipFill>
+          <a:blip r:embed="rId3">
+            <a:extLst>
+              <a:ext uri="{28A0092B-C50C-407E-A947-70E740481C1C}">
+                <a14:useLocalDpi xmlns:a14="http://schemas.microsoft.com/office/drawing/2010/main" val="0"/>
+              </a:ext>
+            </a:extLst>
+          </a:blip>
+          <a:stretch>
+            <a:fillRect/>
+          </a:stretch>
+        </p:blipFill>
+        <p:spPr>
+          <a:xfrm>
+            <a:off x="6314781" y="2492487"/>
+            <a:ext cx="4744881" cy="3969884"/>
+          </a:xfrm>
+          <a:prstGeom prst="rect">
+            <a:avLst/>
+          </a:prstGeom>
+        </p:spPr>
+      </p:pic>
+      <p:pic>
+        <p:nvPicPr>
+          <p:cNvPr id="4" name="Picture 3" descr="Screen Shot 2015-09-02 at 2.31.03 PM.png"/>
+          <p:cNvPicPr>
+            <a:picLocks noChangeAspect="1"/>
+          </p:cNvPicPr>
+          <p:nvPr/>
+        </p:nvPicPr>
+        <p:blipFill>
+          <a:blip r:embed="rId4">
+            <a:extLst>
+              <a:ext uri="{28A0092B-C50C-407E-A947-70E740481C1C}">
+                <a14:useLocalDpi xmlns:a14="http://schemas.microsoft.com/office/drawing/2010/main" val="0"/>
+              </a:ext>
+            </a:extLst>
+          </a:blip>
+          <a:stretch>
+            <a:fillRect/>
+          </a:stretch>
+        </p:blipFill>
+        <p:spPr>
+          <a:xfrm>
+            <a:off x="891135" y="3206251"/>
+            <a:ext cx="2513195" cy="3244647"/>
+          </a:xfrm>
+          <a:prstGeom prst="rect">
+            <a:avLst/>
+          </a:prstGeom>
+        </p:spPr>
+      </p:pic>
       <p:sp>
         <p:nvSpPr>
           <p:cNvPr id="2" name="Title 1"/>
@@ -12294,11 +12773,11 @@
           <a:p>
             <a:r>
               <a:rPr lang="en-US" dirty="0" err="1" smtClean="0"/>
-              <a:t>PuppetLabs</a:t>
-            </a:r>
-            <a:r>
-              <a:rPr lang="en-US" dirty="0" smtClean="0"/>
-              <a:t> Puppet</a:t>
+              <a:t>SaltStack</a:t>
+            </a:r>
+            <a:r>
+              <a:rPr lang="en-US" dirty="0" smtClean="0"/>
+              <a:t> Salt</a:t>
             </a:r>
             <a:endParaRPr lang="en-US" dirty="0"/>
           </a:p>
@@ -12327,21 +12806,54 @@
             <a:pPr lvl="0"/>
             <a:r>
               <a:rPr lang="en-US" dirty="0" smtClean="0"/>
-              <a:t>Amazon Machine Image (AMI)</a:t>
-            </a:r>
-          </a:p>
-          <a:p>
-            <a:pPr lvl="1"/>
-            <a:r>
-              <a:rPr lang="en-US" dirty="0" smtClean="0"/>
-              <a:t>An encrypted file stored in Amazon storage, containing all the information necessary to boot instances of a customer’s software</a:t>
-            </a:r>
+              <a:t>Another Management Software for </a:t>
+            </a:r>
+            <a:r>
+              <a:rPr lang="en-US" dirty="0" err="1" smtClean="0"/>
+              <a:t>CloudOps</a:t>
+            </a:r>
+            <a:r>
+              <a:rPr lang="en-US" dirty="0" smtClean="0"/>
+              <a:t>, </a:t>
+            </a:r>
+            <a:r>
+              <a:rPr lang="en-US" dirty="0" err="1" smtClean="0"/>
+              <a:t>ITOps</a:t>
+            </a:r>
+            <a:r>
+              <a:rPr lang="en-US" dirty="0" smtClean="0"/>
+              <a:t>, </a:t>
+            </a:r>
+            <a:r>
+              <a:rPr lang="en-US" dirty="0" err="1" smtClean="0"/>
+              <a:t>DevOps</a:t>
+            </a:r>
+            <a:endParaRPr lang="en-US" dirty="0" smtClean="0"/>
           </a:p>
           <a:p>
             <a:pPr lvl="2"/>
             <a:r>
               <a:rPr lang="en-US" dirty="0" smtClean="0"/>
-              <a:t>An AMI is like a bootable root disk, which can be pre-defined or u</a:t>
+              <a:t>Written in Python</a:t>
+            </a:r>
+          </a:p>
+          <a:p>
+            <a:pPr lvl="2"/>
+            <a:r>
+              <a:rPr lang="en-US" dirty="0" smtClean="0"/>
+              <a:t>Configuration files written in YAML or </a:t>
+            </a:r>
+            <a:r>
+              <a:rPr lang="en-US" dirty="0" err="1" smtClean="0"/>
+              <a:t>PyDSL</a:t>
+            </a:r>
+            <a:endParaRPr lang="en-US" dirty="0" smtClean="0"/>
+          </a:p>
+          <a:p>
+            <a:pPr lvl="2"/>
+            <a:r>
+              <a:rPr lang="en-US" dirty="0" smtClean="0"/>
+              <a:t>Master-Client architecture and needs a Master always running</a:t>
             </a:r>
             <a:endParaRPr lang="en-US" dirty="0"/>
           </a:p>
@@ -12350,7 +12862,7 @@
     </p:spTree>
     <p:extLst>
       <p:ext uri="{BB962C8B-B14F-4D97-AF65-F5344CB8AC3E}">
-        <p14:creationId xmlns:p14="http://schemas.microsoft.com/office/powerpoint/2010/main" val="558960121"/>
+        <p14:creationId xmlns:p14="http://schemas.microsoft.com/office/powerpoint/2010/main" val="723571213"/>
       </p:ext>
     </p:extLst>
   </p:cSld>
@@ -13705,8 +14217,17 @@
             </a:r>
             <a:r>
               <a:rPr lang="en-US" dirty="0" smtClean="0"/>
-              <a:t> Chef, Puppet Labs Puppet</a:t>
-            </a:r>
+              <a:t> Chef, </a:t>
+            </a:r>
+            <a:r>
+              <a:rPr lang="en-US" dirty="0" err="1" smtClean="0"/>
+              <a:t>Saltstack</a:t>
+            </a:r>
+            <a:r>
+              <a:rPr lang="en-US" dirty="0" smtClean="0"/>
+              <a:t> Salt</a:t>
+            </a:r>
+            <a:endParaRPr lang="en-US" dirty="0" smtClean="0"/>
           </a:p>
           <a:p>
             <a:r>
@@ -14100,15 +14621,15 @@
               <a:buChar char="•"/>
             </a:pPr>
             <a:r>
-              <a:rPr lang="en-US" dirty="0" smtClean="0"/>
+              <a:rPr lang="en-US" b="0" dirty="0" smtClean="0"/>
               <a:t>Scheduling of </a:t>
             </a:r>
             <a:r>
-              <a:rPr lang="en-US" dirty="0" err="1" smtClean="0"/>
+              <a:rPr lang="en-US" b="0" dirty="0" err="1" smtClean="0"/>
               <a:t>ansible</a:t>
             </a:r>
             <a:r>
-              <a:rPr lang="en-US" dirty="0" smtClean="0"/>
+              <a:rPr lang="en-US" b="0" dirty="0" smtClean="0"/>
               <a:t> tasks</a:t>
             </a:r>
           </a:p>
@@ -14118,7 +14639,7 @@
               <a:buChar char="•"/>
             </a:pPr>
             <a:r>
-              <a:rPr lang="en-US" dirty="0" smtClean="0"/>
+              <a:rPr lang="en-US" b="0" dirty="0" smtClean="0"/>
               <a:t>Direct machine access</a:t>
             </a:r>
           </a:p>
@@ -14128,10 +14649,10 @@
               <a:buChar char="•"/>
             </a:pPr>
             <a:r>
-              <a:rPr lang="en-US" dirty="0" smtClean="0"/>
+              <a:rPr lang="en-US" b="0" dirty="0" smtClean="0"/>
               <a:t>Logging of user actions</a:t>
             </a:r>
-            <a:endParaRPr lang="en-US" dirty="0"/>
+            <a:endParaRPr lang="en-US" b="0" dirty="0"/>
           </a:p>
         </p:txBody>
       </p:sp>
@@ -14206,22 +14727,15 @@
           <a:p>
             <a:r>
               <a:rPr lang="en-US" dirty="0" smtClean="0"/>
-              <a:t>Insert page title</a:t>
-            </a:r>
-            <a:br>
-              <a:rPr lang="en-US" dirty="0" smtClean="0"/>
-            </a:br>
-            <a:r>
-              <a:rPr lang="en-US" sz="2400" b="0" dirty="0" smtClean="0"/>
-              <a:t>Subtitle </a:t>
-            </a:r>
-            <a:endParaRPr lang="en-US" sz="2400" b="0" dirty="0"/>
-          </a:p>
-        </p:txBody>
-      </p:sp>
-      <p:sp>
-        <p:nvSpPr>
-          <p:cNvPr id="3" name="Text Placeholder 2"/>
+              <a:t>How can we leverage</a:t>
+            </a:r>
+            <a:endParaRPr lang="en-US" dirty="0"/>
+          </a:p>
+        </p:txBody>
+      </p:sp>
+      <p:sp>
+        <p:nvSpPr>
+          <p:cNvPr id="5" name="Text Placeholder 2"/>
           <p:cNvSpPr>
             <a:spLocks noGrp="1"/>
           </p:cNvSpPr>
@@ -14229,7 +14743,12 @@
             <p:ph type="body" sz="quarter" idx="10"/>
           </p:nvPr>
         </p:nvSpPr>
-        <p:spPr/>
+        <p:spPr>
+          <a:xfrm>
+            <a:off x="324000" y="1585241"/>
+            <a:ext cx="11545200" cy="4870842"/>
+          </a:xfrm>
+        </p:spPr>
         <p:txBody>
           <a:bodyPr/>
           <a:lstStyle/>
@@ -14237,26 +14756,87 @@
             <a:pPr lvl="0"/>
             <a:r>
               <a:rPr lang="en-US" dirty="0" smtClean="0"/>
-              <a:t>First level</a:t>
-            </a:r>
-          </a:p>
-          <a:p>
-            <a:pPr lvl="1"/>
-            <a:r>
-              <a:rPr lang="en-US" dirty="0" smtClean="0"/>
-              <a:t>Second level</a:t>
-            </a:r>
-          </a:p>
-          <a:p>
-            <a:pPr lvl="2"/>
-            <a:r>
-              <a:rPr lang="en-US" dirty="0" smtClean="0"/>
-              <a:t>Third level</a:t>
-            </a:r>
-          </a:p>
-        </p:txBody>
-      </p:sp>
+              <a:t>Questions?</a:t>
+            </a:r>
+          </a:p>
+          <a:p>
+            <a:pPr lvl="0"/>
+            <a:endParaRPr lang="en-US" dirty="0" smtClean="0"/>
+          </a:p>
+          <a:p>
+            <a:pPr lvl="0"/>
+            <a:endParaRPr lang="en-US" dirty="0"/>
+          </a:p>
+          <a:p>
+            <a:pPr lvl="0"/>
+            <a:endParaRPr lang="en-US" dirty="0" smtClean="0"/>
+          </a:p>
+          <a:p>
+            <a:pPr lvl="0"/>
+            <a:r>
+              <a:rPr lang="en-US" dirty="0" smtClean="0"/>
+              <a:t>How can we use this technology?</a:t>
+            </a:r>
+            <a:endParaRPr lang="en-US" dirty="0"/>
+          </a:p>
+        </p:txBody>
+      </p:sp>
+      <p:pic>
+        <p:nvPicPr>
+          <p:cNvPr id="6" name="Picture 5"/>
+          <p:cNvPicPr>
+            <a:picLocks noChangeAspect="1"/>
+          </p:cNvPicPr>
+          <p:nvPr/>
+        </p:nvPicPr>
+        <p:blipFill>
+          <a:blip r:embed="rId3"/>
+          <a:stretch>
+            <a:fillRect/>
+          </a:stretch>
+        </p:blipFill>
+        <p:spPr>
+          <a:xfrm>
+            <a:off x="10807756" y="319240"/>
+            <a:ext cx="1021368" cy="1021368"/>
+          </a:xfrm>
+          <a:prstGeom prst="roundRect">
+            <a:avLst>
+              <a:gd name="adj" fmla="val 4167"/>
+            </a:avLst>
+          </a:prstGeom>
+          <a:solidFill>
+            <a:srgbClr val="FFFFFF"/>
+          </a:solidFill>
+          <a:ln w="76200" cap="sq">
+            <a:solidFill>
+              <a:srgbClr val="292929"/>
+            </a:solidFill>
+            <a:miter lim="800000"/>
+          </a:ln>
+          <a:effectLst>
+            <a:reflection blurRad="12700" stA="28000" endPos="28000" dist="5000" dir="5400000" sy="-100000" algn="bl" rotWithShape="0"/>
+          </a:effectLst>
+          <a:scene3d>
+            <a:camera prst="orthographicFront"/>
+            <a:lightRig rig="threePt" dir="t">
+              <a:rot lat="0" lon="0" rev="2700000"/>
+            </a:lightRig>
+          </a:scene3d>
+          <a:sp3d>
+            <a:bevelT h="38100"/>
+            <a:contourClr>
+              <a:srgbClr val="C0C0C0"/>
+            </a:contourClr>
+          </a:sp3d>
+        </p:spPr>
+      </p:pic>
     </p:spTree>
+    <p:extLst>
+      <p:ext uri="{BB962C8B-B14F-4D97-AF65-F5344CB8AC3E}">
+        <p14:creationId xmlns:p14="http://schemas.microsoft.com/office/powerpoint/2010/main" val="1572519884"/>
+      </p:ext>
+    </p:extLst>
   </p:cSld>
   <p:clrMapOvr>
     <a:masterClrMapping/>
@@ -14291,12 +14871,12 @@
       </p:grpSpPr>
       <p:sp>
         <p:nvSpPr>
-          <p:cNvPr id="2" name="Title 1"/>
+          <p:cNvPr id="5" name="Title 4"/>
           <p:cNvSpPr>
             <a:spLocks noGrp="1"/>
           </p:cNvSpPr>
           <p:nvPr>
-            <p:ph type="title"/>
+            <p:ph type="ctrTitle"/>
           </p:nvPr>
         </p:nvSpPr>
         <p:spPr/>
@@ -14306,331 +14886,9 @@
           <a:p>
             <a:r>
               <a:rPr lang="en-US" dirty="0" smtClean="0"/>
-              <a:t>Insert page title </a:t>
+              <a:t>Thank you</a:t>
             </a:r>
             <a:endParaRPr lang="en-US" dirty="0"/>
-          </a:p>
-        </p:txBody>
-      </p:sp>
-      <p:sp>
-        <p:nvSpPr>
-          <p:cNvPr id="4" name="Text Placeholder 3"/>
-          <p:cNvSpPr>
-            <a:spLocks noGrp="1"/>
-          </p:cNvSpPr>
-          <p:nvPr>
-            <p:ph type="body" sz="quarter" idx="11"/>
-          </p:nvPr>
-        </p:nvSpPr>
-        <p:spPr/>
-        <p:txBody>
-          <a:bodyPr/>
-          <a:lstStyle/>
-          <a:p>
-            <a:pPr lvl="0"/>
-            <a:r>
-              <a:rPr lang="en-US" dirty="0" smtClean="0"/>
-              <a:t>First level</a:t>
-            </a:r>
-          </a:p>
-          <a:p>
-            <a:pPr lvl="1"/>
-            <a:r>
-              <a:rPr lang="en-US" dirty="0" smtClean="0"/>
-              <a:t>Second level</a:t>
-            </a:r>
-          </a:p>
-          <a:p>
-            <a:pPr lvl="2"/>
-            <a:r>
-              <a:rPr lang="en-US" dirty="0" smtClean="0"/>
-              <a:t>Third level</a:t>
-            </a:r>
-            <a:endParaRPr lang="en-US" dirty="0"/>
-          </a:p>
-        </p:txBody>
-      </p:sp>
-      <p:sp>
-        <p:nvSpPr>
-          <p:cNvPr id="5" name="Picture Placeholder 4"/>
-          <p:cNvSpPr>
-            <a:spLocks noGrp="1"/>
-          </p:cNvSpPr>
-          <p:nvPr>
-            <p:ph type="pic" sz="quarter" idx="10"/>
-          </p:nvPr>
-        </p:nvSpPr>
-        <p:spPr/>
-      </p:sp>
-    </p:spTree>
-  </p:cSld>
-  <p:clrMapOvr>
-    <a:masterClrMapping/>
-  </p:clrMapOvr>
-  <p:transition xmlns:p14="http://schemas.microsoft.com/office/powerpoint/2010/main" spd="med"/>
-  <p:timing>
-    <p:tnLst>
-      <p:par>
-        <p:cTn xmlns:p14="http://schemas.microsoft.com/office/powerpoint/2010/main" id="1" dur="indefinite" restart="never" nodeType="tmRoot"/>
-      </p:par>
-    </p:tnLst>
-  </p:timing>
-</p:sld>
-</file>
-
-<file path=ppt/slides/slide25.xml><?xml version="1.0" encoding="utf-8"?>
-<p:sld xmlns:a="http://schemas.openxmlformats.org/drawingml/2006/main" xmlns:r="http://schemas.openxmlformats.org/officeDocument/2006/relationships" xmlns:p="http://schemas.openxmlformats.org/presentationml/2006/main">
-  <p:cSld>
-    <p:spTree>
-      <p:nvGrpSpPr>
-        <p:cNvPr id="1" name=""/>
-        <p:cNvGrpSpPr/>
-        <p:nvPr/>
-      </p:nvGrpSpPr>
-      <p:grpSpPr>
-        <a:xfrm>
-          <a:off x="0" y="0"/>
-          <a:ext cx="0" cy="0"/>
-          <a:chOff x="0" y="0"/>
-          <a:chExt cx="0" cy="0"/>
-        </a:xfrm>
-      </p:grpSpPr>
-      <p:sp>
-        <p:nvSpPr>
-          <p:cNvPr id="2" name="Title 1"/>
-          <p:cNvSpPr>
-            <a:spLocks noGrp="1"/>
-          </p:cNvSpPr>
-          <p:nvPr>
-            <p:ph type="title"/>
-          </p:nvPr>
-        </p:nvSpPr>
-        <p:spPr/>
-        <p:txBody>
-          <a:bodyPr/>
-          <a:lstStyle/>
-          <a:p>
-            <a:r>
-              <a:rPr lang="en-US" dirty="0" smtClean="0"/>
-              <a:t>Insert page title </a:t>
-            </a:r>
-            <a:endParaRPr lang="en-US" dirty="0"/>
-          </a:p>
-        </p:txBody>
-      </p:sp>
-      <p:sp>
-        <p:nvSpPr>
-          <p:cNvPr id="4" name="Text Placeholder 3"/>
-          <p:cNvSpPr>
-            <a:spLocks noGrp="1"/>
-          </p:cNvSpPr>
-          <p:nvPr>
-            <p:ph type="body" sz="quarter" idx="11"/>
-          </p:nvPr>
-        </p:nvSpPr>
-        <p:spPr/>
-        <p:txBody>
-          <a:bodyPr/>
-          <a:lstStyle/>
-          <a:p>
-            <a:pPr lvl="0"/>
-            <a:r>
-              <a:rPr lang="en-US" dirty="0" smtClean="0"/>
-              <a:t>First level</a:t>
-            </a:r>
-          </a:p>
-          <a:p>
-            <a:pPr lvl="1"/>
-            <a:r>
-              <a:rPr lang="en-US" dirty="0" smtClean="0"/>
-              <a:t>Second level</a:t>
-            </a:r>
-          </a:p>
-          <a:p>
-            <a:pPr lvl="2"/>
-            <a:r>
-              <a:rPr lang="en-US" dirty="0" smtClean="0"/>
-              <a:t>Third level</a:t>
-            </a:r>
-          </a:p>
-          <a:p>
-            <a:endParaRPr lang="en-US" dirty="0"/>
-          </a:p>
-        </p:txBody>
-      </p:sp>
-      <p:sp>
-        <p:nvSpPr>
-          <p:cNvPr id="5" name="Picture Placeholder 4"/>
-          <p:cNvSpPr>
-            <a:spLocks noGrp="1"/>
-          </p:cNvSpPr>
-          <p:nvPr>
-            <p:ph type="pic" sz="quarter" idx="10"/>
-          </p:nvPr>
-        </p:nvSpPr>
-        <p:spPr/>
-      </p:sp>
-    </p:spTree>
-  </p:cSld>
-  <p:clrMapOvr>
-    <a:masterClrMapping/>
-  </p:clrMapOvr>
-  <p:transition xmlns:p14="http://schemas.microsoft.com/office/powerpoint/2010/main" spd="med"/>
-  <p:timing>
-    <p:tnLst>
-      <p:par>
-        <p:cTn xmlns:p14="http://schemas.microsoft.com/office/powerpoint/2010/main" id="1" dur="indefinite" restart="never" nodeType="tmRoot"/>
-      </p:par>
-    </p:tnLst>
-  </p:timing>
-</p:sld>
-</file>
-
-<file path=ppt/slides/slide26.xml><?xml version="1.0" encoding="utf-8"?>
-<p:sld xmlns:a="http://schemas.openxmlformats.org/drawingml/2006/main" xmlns:r="http://schemas.openxmlformats.org/officeDocument/2006/relationships" xmlns:p="http://schemas.openxmlformats.org/presentationml/2006/main">
-  <p:cSld>
-    <p:spTree>
-      <p:nvGrpSpPr>
-        <p:cNvPr id="1" name=""/>
-        <p:cNvGrpSpPr/>
-        <p:nvPr/>
-      </p:nvGrpSpPr>
-      <p:grpSpPr>
-        <a:xfrm>
-          <a:off x="0" y="0"/>
-          <a:ext cx="0" cy="0"/>
-          <a:chOff x="0" y="0"/>
-          <a:chExt cx="0" cy="0"/>
-        </a:xfrm>
-      </p:grpSpPr>
-      <p:sp>
-        <p:nvSpPr>
-          <p:cNvPr id="2" name="Title 1"/>
-          <p:cNvSpPr>
-            <a:spLocks noGrp="1"/>
-          </p:cNvSpPr>
-          <p:nvPr>
-            <p:ph type="title"/>
-          </p:nvPr>
-        </p:nvSpPr>
-        <p:spPr/>
-        <p:txBody>
-          <a:bodyPr/>
-          <a:lstStyle/>
-          <a:p>
-            <a:r>
-              <a:rPr lang="en-US" dirty="0" smtClean="0"/>
-              <a:t>Insert page title </a:t>
-            </a:r>
-            <a:endParaRPr lang="en-US" dirty="0"/>
-          </a:p>
-        </p:txBody>
-      </p:sp>
-      <p:sp>
-        <p:nvSpPr>
-          <p:cNvPr id="4" name="Text Placeholder 3"/>
-          <p:cNvSpPr>
-            <a:spLocks noGrp="1"/>
-          </p:cNvSpPr>
-          <p:nvPr>
-            <p:ph type="body" sz="quarter" idx="11"/>
-          </p:nvPr>
-        </p:nvSpPr>
-        <p:spPr/>
-        <p:txBody>
-          <a:bodyPr/>
-          <a:lstStyle/>
-          <a:p>
-            <a:pPr lvl="0"/>
-            <a:r>
-              <a:rPr lang="en-US" dirty="0" smtClean="0"/>
-              <a:t>First level</a:t>
-            </a:r>
-          </a:p>
-          <a:p>
-            <a:pPr lvl="1"/>
-            <a:r>
-              <a:rPr lang="en-US" dirty="0" smtClean="0"/>
-              <a:t>Second level</a:t>
-            </a:r>
-          </a:p>
-          <a:p>
-            <a:pPr lvl="2"/>
-            <a:r>
-              <a:rPr lang="en-US" dirty="0" smtClean="0"/>
-              <a:t>Third level</a:t>
-            </a:r>
-          </a:p>
-          <a:p>
-            <a:endParaRPr lang="en-US" dirty="0"/>
-          </a:p>
-        </p:txBody>
-      </p:sp>
-      <p:sp>
-        <p:nvSpPr>
-          <p:cNvPr id="5" name="Picture Placeholder 4"/>
-          <p:cNvSpPr>
-            <a:spLocks noGrp="1"/>
-          </p:cNvSpPr>
-          <p:nvPr>
-            <p:ph type="pic" sz="quarter" idx="10"/>
-          </p:nvPr>
-        </p:nvSpPr>
-        <p:spPr/>
-      </p:sp>
-    </p:spTree>
-  </p:cSld>
-  <p:clrMapOvr>
-    <a:masterClrMapping/>
-  </p:clrMapOvr>
-  <p:transition xmlns:p14="http://schemas.microsoft.com/office/powerpoint/2010/main" spd="med"/>
-  <p:timing>
-    <p:tnLst>
-      <p:par>
-        <p:cTn xmlns:p14="http://schemas.microsoft.com/office/powerpoint/2010/main" id="1" dur="indefinite" restart="never" nodeType="tmRoot"/>
-      </p:par>
-    </p:tnLst>
-  </p:timing>
-</p:sld>
-</file>
-
-<file path=ppt/slides/slide27.xml><?xml version="1.0" encoding="utf-8"?>
-<p:sld xmlns:a="http://schemas.openxmlformats.org/drawingml/2006/main" xmlns:r="http://schemas.openxmlformats.org/officeDocument/2006/relationships" xmlns:p="http://schemas.openxmlformats.org/presentationml/2006/main">
-  <p:cSld>
-    <p:spTree>
-      <p:nvGrpSpPr>
-        <p:cNvPr id="1" name=""/>
-        <p:cNvGrpSpPr/>
-        <p:nvPr/>
-      </p:nvGrpSpPr>
-      <p:grpSpPr>
-        <a:xfrm>
-          <a:off x="0" y="0"/>
-          <a:ext cx="0" cy="0"/>
-          <a:chOff x="0" y="0"/>
-          <a:chExt cx="0" cy="0"/>
-        </a:xfrm>
-      </p:grpSpPr>
-      <p:sp>
-        <p:nvSpPr>
-          <p:cNvPr id="24" name="Title 23"/>
-          <p:cNvSpPr>
-            <a:spLocks noGrp="1"/>
-          </p:cNvSpPr>
-          <p:nvPr>
-            <p:ph type="title"/>
-          </p:nvPr>
-        </p:nvSpPr>
-        <p:spPr/>
-        <p:txBody>
-          <a:bodyPr/>
-          <a:lstStyle/>
-          <a:p>
-            <a:r>
-              <a:rPr lang="en-US" dirty="0" smtClean="0"/>
-              <a:t>Insert page title </a:t>
-            </a:r>
-            <a:endParaRPr lang="en-US" b="0" dirty="0"/>
           </a:p>
         </p:txBody>
       </p:sp>
@@ -14644,364 +14902,48 @@
             <p:ph type="body" sz="quarter" idx="10"/>
           </p:nvPr>
         </p:nvSpPr>
-        <p:spPr/>
+        <p:spPr>
+          <a:xfrm>
+            <a:off x="324000" y="4236462"/>
+            <a:ext cx="11545200" cy="2126054"/>
+          </a:xfrm>
+        </p:spPr>
         <p:txBody>
           <a:bodyPr/>
           <a:lstStyle/>
           <a:p>
             <a:r>
               <a:rPr lang="en-US" dirty="0" smtClean="0"/>
-              <a:t>Headline here</a:t>
-            </a:r>
-          </a:p>
-          <a:p>
-            <a:pPr lvl="1"/>
+              <a:t>Contact information:</a:t>
+            </a:r>
+          </a:p>
+          <a:p>
+            <a:endParaRPr lang="en-US" dirty="0" smtClean="0"/>
+          </a:p>
+          <a:p>
+            <a:r>
+              <a:rPr lang="en-US" dirty="0" smtClean="0"/>
+              <a:t>Michael </a:t>
+            </a:r>
             <a:r>
               <a:rPr lang="en-US" dirty="0" err="1" smtClean="0"/>
-              <a:t>Lorem</a:t>
-            </a:r>
-            <a:r>
-              <a:rPr lang="en-US" dirty="0" smtClean="0"/>
-              <a:t> </a:t>
-            </a:r>
-            <a:r>
-              <a:rPr lang="en-US" dirty="0" err="1" smtClean="0"/>
-              <a:t>ipsum</a:t>
-            </a:r>
-            <a:r>
-              <a:rPr lang="en-US" dirty="0" smtClean="0"/>
-              <a:t> dolor sit </a:t>
-            </a:r>
-            <a:r>
-              <a:rPr lang="en-US" dirty="0" err="1" smtClean="0"/>
-              <a:t>amet</a:t>
-            </a:r>
-            <a:r>
-              <a:rPr lang="en-US" dirty="0" smtClean="0"/>
-              <a:t>, </a:t>
-            </a:r>
-            <a:r>
-              <a:rPr lang="en-US" dirty="0" err="1" smtClean="0"/>
-              <a:t>consectetur</a:t>
-            </a:r>
-            <a:r>
-              <a:rPr lang="en-US" dirty="0" smtClean="0"/>
-              <a:t> </a:t>
-            </a:r>
-            <a:r>
-              <a:rPr lang="en-US" dirty="0" err="1" smtClean="0"/>
-              <a:t>adipiscing</a:t>
-            </a:r>
-            <a:r>
-              <a:rPr lang="en-US" dirty="0" smtClean="0"/>
-              <a:t> </a:t>
-            </a:r>
-            <a:r>
-              <a:rPr lang="en-US" dirty="0" err="1" smtClean="0"/>
-              <a:t>elit</a:t>
-            </a:r>
-            <a:r>
-              <a:rPr lang="en-US" dirty="0" smtClean="0"/>
-              <a:t>. Maecenas </a:t>
-            </a:r>
-            <a:r>
-              <a:rPr lang="en-US" dirty="0" err="1" smtClean="0"/>
-              <a:t>pellentesque</a:t>
-            </a:r>
-            <a:r>
-              <a:rPr lang="en-US" dirty="0" smtClean="0"/>
-              <a:t> </a:t>
-            </a:r>
-            <a:r>
-              <a:rPr lang="en-US" dirty="0" err="1" smtClean="0"/>
-              <a:t>laoreet</a:t>
-            </a:r>
-            <a:r>
-              <a:rPr lang="en-US" dirty="0" smtClean="0"/>
-              <a:t> </a:t>
-            </a:r>
-            <a:r>
-              <a:rPr lang="en-US" dirty="0" err="1" smtClean="0"/>
-              <a:t>urna</a:t>
-            </a:r>
-            <a:r>
-              <a:rPr lang="en-US" dirty="0" smtClean="0"/>
-              <a:t> </a:t>
-            </a:r>
-            <a:r>
-              <a:rPr lang="en-US" dirty="0" err="1" smtClean="0"/>
-              <a:t>molestie</a:t>
-            </a:r>
-            <a:r>
-              <a:rPr lang="en-US" dirty="0" smtClean="0"/>
-              <a:t> </a:t>
-            </a:r>
-            <a:r>
-              <a:rPr lang="en-US" dirty="0" err="1" smtClean="0"/>
-              <a:t>placerat</a:t>
-            </a:r>
-            <a:r>
-              <a:rPr lang="en-US" dirty="0" smtClean="0"/>
-              <a:t> </a:t>
-            </a:r>
-            <a:r>
-              <a:rPr lang="en-US" dirty="0" err="1" smtClean="0"/>
-              <a:t>ipsum</a:t>
-            </a:r>
-            <a:r>
-              <a:rPr lang="en-US" dirty="0" smtClean="0"/>
-              <a:t>.</a:t>
-            </a:r>
-          </a:p>
-        </p:txBody>
-      </p:sp>
-      <p:sp>
-        <p:nvSpPr>
-          <p:cNvPr id="4" name="Text Placeholder 3"/>
-          <p:cNvSpPr>
-            <a:spLocks noGrp="1"/>
-          </p:cNvSpPr>
-          <p:nvPr>
-            <p:ph type="body" sz="quarter" idx="14"/>
-          </p:nvPr>
-        </p:nvSpPr>
-        <p:spPr/>
-        <p:txBody>
-          <a:bodyPr/>
-          <a:lstStyle/>
-          <a:p>
-            <a:r>
-              <a:rPr lang="en-US" dirty="0" smtClean="0"/>
-              <a:t>Headline here</a:t>
-            </a:r>
-          </a:p>
-          <a:p>
-            <a:pPr lvl="1"/>
-            <a:r>
-              <a:rPr lang="en-US" dirty="0" err="1" smtClean="0"/>
-              <a:t>Lorem</a:t>
-            </a:r>
-            <a:r>
-              <a:rPr lang="en-US" dirty="0" smtClean="0"/>
-              <a:t> </a:t>
-            </a:r>
-            <a:r>
-              <a:rPr lang="en-US" dirty="0" err="1" smtClean="0"/>
-              <a:t>ipsum</a:t>
-            </a:r>
-            <a:r>
-              <a:rPr lang="en-US" dirty="0" smtClean="0"/>
-              <a:t> dolor sit </a:t>
-            </a:r>
-            <a:r>
-              <a:rPr lang="en-US" dirty="0" err="1" smtClean="0"/>
-              <a:t>amet</a:t>
-            </a:r>
-            <a:r>
-              <a:rPr lang="en-US" dirty="0" smtClean="0"/>
-              <a:t>, </a:t>
-            </a:r>
-            <a:r>
-              <a:rPr lang="en-US" dirty="0" err="1" smtClean="0"/>
-              <a:t>consectetur</a:t>
-            </a:r>
-            <a:r>
-              <a:rPr lang="en-US" dirty="0" smtClean="0"/>
-              <a:t> </a:t>
-            </a:r>
-            <a:r>
-              <a:rPr lang="en-US" dirty="0" err="1" smtClean="0"/>
-              <a:t>adipiscing</a:t>
-            </a:r>
-            <a:r>
-              <a:rPr lang="en-US" dirty="0" smtClean="0"/>
-              <a:t> </a:t>
-            </a:r>
-            <a:r>
-              <a:rPr lang="en-US" dirty="0" err="1" smtClean="0"/>
-              <a:t>elit</a:t>
-            </a:r>
-            <a:r>
-              <a:rPr lang="en-US" dirty="0" smtClean="0"/>
-              <a:t>. Maecenas </a:t>
-            </a:r>
-            <a:r>
-              <a:rPr lang="en-US" dirty="0" err="1" smtClean="0"/>
-              <a:t>pellentesque</a:t>
-            </a:r>
-            <a:r>
-              <a:rPr lang="en-US" dirty="0" smtClean="0"/>
-              <a:t> </a:t>
-            </a:r>
-            <a:r>
-              <a:rPr lang="en-US" dirty="0" err="1" smtClean="0"/>
-              <a:t>laoreet</a:t>
-            </a:r>
-            <a:r>
-              <a:rPr lang="en-US" dirty="0" smtClean="0"/>
-              <a:t> </a:t>
-            </a:r>
-            <a:r>
-              <a:rPr lang="en-US" dirty="0" err="1" smtClean="0"/>
-              <a:t>urna</a:t>
-            </a:r>
-            <a:r>
-              <a:rPr lang="en-US" dirty="0" smtClean="0"/>
-              <a:t> </a:t>
-            </a:r>
-            <a:r>
-              <a:rPr lang="en-US" dirty="0" err="1" smtClean="0"/>
-              <a:t>molestie</a:t>
-            </a:r>
-            <a:r>
-              <a:rPr lang="en-US" dirty="0" smtClean="0"/>
-              <a:t> </a:t>
-            </a:r>
-            <a:r>
-              <a:rPr lang="en-US" dirty="0" err="1" smtClean="0"/>
-              <a:t>placerat</a:t>
-            </a:r>
-            <a:r>
-              <a:rPr lang="en-US" dirty="0" smtClean="0"/>
-              <a:t> </a:t>
-            </a:r>
-            <a:r>
-              <a:rPr lang="en-US" dirty="0" err="1" smtClean="0"/>
-              <a:t>ipsum</a:t>
-            </a:r>
-            <a:r>
-              <a:rPr lang="en-US" dirty="0" smtClean="0"/>
-              <a:t>.</a:t>
-            </a:r>
-          </a:p>
-        </p:txBody>
-      </p:sp>
-      <p:sp>
-        <p:nvSpPr>
-          <p:cNvPr id="7" name="Picture Placeholder 6"/>
-          <p:cNvSpPr>
-            <a:spLocks noGrp="1"/>
-          </p:cNvSpPr>
-          <p:nvPr>
-            <p:ph type="pic" sz="quarter" idx="15"/>
-          </p:nvPr>
-        </p:nvSpPr>
-        <p:spPr/>
-      </p:sp>
-      <p:sp>
-        <p:nvSpPr>
-          <p:cNvPr id="9" name="Picture Placeholder 8"/>
-          <p:cNvSpPr>
-            <a:spLocks noGrp="1"/>
-          </p:cNvSpPr>
-          <p:nvPr>
-            <p:ph type="pic" sz="quarter" idx="16"/>
-          </p:nvPr>
-        </p:nvSpPr>
-        <p:spPr/>
-      </p:sp>
-    </p:spTree>
-  </p:cSld>
-  <p:clrMapOvr>
-    <a:masterClrMapping/>
-  </p:clrMapOvr>
-  <p:transition xmlns:p14="http://schemas.microsoft.com/office/powerpoint/2010/main" spd="med"/>
-  <p:timing>
-    <p:tnLst>
-      <p:par>
-        <p:cTn xmlns:p14="http://schemas.microsoft.com/office/powerpoint/2010/main" id="1" dur="indefinite" restart="never" nodeType="tmRoot"/>
-      </p:par>
-    </p:tnLst>
-  </p:timing>
-</p:sld>
-</file>
-
-<file path=ppt/slides/slide28.xml><?xml version="1.0" encoding="utf-8"?>
-<p:sld xmlns:a="http://schemas.openxmlformats.org/drawingml/2006/main" xmlns:r="http://schemas.openxmlformats.org/officeDocument/2006/relationships" xmlns:p="http://schemas.openxmlformats.org/presentationml/2006/main">
-  <p:cSld>
-    <p:spTree>
-      <p:nvGrpSpPr>
-        <p:cNvPr id="1" name=""/>
-        <p:cNvGrpSpPr/>
-        <p:nvPr/>
-      </p:nvGrpSpPr>
-      <p:grpSpPr>
-        <a:xfrm>
-          <a:off x="0" y="0"/>
-          <a:ext cx="0" cy="0"/>
-          <a:chOff x="0" y="0"/>
-          <a:chExt cx="0" cy="0"/>
-        </a:xfrm>
-      </p:grpSpPr>
-      <p:sp>
-        <p:nvSpPr>
-          <p:cNvPr id="5" name="Title 4"/>
-          <p:cNvSpPr>
-            <a:spLocks noGrp="1"/>
-          </p:cNvSpPr>
-          <p:nvPr>
-            <p:ph type="ctrTitle"/>
-          </p:nvPr>
-        </p:nvSpPr>
-        <p:spPr/>
-        <p:txBody>
-          <a:bodyPr/>
-          <a:lstStyle/>
-          <a:p>
-            <a:r>
-              <a:rPr lang="en-US" dirty="0" smtClean="0"/>
-              <a:t>Thank you</a:t>
-            </a:r>
-            <a:endParaRPr lang="en-US" dirty="0"/>
-          </a:p>
-        </p:txBody>
-      </p:sp>
-      <p:sp>
-        <p:nvSpPr>
-          <p:cNvPr id="3" name="Text Placeholder 2"/>
-          <p:cNvSpPr>
-            <a:spLocks noGrp="1"/>
-          </p:cNvSpPr>
-          <p:nvPr>
-            <p:ph type="body" sz="quarter" idx="10"/>
-          </p:nvPr>
-        </p:nvSpPr>
-        <p:spPr/>
-        <p:txBody>
-          <a:bodyPr/>
-          <a:lstStyle/>
-          <a:p>
-            <a:r>
-              <a:rPr lang="en-US" dirty="0" smtClean="0"/>
-              <a:t>Contact information:</a:t>
-            </a:r>
-          </a:p>
-          <a:p>
+              <a:t>Menzel</a:t>
+            </a:r>
             <a:endParaRPr lang="en-US" dirty="0" smtClean="0"/>
           </a:p>
           <a:p>
             <a:r>
               <a:rPr lang="en-US" dirty="0" smtClean="0"/>
-              <a:t>F name MI. L name</a:t>
-            </a:r>
-          </a:p>
-          <a:p>
-            <a:r>
-              <a:rPr lang="en-US" dirty="0" smtClean="0"/>
-              <a:t>Title</a:t>
-            </a:r>
-          </a:p>
-          <a:p>
-            <a:r>
-              <a:rPr lang="en-US" dirty="0" smtClean="0"/>
-              <a:t>Address</a:t>
-            </a:r>
-          </a:p>
-          <a:p>
-            <a:r>
-              <a:rPr lang="en-US" dirty="0" smtClean="0"/>
-              <a:t>Phone number</a:t>
-            </a:r>
+              <a:t>Vineet Hingorani</a:t>
+            </a:r>
+            <a:endParaRPr lang="en-US" dirty="0" smtClean="0"/>
+          </a:p>
+          <a:p>
+            <a:r>
+              <a:rPr lang="en-US" dirty="0" smtClean="0"/>
+              <a:t>C3.05</a:t>
+            </a:r>
+            <a:endParaRPr lang="en-US" dirty="0" smtClean="0"/>
           </a:p>
         </p:txBody>
       </p:sp>
@@ -15020,7 +14962,7 @@
 </p:sld>
 </file>
 
-<file path=ppt/slides/slide29.xml><?xml version="1.0" encoding="utf-8"?>
+<file path=ppt/slides/slide25.xml><?xml version="1.0" encoding="utf-8"?>
 <p:sld xmlns:a="http://schemas.openxmlformats.org/drawingml/2006/main" xmlns:r="http://schemas.openxmlformats.org/officeDocument/2006/relationships" xmlns:p="http://schemas.openxmlformats.org/presentationml/2006/main" show="0">
   <p:cSld>
     <p:spTree>
@@ -15053,141 +14995,7 @@
 </p:sld>
 </file>
 
-<file path=ppt/slides/slide3.xml><?xml version="1.0" encoding="utf-8"?>
-<p:sld xmlns:a="http://schemas.openxmlformats.org/drawingml/2006/main" xmlns:r="http://schemas.openxmlformats.org/officeDocument/2006/relationships" xmlns:p="http://schemas.openxmlformats.org/presentationml/2006/main">
-  <p:cSld>
-    <p:spTree>
-      <p:nvGrpSpPr>
-        <p:cNvPr id="1" name=""/>
-        <p:cNvGrpSpPr/>
-        <p:nvPr/>
-      </p:nvGrpSpPr>
-      <p:grpSpPr>
-        <a:xfrm>
-          <a:off x="0" y="0"/>
-          <a:ext cx="0" cy="0"/>
-          <a:chOff x="0" y="0"/>
-          <a:chExt cx="0" cy="0"/>
-        </a:xfrm>
-      </p:grpSpPr>
-      <p:pic>
-        <p:nvPicPr>
-          <p:cNvPr id="8" name="Picture Placeholder 4" descr="275257_l_srgb_s_gl copy.jpg"/>
-          <p:cNvPicPr>
-            <a:picLocks noGrp="1" noChangeAspect="1"/>
-          </p:cNvPicPr>
-          <p:nvPr>
-            <p:ph type="pic" sz="quarter" idx="11"/>
-          </p:nvPr>
-        </p:nvPicPr>
-        <p:blipFill rotWithShape="1">
-          <a:blip r:embed="rId3" cstate="screen">
-            <a:extLst>
-              <a:ext uri="{28A0092B-C50C-407E-A947-70E740481C1C}">
-                <a14:useLocalDpi xmlns:a14="http://schemas.microsoft.com/office/drawing/2010/main"/>
-              </a:ext>
-            </a:extLst>
-          </a:blip>
-          <a:srcRect/>
-          <a:stretch/>
-        </p:blipFill>
-        <p:spPr bwMode="gray">
-          <a:prstGeom prst="rect">
-            <a:avLst/>
-          </a:prstGeom>
-          <a:solidFill>
-            <a:schemeClr val="bg1">
-              <a:lumMod val="95000"/>
-            </a:schemeClr>
-          </a:solidFill>
-        </p:spPr>
-      </p:pic>
-      <p:sp>
-        <p:nvSpPr>
-          <p:cNvPr id="3" name="Title 2"/>
-          <p:cNvSpPr>
-            <a:spLocks noGrp="1"/>
-          </p:cNvSpPr>
-          <p:nvPr>
-            <p:ph type="ctrTitle"/>
-          </p:nvPr>
-        </p:nvSpPr>
-        <p:spPr/>
-        <p:txBody>
-          <a:bodyPr/>
-          <a:lstStyle/>
-          <a:p>
-            <a:r>
-              <a:rPr lang="en-US" dirty="0" smtClean="0"/>
-              <a:t>Recap: Cloud Computing</a:t>
-            </a:r>
-            <a:endParaRPr lang="en-US" dirty="0"/>
-          </a:p>
-        </p:txBody>
-      </p:sp>
-      <p:sp>
-        <p:nvSpPr>
-          <p:cNvPr id="4" name="Text Placeholder 3"/>
-          <p:cNvSpPr>
-            <a:spLocks noGrp="1"/>
-          </p:cNvSpPr>
-          <p:nvPr>
-            <p:ph type="body" sz="quarter" idx="10"/>
-          </p:nvPr>
-        </p:nvSpPr>
-        <p:spPr/>
-        <p:txBody>
-          <a:bodyPr/>
-          <a:lstStyle/>
-          <a:p>
-            <a:endParaRPr lang="en-US"/>
-          </a:p>
-        </p:txBody>
-      </p:sp>
-      <p:pic>
-        <p:nvPicPr>
-          <p:cNvPr id="6" name="Picture 5" descr="cloud-supergraphic.png"/>
-          <p:cNvPicPr>
-            <a:picLocks noChangeAspect="1"/>
-          </p:cNvPicPr>
-          <p:nvPr/>
-        </p:nvPicPr>
-        <p:blipFill rotWithShape="1">
-          <a:blip r:embed="rId4" cstate="screen">
-            <a:alphaModFix amt="60000"/>
-            <a:extLst>
-              <a:ext uri="{28A0092B-C50C-407E-A947-70E740481C1C}">
-                <a14:useLocalDpi xmlns:a14="http://schemas.microsoft.com/office/drawing/2010/main"/>
-              </a:ext>
-            </a:extLst>
-          </a:blip>
-          <a:srcRect l="10988" t="23849" b="18011"/>
-          <a:stretch/>
-        </p:blipFill>
-        <p:spPr>
-          <a:xfrm>
-            <a:off x="325640" y="160854"/>
-            <a:ext cx="4934251" cy="2148591"/>
-          </a:xfrm>
-          <a:prstGeom prst="rect">
-            <a:avLst/>
-          </a:prstGeom>
-        </p:spPr>
-      </p:pic>
-    </p:spTree>
-    <p:extLst>
-      <p:ext uri="{BB962C8B-B14F-4D97-AF65-F5344CB8AC3E}">
-        <p14:creationId xmlns:p14="http://schemas.microsoft.com/office/powerpoint/2010/main" val="3174969617"/>
-      </p:ext>
-    </p:extLst>
-  </p:cSld>
-  <p:clrMapOvr>
-    <a:masterClrMapping/>
-  </p:clrMapOvr>
-</p:sld>
-</file>
-
-<file path=ppt/slides/slide30.xml><?xml version="1.0" encoding="utf-8"?>
+<file path=ppt/slides/slide26.xml><?xml version="1.0" encoding="utf-8"?>
 <p:sld xmlns:a="http://schemas.openxmlformats.org/drawingml/2006/main" xmlns:r="http://schemas.openxmlformats.org/officeDocument/2006/relationships" xmlns:p="http://schemas.openxmlformats.org/presentationml/2006/main" show="0">
   <p:cSld>
     <p:spTree>
@@ -15213,7 +15021,7 @@
 </p:sld>
 </file>
 
-<file path=ppt/slides/slide31.xml><?xml version="1.0" encoding="utf-8"?>
+<file path=ppt/slides/slide27.xml><?xml version="1.0" encoding="utf-8"?>
 <p:sld xmlns:a="http://schemas.openxmlformats.org/drawingml/2006/main" xmlns:r="http://schemas.openxmlformats.org/officeDocument/2006/relationships" xmlns:p="http://schemas.openxmlformats.org/presentationml/2006/main" show="0">
   <p:cSld>
     <p:spTree>
@@ -15914,6 +15722,140 @@
 </p:sld>
 </file>
 
+<file path=ppt/slides/slide3.xml><?xml version="1.0" encoding="utf-8"?>
+<p:sld xmlns:a="http://schemas.openxmlformats.org/drawingml/2006/main" xmlns:r="http://schemas.openxmlformats.org/officeDocument/2006/relationships" xmlns:p="http://schemas.openxmlformats.org/presentationml/2006/main">
+  <p:cSld>
+    <p:spTree>
+      <p:nvGrpSpPr>
+        <p:cNvPr id="1" name=""/>
+        <p:cNvGrpSpPr/>
+        <p:nvPr/>
+      </p:nvGrpSpPr>
+      <p:grpSpPr>
+        <a:xfrm>
+          <a:off x="0" y="0"/>
+          <a:ext cx="0" cy="0"/>
+          <a:chOff x="0" y="0"/>
+          <a:chExt cx="0" cy="0"/>
+        </a:xfrm>
+      </p:grpSpPr>
+      <p:pic>
+        <p:nvPicPr>
+          <p:cNvPr id="8" name="Picture Placeholder 4" descr="275257_l_srgb_s_gl copy.jpg"/>
+          <p:cNvPicPr>
+            <a:picLocks noGrp="1" noChangeAspect="1"/>
+          </p:cNvPicPr>
+          <p:nvPr>
+            <p:ph type="pic" sz="quarter" idx="11"/>
+          </p:nvPr>
+        </p:nvPicPr>
+        <p:blipFill rotWithShape="1">
+          <a:blip r:embed="rId3" cstate="screen">
+            <a:extLst>
+              <a:ext uri="{28A0092B-C50C-407E-A947-70E740481C1C}">
+                <a14:useLocalDpi xmlns:a14="http://schemas.microsoft.com/office/drawing/2010/main"/>
+              </a:ext>
+            </a:extLst>
+          </a:blip>
+          <a:srcRect/>
+          <a:stretch/>
+        </p:blipFill>
+        <p:spPr bwMode="gray">
+          <a:prstGeom prst="rect">
+            <a:avLst/>
+          </a:prstGeom>
+          <a:solidFill>
+            <a:schemeClr val="bg1">
+              <a:lumMod val="95000"/>
+            </a:schemeClr>
+          </a:solidFill>
+        </p:spPr>
+      </p:pic>
+      <p:sp>
+        <p:nvSpPr>
+          <p:cNvPr id="3" name="Title 2"/>
+          <p:cNvSpPr>
+            <a:spLocks noGrp="1"/>
+          </p:cNvSpPr>
+          <p:nvPr>
+            <p:ph type="ctrTitle"/>
+          </p:nvPr>
+        </p:nvSpPr>
+        <p:spPr/>
+        <p:txBody>
+          <a:bodyPr/>
+          <a:lstStyle/>
+          <a:p>
+            <a:r>
+              <a:rPr lang="en-US" dirty="0" smtClean="0"/>
+              <a:t>Recap: Cloud Computing</a:t>
+            </a:r>
+            <a:endParaRPr lang="en-US" dirty="0"/>
+          </a:p>
+        </p:txBody>
+      </p:sp>
+      <p:sp>
+        <p:nvSpPr>
+          <p:cNvPr id="4" name="Text Placeholder 3"/>
+          <p:cNvSpPr>
+            <a:spLocks noGrp="1"/>
+          </p:cNvSpPr>
+          <p:nvPr>
+            <p:ph type="body" sz="quarter" idx="10"/>
+          </p:nvPr>
+        </p:nvSpPr>
+        <p:spPr/>
+        <p:txBody>
+          <a:bodyPr/>
+          <a:lstStyle/>
+          <a:p>
+            <a:endParaRPr lang="en-US"/>
+          </a:p>
+        </p:txBody>
+      </p:sp>
+      <p:pic>
+        <p:nvPicPr>
+          <p:cNvPr id="6" name="Picture 5" descr="cloud-supergraphic.png"/>
+          <p:cNvPicPr>
+            <a:picLocks noChangeAspect="1"/>
+          </p:cNvPicPr>
+          <p:nvPr/>
+        </p:nvPicPr>
+        <p:blipFill rotWithShape="1">
+          <a:blip r:embed="rId4" cstate="screen">
+            <a:alphaModFix amt="60000"/>
+            <a:extLst>
+              <a:ext uri="{28A0092B-C50C-407E-A947-70E740481C1C}">
+                <a14:useLocalDpi xmlns:a14="http://schemas.microsoft.com/office/drawing/2010/main"/>
+              </a:ext>
+            </a:extLst>
+          </a:blip>
+          <a:srcRect l="10988" t="23849" b="18011"/>
+          <a:stretch/>
+        </p:blipFill>
+        <p:spPr>
+          <a:xfrm>
+            <a:off x="325640" y="160854"/>
+            <a:ext cx="4934251" cy="2148591"/>
+          </a:xfrm>
+          <a:prstGeom prst="rect">
+            <a:avLst/>
+          </a:prstGeom>
+        </p:spPr>
+      </p:pic>
+    </p:spTree>
+    <p:extLst>
+      <p:ext uri="{BB962C8B-B14F-4D97-AF65-F5344CB8AC3E}">
+        <p14:creationId xmlns:p14="http://schemas.microsoft.com/office/powerpoint/2010/main" val="3174969617"/>
+      </p:ext>
+    </p:extLst>
+  </p:cSld>
+  <p:clrMapOvr>
+    <a:masterClrMapping/>
+  </p:clrMapOvr>
+</p:sld>
+</file>
+
 <file path=ppt/slides/slide4.xml><?xml version="1.0" encoding="utf-8"?>
 <p:sld xmlns:a="http://schemas.openxmlformats.org/drawingml/2006/main" xmlns:r="http://schemas.openxmlformats.org/officeDocument/2006/relationships" xmlns:p="http://schemas.openxmlformats.org/presentationml/2006/main">
   <p:cSld>
@@ -16635,7 +16577,7 @@
           <a:graphicData uri="http://schemas.openxmlformats.org/presentationml/2006/ole">
             <mc:AlternateContent xmlns:mc="http://schemas.openxmlformats.org/markup-compatibility/2006">
               <mc:Choice xmlns:v="urn:schemas-microsoft-com:vml" Requires="v">
-                <p:oleObj spid="_x0000_s1064" name="Dokument" r:id="rId4" imgW="24330159" imgH="16558730" progId="Word.Document.12">
+                <p:oleObj spid="_x0000_s1071" name="Dokument" r:id="rId4" imgW="24330159" imgH="16558730" progId="Word.Document.12">
                   <p:link updateAutomatic="1"/>
                 </p:oleObj>
               </mc:Choice>

</xml_diff>